<commit_message>
Add Swiper dependency, enhance styles, and update service components with city context
</commit_message>
<xml_diff>
--- a/INFO/logo.pptx
+++ b/INFO/logo.pptx
@@ -7,6 +7,7 @@
   <p:sldIdLst>
     <p:sldId id="256" r:id="rId2"/>
     <p:sldId id="257" r:id="rId3"/>
+    <p:sldId id="258" r:id="rId4"/>
   </p:sldIdLst>
   <p:sldSz cx="12192000" cy="6858000"/>
   <p:notesSz cx="6858000" cy="9144000"/>
@@ -260,7 +261,7 @@
           <a:p>
             <a:fld id="{076E1BF0-C6F9-4EF4-BC39-1B1A74D6C01B}" type="datetimeFigureOut">
               <a:rPr lang="en-US" smtClean="0"/>
-              <a:t>12/11/2024</a:t>
+              <a:t>12/29/2024</a:t>
             </a:fld>
             <a:endParaRPr lang="en-US"/>
           </a:p>
@@ -458,7 +459,7 @@
           <a:p>
             <a:fld id="{076E1BF0-C6F9-4EF4-BC39-1B1A74D6C01B}" type="datetimeFigureOut">
               <a:rPr lang="en-US" smtClean="0"/>
-              <a:t>12/11/2024</a:t>
+              <a:t>12/29/2024</a:t>
             </a:fld>
             <a:endParaRPr lang="en-US"/>
           </a:p>
@@ -666,7 +667,7 @@
           <a:p>
             <a:fld id="{076E1BF0-C6F9-4EF4-BC39-1B1A74D6C01B}" type="datetimeFigureOut">
               <a:rPr lang="en-US" smtClean="0"/>
-              <a:t>12/11/2024</a:t>
+              <a:t>12/29/2024</a:t>
             </a:fld>
             <a:endParaRPr lang="en-US"/>
           </a:p>
@@ -864,7 +865,7 @@
           <a:p>
             <a:fld id="{076E1BF0-C6F9-4EF4-BC39-1B1A74D6C01B}" type="datetimeFigureOut">
               <a:rPr lang="en-US" smtClean="0"/>
-              <a:t>12/11/2024</a:t>
+              <a:t>12/29/2024</a:t>
             </a:fld>
             <a:endParaRPr lang="en-US"/>
           </a:p>
@@ -1139,7 +1140,7 @@
           <a:p>
             <a:fld id="{076E1BF0-C6F9-4EF4-BC39-1B1A74D6C01B}" type="datetimeFigureOut">
               <a:rPr lang="en-US" smtClean="0"/>
-              <a:t>12/11/2024</a:t>
+              <a:t>12/29/2024</a:t>
             </a:fld>
             <a:endParaRPr lang="en-US"/>
           </a:p>
@@ -1404,7 +1405,7 @@
           <a:p>
             <a:fld id="{076E1BF0-C6F9-4EF4-BC39-1B1A74D6C01B}" type="datetimeFigureOut">
               <a:rPr lang="en-US" smtClean="0"/>
-              <a:t>12/11/2024</a:t>
+              <a:t>12/29/2024</a:t>
             </a:fld>
             <a:endParaRPr lang="en-US"/>
           </a:p>
@@ -1816,7 +1817,7 @@
           <a:p>
             <a:fld id="{076E1BF0-C6F9-4EF4-BC39-1B1A74D6C01B}" type="datetimeFigureOut">
               <a:rPr lang="en-US" smtClean="0"/>
-              <a:t>12/11/2024</a:t>
+              <a:t>12/29/2024</a:t>
             </a:fld>
             <a:endParaRPr lang="en-US"/>
           </a:p>
@@ -1957,7 +1958,7 @@
           <a:p>
             <a:fld id="{076E1BF0-C6F9-4EF4-BC39-1B1A74D6C01B}" type="datetimeFigureOut">
               <a:rPr lang="en-US" smtClean="0"/>
-              <a:t>12/11/2024</a:t>
+              <a:t>12/29/2024</a:t>
             </a:fld>
             <a:endParaRPr lang="en-US"/>
           </a:p>
@@ -2070,7 +2071,7 @@
           <a:p>
             <a:fld id="{076E1BF0-C6F9-4EF4-BC39-1B1A74D6C01B}" type="datetimeFigureOut">
               <a:rPr lang="en-US" smtClean="0"/>
-              <a:t>12/11/2024</a:t>
+              <a:t>12/29/2024</a:t>
             </a:fld>
             <a:endParaRPr lang="en-US"/>
           </a:p>
@@ -2381,7 +2382,7 @@
           <a:p>
             <a:fld id="{076E1BF0-C6F9-4EF4-BC39-1B1A74D6C01B}" type="datetimeFigureOut">
               <a:rPr lang="en-US" smtClean="0"/>
-              <a:t>12/11/2024</a:t>
+              <a:t>12/29/2024</a:t>
             </a:fld>
             <a:endParaRPr lang="en-US"/>
           </a:p>
@@ -2669,7 +2670,7 @@
           <a:p>
             <a:fld id="{076E1BF0-C6F9-4EF4-BC39-1B1A74D6C01B}" type="datetimeFigureOut">
               <a:rPr lang="en-US" smtClean="0"/>
-              <a:t>12/11/2024</a:t>
+              <a:t>12/29/2024</a:t>
             </a:fld>
             <a:endParaRPr lang="en-US"/>
           </a:p>
@@ -2910,7 +2911,7 @@
           <a:p>
             <a:fld id="{076E1BF0-C6F9-4EF4-BC39-1B1A74D6C01B}" type="datetimeFigureOut">
               <a:rPr lang="en-US" smtClean="0"/>
-              <a:t>12/11/2024</a:t>
+              <a:t>12/29/2024</a:t>
             </a:fld>
             <a:endParaRPr lang="en-US"/>
           </a:p>
@@ -8067,6 +8068,1249 @@
 </p:sld>
 </file>
 
+<file path=ppt/slides/slide3.xml><?xml version="1.0" encoding="utf-8"?>
+<p:sld xmlns:a="http://schemas.openxmlformats.org/drawingml/2006/main" xmlns:r="http://schemas.openxmlformats.org/officeDocument/2006/relationships" xmlns:p="http://schemas.openxmlformats.org/presentationml/2006/main">
+  <p:cSld>
+    <p:spTree>
+      <p:nvGrpSpPr>
+        <p:cNvPr id="1" name=""/>
+        <p:cNvGrpSpPr/>
+        <p:nvPr/>
+      </p:nvGrpSpPr>
+      <p:grpSpPr>
+        <a:xfrm>
+          <a:off x="0" y="0"/>
+          <a:ext cx="0" cy="0"/>
+          <a:chOff x="0" y="0"/>
+          <a:chExt cx="0" cy="0"/>
+        </a:xfrm>
+      </p:grpSpPr>
+      <p:grpSp>
+        <p:nvGrpSpPr>
+          <p:cNvPr id="24" name="Group 23">
+            <a:extLst>
+              <a:ext uri="{FF2B5EF4-FFF2-40B4-BE49-F238E27FC236}">
+                <a16:creationId xmlns:a16="http://schemas.microsoft.com/office/drawing/2014/main" id="{DE9ED42A-A4F6-7523-13A3-2251248F9F80}"/>
+              </a:ext>
+            </a:extLst>
+          </p:cNvPr>
+          <p:cNvGrpSpPr/>
+          <p:nvPr/>
+        </p:nvGrpSpPr>
+        <p:grpSpPr>
+          <a:xfrm>
+            <a:off x="2962486" y="2437430"/>
+            <a:ext cx="6267028" cy="1983141"/>
+            <a:chOff x="2962486" y="2437430"/>
+            <a:chExt cx="6267028" cy="1983141"/>
+          </a:xfrm>
+        </p:grpSpPr>
+        <p:grpSp>
+          <p:nvGrpSpPr>
+            <p:cNvPr id="10" name="Group 9">
+              <a:extLst>
+                <a:ext uri="{FF2B5EF4-FFF2-40B4-BE49-F238E27FC236}">
+                  <a16:creationId xmlns:a16="http://schemas.microsoft.com/office/drawing/2014/main" id="{7F1F3AA1-53C0-D4B4-13F2-8C70B0692492}"/>
+                </a:ext>
+              </a:extLst>
+            </p:cNvPr>
+            <p:cNvGrpSpPr/>
+            <p:nvPr/>
+          </p:nvGrpSpPr>
+          <p:grpSpPr>
+            <a:xfrm>
+              <a:off x="2962486" y="2437430"/>
+              <a:ext cx="2255205" cy="1983141"/>
+              <a:chOff x="315585" y="1581059"/>
+              <a:chExt cx="3473411" cy="3090930"/>
+            </a:xfrm>
+          </p:grpSpPr>
+          <p:sp>
+            <p:nvSpPr>
+              <p:cNvPr id="2" name="Oval 1">
+                <a:extLst>
+                  <a:ext uri="{FF2B5EF4-FFF2-40B4-BE49-F238E27FC236}">
+                    <a16:creationId xmlns:a16="http://schemas.microsoft.com/office/drawing/2014/main" id="{88A7FCBD-1769-1724-57D4-971B80D5C49A}"/>
+                  </a:ext>
+                </a:extLst>
+              </p:cNvPr>
+              <p:cNvSpPr/>
+              <p:nvPr/>
+            </p:nvSpPr>
+            <p:spPr>
+              <a:xfrm>
+                <a:off x="698066" y="1581059"/>
+                <a:ext cx="3090930" cy="3090930"/>
+              </a:xfrm>
+              <a:prstGeom prst="ellipse">
+                <a:avLst/>
+              </a:prstGeom>
+              <a:gradFill flip="none" rotWithShape="1">
+                <a:gsLst>
+                  <a:gs pos="0">
+                    <a:srgbClr val="7030A0">
+                      <a:shade val="30000"/>
+                      <a:satMod val="115000"/>
+                    </a:srgbClr>
+                  </a:gs>
+                  <a:gs pos="50000">
+                    <a:srgbClr val="7030A0">
+                      <a:shade val="67500"/>
+                      <a:satMod val="115000"/>
+                    </a:srgbClr>
+                  </a:gs>
+                  <a:gs pos="100000">
+                    <a:srgbClr val="7030A0">
+                      <a:shade val="100000"/>
+                      <a:satMod val="115000"/>
+                    </a:srgbClr>
+                  </a:gs>
+                </a:gsLst>
+                <a:path path="circle">
+                  <a:fillToRect l="50000" t="50000" r="50000" b="50000"/>
+                </a:path>
+                <a:tileRect/>
+              </a:gradFill>
+              <a:ln>
+                <a:noFill/>
+              </a:ln>
+            </p:spPr>
+            <p:style>
+              <a:lnRef idx="2">
+                <a:schemeClr val="accent1">
+                  <a:shade val="15000"/>
+                </a:schemeClr>
+              </a:lnRef>
+              <a:fillRef idx="1">
+                <a:schemeClr val="accent1"/>
+              </a:fillRef>
+              <a:effectRef idx="0">
+                <a:schemeClr val="accent1"/>
+              </a:effectRef>
+              <a:fontRef idx="minor">
+                <a:schemeClr val="lt1"/>
+              </a:fontRef>
+            </p:style>
+            <p:txBody>
+              <a:bodyPr rtlCol="0" anchor="ctr"/>
+              <a:lstStyle/>
+              <a:p>
+                <a:pPr algn="ctr"/>
+                <a:endParaRPr lang="en-US"/>
+              </a:p>
+            </p:txBody>
+          </p:sp>
+          <p:grpSp>
+            <p:nvGrpSpPr>
+              <p:cNvPr id="5" name="Graphic 3">
+                <a:extLst>
+                  <a:ext uri="{FF2B5EF4-FFF2-40B4-BE49-F238E27FC236}">
+                    <a16:creationId xmlns:a16="http://schemas.microsoft.com/office/drawing/2014/main" id="{8159C5FE-C9E1-7030-605F-25A51788A175}"/>
+                  </a:ext>
+                </a:extLst>
+              </p:cNvPr>
+              <p:cNvGrpSpPr/>
+              <p:nvPr/>
+            </p:nvGrpSpPr>
+            <p:grpSpPr>
+              <a:xfrm flipH="1">
+                <a:off x="315585" y="1901978"/>
+                <a:ext cx="3130178" cy="2449092"/>
+                <a:chOff x="3388232" y="998707"/>
+                <a:chExt cx="4849536" cy="3794340"/>
+              </a:xfrm>
+              <a:solidFill>
+                <a:schemeClr val="bg1"/>
+              </a:solidFill>
+              <a:scene3d>
+                <a:camera prst="orthographicFront">
+                  <a:rot lat="0" lon="0" rev="0"/>
+                </a:camera>
+                <a:lightRig rig="glow" dir="t">
+                  <a:rot lat="0" lon="0" rev="4800000"/>
+                </a:lightRig>
+              </a:scene3d>
+            </p:grpSpPr>
+            <p:sp>
+              <p:nvSpPr>
+                <p:cNvPr id="6" name="Freeform: Shape 5">
+                  <a:extLst>
+                    <a:ext uri="{FF2B5EF4-FFF2-40B4-BE49-F238E27FC236}">
+                      <a16:creationId xmlns:a16="http://schemas.microsoft.com/office/drawing/2014/main" id="{13D0F2FE-6D4D-68A6-FDA2-B3C25B8DD859}"/>
+                    </a:ext>
+                  </a:extLst>
+                </p:cNvPr>
+                <p:cNvSpPr/>
+                <p:nvPr/>
+              </p:nvSpPr>
+              <p:spPr>
+                <a:xfrm>
+                  <a:off x="3388232" y="998707"/>
+                  <a:ext cx="4849536" cy="3794340"/>
+                </a:xfrm>
+                <a:custGeom>
+                  <a:avLst/>
+                  <a:gdLst>
+                    <a:gd name="connsiteX0" fmla="*/ 4735387 w 4849536"/>
+                    <a:gd name="connsiteY0" fmla="*/ 3154702 h 3794340"/>
+                    <a:gd name="connsiteX1" fmla="*/ 3452693 w 4849536"/>
+                    <a:gd name="connsiteY1" fmla="*/ 1979180 h 3794340"/>
+                    <a:gd name="connsiteX2" fmla="*/ 3370202 w 4849536"/>
+                    <a:gd name="connsiteY2" fmla="*/ 1873133 h 3794340"/>
+                    <a:gd name="connsiteX3" fmla="*/ 2697697 w 4849536"/>
+                    <a:gd name="connsiteY3" fmla="*/ 1155395 h 3794340"/>
+                    <a:gd name="connsiteX4" fmla="*/ 3543912 w 4849536"/>
+                    <a:gd name="connsiteY4" fmla="*/ 400775 h 3794340"/>
+                    <a:gd name="connsiteX5" fmla="*/ 3202122 w 4849536"/>
+                    <a:gd name="connsiteY5" fmla="*/ 59080 h 3794340"/>
+                    <a:gd name="connsiteX6" fmla="*/ 2263751 w 4849536"/>
+                    <a:gd name="connsiteY6" fmla="*/ 903229 h 3794340"/>
+                    <a:gd name="connsiteX7" fmla="*/ 2051939 w 4849536"/>
+                    <a:gd name="connsiteY7" fmla="*/ 1006085 h 3794340"/>
+                    <a:gd name="connsiteX8" fmla="*/ 2014682 w 4849536"/>
+                    <a:gd name="connsiteY8" fmla="*/ 1050850 h 3794340"/>
+                    <a:gd name="connsiteX9" fmla="*/ 1906853 w 4849536"/>
+                    <a:gd name="connsiteY9" fmla="*/ 1252995 h 3794340"/>
+                    <a:gd name="connsiteX10" fmla="*/ 1788324 w 4849536"/>
+                    <a:gd name="connsiteY10" fmla="*/ 1773093 h 3794340"/>
+                    <a:gd name="connsiteX11" fmla="*/ 1278362 w 4849536"/>
+                    <a:gd name="connsiteY11" fmla="*/ 1793176 h 3794340"/>
+                    <a:gd name="connsiteX12" fmla="*/ 1040743 w 4849536"/>
+                    <a:gd name="connsiteY12" fmla="*/ 1862341 h 3794340"/>
+                    <a:gd name="connsiteX13" fmla="*/ 936385 w 4849536"/>
+                    <a:gd name="connsiteY13" fmla="*/ 1839255 h 3794340"/>
+                    <a:gd name="connsiteX14" fmla="*/ 605764 w 4849536"/>
+                    <a:gd name="connsiteY14" fmla="*/ 1428676 h 3794340"/>
+                    <a:gd name="connsiteX15" fmla="*/ 6648 w 4849536"/>
+                    <a:gd name="connsiteY15" fmla="*/ 1749725 h 3794340"/>
+                    <a:gd name="connsiteX16" fmla="*/ 424453 w 4849536"/>
+                    <a:gd name="connsiteY16" fmla="*/ 2251898 h 3794340"/>
+                    <a:gd name="connsiteX17" fmla="*/ 897064 w 4849536"/>
+                    <a:gd name="connsiteY17" fmla="*/ 2018220 h 3794340"/>
+                    <a:gd name="connsiteX18" fmla="*/ 979649 w 4849536"/>
+                    <a:gd name="connsiteY18" fmla="*/ 2036332 h 3794340"/>
+                    <a:gd name="connsiteX19" fmla="*/ 1150074 w 4849536"/>
+                    <a:gd name="connsiteY19" fmla="*/ 2259124 h 3794340"/>
+                    <a:gd name="connsiteX20" fmla="*/ 2080656 w 4849536"/>
+                    <a:gd name="connsiteY20" fmla="*/ 2156738 h 3794340"/>
+                    <a:gd name="connsiteX21" fmla="*/ 2316493 w 4849536"/>
+                    <a:gd name="connsiteY21" fmla="*/ 1818515 h 3794340"/>
+                    <a:gd name="connsiteX22" fmla="*/ 2782816 w 4849536"/>
+                    <a:gd name="connsiteY22" fmla="*/ 2315808 h 3794340"/>
+                    <a:gd name="connsiteX23" fmla="*/ 2173471 w 4849536"/>
+                    <a:gd name="connsiteY23" fmla="*/ 3492174 h 3794340"/>
+                    <a:gd name="connsiteX24" fmla="*/ 2639606 w 4849536"/>
+                    <a:gd name="connsiteY24" fmla="*/ 3620650 h 3794340"/>
+                    <a:gd name="connsiteX25" fmla="*/ 3321401 w 4849536"/>
+                    <a:gd name="connsiteY25" fmla="*/ 2547421 h 3794340"/>
+                    <a:gd name="connsiteX26" fmla="*/ 4491668 w 4849536"/>
+                    <a:gd name="connsiteY26" fmla="*/ 3571662 h 3794340"/>
+                    <a:gd name="connsiteX27" fmla="*/ 4735387 w 4849536"/>
+                    <a:gd name="connsiteY27" fmla="*/ 3154702 h 3794340"/>
+                  </a:gdLst>
+                  <a:ahLst/>
+                  <a:cxnLst>
+                    <a:cxn ang="0">
+                      <a:pos x="connsiteX0" y="connsiteY0"/>
+                    </a:cxn>
+                    <a:cxn ang="0">
+                      <a:pos x="connsiteX1" y="connsiteY1"/>
+                    </a:cxn>
+                    <a:cxn ang="0">
+                      <a:pos x="connsiteX2" y="connsiteY2"/>
+                    </a:cxn>
+                    <a:cxn ang="0">
+                      <a:pos x="connsiteX3" y="connsiteY3"/>
+                    </a:cxn>
+                    <a:cxn ang="0">
+                      <a:pos x="connsiteX4" y="connsiteY4"/>
+                    </a:cxn>
+                    <a:cxn ang="0">
+                      <a:pos x="connsiteX5" y="connsiteY5"/>
+                    </a:cxn>
+                    <a:cxn ang="0">
+                      <a:pos x="connsiteX6" y="connsiteY6"/>
+                    </a:cxn>
+                    <a:cxn ang="0">
+                      <a:pos x="connsiteX7" y="connsiteY7"/>
+                    </a:cxn>
+                    <a:cxn ang="0">
+                      <a:pos x="connsiteX8" y="connsiteY8"/>
+                    </a:cxn>
+                    <a:cxn ang="0">
+                      <a:pos x="connsiteX9" y="connsiteY9"/>
+                    </a:cxn>
+                    <a:cxn ang="0">
+                      <a:pos x="connsiteX10" y="connsiteY10"/>
+                    </a:cxn>
+                    <a:cxn ang="0">
+                      <a:pos x="connsiteX11" y="connsiteY11"/>
+                    </a:cxn>
+                    <a:cxn ang="0">
+                      <a:pos x="connsiteX12" y="connsiteY12"/>
+                    </a:cxn>
+                    <a:cxn ang="0">
+                      <a:pos x="connsiteX13" y="connsiteY13"/>
+                    </a:cxn>
+                    <a:cxn ang="0">
+                      <a:pos x="connsiteX14" y="connsiteY14"/>
+                    </a:cxn>
+                    <a:cxn ang="0">
+                      <a:pos x="connsiteX15" y="connsiteY15"/>
+                    </a:cxn>
+                    <a:cxn ang="0">
+                      <a:pos x="connsiteX16" y="connsiteY16"/>
+                    </a:cxn>
+                    <a:cxn ang="0">
+                      <a:pos x="connsiteX17" y="connsiteY17"/>
+                    </a:cxn>
+                    <a:cxn ang="0">
+                      <a:pos x="connsiteX18" y="connsiteY18"/>
+                    </a:cxn>
+                    <a:cxn ang="0">
+                      <a:pos x="connsiteX19" y="connsiteY19"/>
+                    </a:cxn>
+                    <a:cxn ang="0">
+                      <a:pos x="connsiteX20" y="connsiteY20"/>
+                    </a:cxn>
+                    <a:cxn ang="0">
+                      <a:pos x="connsiteX21" y="connsiteY21"/>
+                    </a:cxn>
+                    <a:cxn ang="0">
+                      <a:pos x="connsiteX22" y="connsiteY22"/>
+                    </a:cxn>
+                    <a:cxn ang="0">
+                      <a:pos x="connsiteX23" y="connsiteY23"/>
+                    </a:cxn>
+                    <a:cxn ang="0">
+                      <a:pos x="connsiteX24" y="connsiteY24"/>
+                    </a:cxn>
+                    <a:cxn ang="0">
+                      <a:pos x="connsiteX25" y="connsiteY25"/>
+                    </a:cxn>
+                    <a:cxn ang="0">
+                      <a:pos x="connsiteX26" y="connsiteY26"/>
+                    </a:cxn>
+                    <a:cxn ang="0">
+                      <a:pos x="connsiteX27" y="connsiteY27"/>
+                    </a:cxn>
+                  </a:cxnLst>
+                  <a:rect l="l" t="t" r="r" b="b"/>
+                  <a:pathLst>
+                    <a:path w="4849536" h="3794340">
+                      <a:moveTo>
+                        <a:pt x="4735387" y="3154702"/>
+                      </a:moveTo>
+                      <a:cubicBezTo>
+                        <a:pt x="4245602" y="2850639"/>
+                        <a:pt x="3842531" y="2406182"/>
+                        <a:pt x="3452693" y="1979180"/>
+                      </a:cubicBezTo>
+                      <a:cubicBezTo>
+                        <a:pt x="3434017" y="1942392"/>
+                        <a:pt x="3407271" y="1906730"/>
+                        <a:pt x="3370202" y="1873133"/>
+                      </a:cubicBezTo>
+                      <a:cubicBezTo>
+                        <a:pt x="3126201" y="1652406"/>
+                        <a:pt x="2912887" y="1403056"/>
+                        <a:pt x="2697697" y="1155395"/>
+                      </a:cubicBezTo>
+                      <a:cubicBezTo>
+                        <a:pt x="2970228" y="893375"/>
+                        <a:pt x="3251767" y="641210"/>
+                        <a:pt x="3543912" y="400775"/>
+                      </a:cubicBezTo>
+                      <a:cubicBezTo>
+                        <a:pt x="3784628" y="202477"/>
+                        <a:pt x="3440586" y="-137341"/>
+                        <a:pt x="3202122" y="59080"/>
+                      </a:cubicBezTo>
+                      <a:cubicBezTo>
+                        <a:pt x="2876756" y="326636"/>
+                        <a:pt x="2564998" y="608833"/>
+                        <a:pt x="2263751" y="903229"/>
+                      </a:cubicBezTo>
+                      <a:cubicBezTo>
+                        <a:pt x="2183888" y="914585"/>
+                        <a:pt x="2107309" y="949777"/>
+                        <a:pt x="2051939" y="1006085"/>
+                      </a:cubicBezTo>
+                      <a:cubicBezTo>
+                        <a:pt x="2037862" y="1020350"/>
+                        <a:pt x="2025756" y="1035459"/>
+                        <a:pt x="2014682" y="1050850"/>
+                      </a:cubicBezTo>
+                      <a:cubicBezTo>
+                        <a:pt x="1949740" y="1086981"/>
+                        <a:pt x="1903474" y="1154269"/>
+                        <a:pt x="1906853" y="1252995"/>
+                      </a:cubicBezTo>
+                      <a:cubicBezTo>
+                        <a:pt x="1912765" y="1425861"/>
+                        <a:pt x="1916706" y="1639080"/>
+                        <a:pt x="1788324" y="1773093"/>
+                      </a:cubicBezTo>
+                      <a:cubicBezTo>
+                        <a:pt x="1665385" y="1901569"/>
+                        <a:pt x="1422886" y="1834375"/>
+                        <a:pt x="1278362" y="1793176"/>
+                      </a:cubicBezTo>
+                      <a:cubicBezTo>
+                        <a:pt x="1175319" y="1763896"/>
+                        <a:pt x="1092734" y="1799558"/>
+                        <a:pt x="1040743" y="1862341"/>
+                      </a:cubicBezTo>
+                      <a:lnTo>
+                        <a:pt x="936385" y="1839255"/>
+                      </a:lnTo>
+                      <a:cubicBezTo>
+                        <a:pt x="936010" y="1645931"/>
+                        <a:pt x="802185" y="1471939"/>
+                        <a:pt x="605764" y="1428676"/>
+                      </a:cubicBezTo>
+                      <a:cubicBezTo>
+                        <a:pt x="378374" y="1378656"/>
+                        <a:pt x="56668" y="1522429"/>
+                        <a:pt x="6648" y="1749725"/>
+                      </a:cubicBezTo>
+                      <a:cubicBezTo>
+                        <a:pt x="-43279" y="1977021"/>
+                        <a:pt x="197062" y="2202066"/>
+                        <a:pt x="424453" y="2251898"/>
+                      </a:cubicBezTo>
+                      <a:cubicBezTo>
+                        <a:pt x="621061" y="2295161"/>
+                        <a:pt x="815605" y="2193432"/>
+                        <a:pt x="897064" y="2018220"/>
+                      </a:cubicBezTo>
+                      <a:lnTo>
+                        <a:pt x="979649" y="2036332"/>
+                      </a:lnTo>
+                      <a:cubicBezTo>
+                        <a:pt x="980024" y="2131868"/>
+                        <a:pt x="1031452" y="2225527"/>
+                        <a:pt x="1150074" y="2259124"/>
+                      </a:cubicBezTo>
+                      <a:cubicBezTo>
+                        <a:pt x="1464741" y="2348466"/>
+                        <a:pt x="1810566" y="2369300"/>
+                        <a:pt x="2080656" y="2156738"/>
+                      </a:cubicBezTo>
+                      <a:cubicBezTo>
+                        <a:pt x="2194211" y="2067302"/>
+                        <a:pt x="2268631" y="1949055"/>
+                        <a:pt x="2316493" y="1818515"/>
+                      </a:cubicBezTo>
+                      <a:cubicBezTo>
+                        <a:pt x="2466084" y="1989785"/>
+                        <a:pt x="2618209" y="2158708"/>
+                        <a:pt x="2782816" y="2315808"/>
+                      </a:cubicBezTo>
+                      <a:cubicBezTo>
+                        <a:pt x="2451069" y="2602321"/>
+                        <a:pt x="2271634" y="3045089"/>
+                        <a:pt x="2173471" y="3492174"/>
+                      </a:cubicBezTo>
+                      <a:cubicBezTo>
+                        <a:pt x="2106746" y="3795767"/>
+                        <a:pt x="2572694" y="3924994"/>
+                        <a:pt x="2639606" y="3620650"/>
+                      </a:cubicBezTo>
+                      <a:cubicBezTo>
+                        <a:pt x="2734954" y="3186516"/>
+                        <a:pt x="2892898" y="2721037"/>
+                        <a:pt x="3321401" y="2547421"/>
+                      </a:cubicBezTo>
+                      <a:cubicBezTo>
+                        <a:pt x="3677174" y="2928062"/>
+                        <a:pt x="4052185" y="3298850"/>
+                        <a:pt x="4491668" y="3571662"/>
+                      </a:cubicBezTo>
+                      <a:cubicBezTo>
+                        <a:pt x="4757160" y="3737020"/>
+                        <a:pt x="4999753" y="3318746"/>
+                        <a:pt x="4735387" y="3154702"/>
+                      </a:cubicBezTo>
+                      <a:close/>
+                    </a:path>
+                  </a:pathLst>
+                </a:custGeom>
+                <a:grpFill/>
+                <a:ln w="93785" cap="flat">
+                  <a:noFill/>
+                  <a:prstDash val="solid"/>
+                  <a:miter/>
+                </a:ln>
+                <a:effectLst>
+                  <a:outerShdw blurRad="190500" dist="228600" dir="2700000" algn="ctr">
+                    <a:srgbClr val="000000">
+                      <a:alpha val="14000"/>
+                    </a:srgbClr>
+                  </a:outerShdw>
+                </a:effectLst>
+                <a:sp3d prstMaterial="matte">
+                  <a:bevelT w="127000" h="63500"/>
+                </a:sp3d>
+              </p:spPr>
+              <p:txBody>
+                <a:bodyPr rtlCol="0" anchor="ctr"/>
+                <a:lstStyle/>
+                <a:p>
+                  <a:endParaRPr lang="en-US" dirty="0"/>
+                </a:p>
+              </p:txBody>
+            </p:sp>
+            <p:sp>
+              <p:nvSpPr>
+                <p:cNvPr id="7" name="Freeform: Shape 6">
+                  <a:extLst>
+                    <a:ext uri="{FF2B5EF4-FFF2-40B4-BE49-F238E27FC236}">
+                      <a16:creationId xmlns:a16="http://schemas.microsoft.com/office/drawing/2014/main" id="{FE58AF83-D54D-021C-22D6-F6B003A3A7A8}"/>
+                    </a:ext>
+                  </a:extLst>
+                </p:cNvPr>
+                <p:cNvSpPr/>
+                <p:nvPr/>
+              </p:nvSpPr>
+              <p:spPr>
+                <a:xfrm>
+                  <a:off x="4635812" y="1260776"/>
+                  <a:ext cx="869957" cy="869957"/>
+                </a:xfrm>
+                <a:custGeom>
+                  <a:avLst/>
+                  <a:gdLst>
+                    <a:gd name="connsiteX0" fmla="*/ 869957 w 869957"/>
+                    <a:gd name="connsiteY0" fmla="*/ 434979 h 869957"/>
+                    <a:gd name="connsiteX1" fmla="*/ 434979 w 869957"/>
+                    <a:gd name="connsiteY1" fmla="*/ 869957 h 869957"/>
+                    <a:gd name="connsiteX2" fmla="*/ 0 w 869957"/>
+                    <a:gd name="connsiteY2" fmla="*/ 434979 h 869957"/>
+                    <a:gd name="connsiteX3" fmla="*/ 434979 w 869957"/>
+                    <a:gd name="connsiteY3" fmla="*/ 0 h 869957"/>
+                    <a:gd name="connsiteX4" fmla="*/ 869957 w 869957"/>
+                    <a:gd name="connsiteY4" fmla="*/ 434979 h 869957"/>
+                  </a:gdLst>
+                  <a:ahLst/>
+                  <a:cxnLst>
+                    <a:cxn ang="0">
+                      <a:pos x="connsiteX0" y="connsiteY0"/>
+                    </a:cxn>
+                    <a:cxn ang="0">
+                      <a:pos x="connsiteX1" y="connsiteY1"/>
+                    </a:cxn>
+                    <a:cxn ang="0">
+                      <a:pos x="connsiteX2" y="connsiteY2"/>
+                    </a:cxn>
+                    <a:cxn ang="0">
+                      <a:pos x="connsiteX3" y="connsiteY3"/>
+                    </a:cxn>
+                    <a:cxn ang="0">
+                      <a:pos x="connsiteX4" y="connsiteY4"/>
+                    </a:cxn>
+                  </a:cxnLst>
+                  <a:rect l="l" t="t" r="r" b="b"/>
+                  <a:pathLst>
+                    <a:path w="869957" h="869957">
+                      <a:moveTo>
+                        <a:pt x="869957" y="434979"/>
+                      </a:moveTo>
+                      <a:cubicBezTo>
+                        <a:pt x="869957" y="675211"/>
+                        <a:pt x="675211" y="869957"/>
+                        <a:pt x="434979" y="869957"/>
+                      </a:cubicBezTo>
+                      <a:cubicBezTo>
+                        <a:pt x="194746" y="869957"/>
+                        <a:pt x="0" y="675211"/>
+                        <a:pt x="0" y="434979"/>
+                      </a:cubicBezTo>
+                      <a:cubicBezTo>
+                        <a:pt x="0" y="194747"/>
+                        <a:pt x="194746" y="0"/>
+                        <a:pt x="434979" y="0"/>
+                      </a:cubicBezTo>
+                      <a:cubicBezTo>
+                        <a:pt x="675211" y="0"/>
+                        <a:pt x="869957" y="194747"/>
+                        <a:pt x="869957" y="434979"/>
+                      </a:cubicBezTo>
+                      <a:close/>
+                    </a:path>
+                  </a:pathLst>
+                </a:custGeom>
+                <a:grpFill/>
+                <a:ln w="93785" cap="flat">
+                  <a:noFill/>
+                  <a:prstDash val="solid"/>
+                  <a:miter/>
+                </a:ln>
+                <a:effectLst>
+                  <a:outerShdw blurRad="190500" dist="228600" dir="2700000" algn="ctr">
+                    <a:srgbClr val="000000">
+                      <a:alpha val="30000"/>
+                    </a:srgbClr>
+                  </a:outerShdw>
+                </a:effectLst>
+                <a:sp3d prstMaterial="matte">
+                  <a:bevelT w="127000" h="63500"/>
+                </a:sp3d>
+              </p:spPr>
+              <p:txBody>
+                <a:bodyPr rtlCol="0" anchor="ctr"/>
+                <a:lstStyle/>
+                <a:p>
+                  <a:endParaRPr lang="en-US"/>
+                </a:p>
+              </p:txBody>
+            </p:sp>
+            <p:sp>
+              <p:nvSpPr>
+                <p:cNvPr id="8" name="Freeform: Shape 7">
+                  <a:extLst>
+                    <a:ext uri="{FF2B5EF4-FFF2-40B4-BE49-F238E27FC236}">
+                      <a16:creationId xmlns:a16="http://schemas.microsoft.com/office/drawing/2014/main" id="{03935BF2-201A-747D-330B-028C0C97D943}"/>
+                    </a:ext>
+                  </a:extLst>
+                </p:cNvPr>
+                <p:cNvSpPr/>
+                <p:nvPr/>
+              </p:nvSpPr>
+              <p:spPr>
+                <a:xfrm>
+                  <a:off x="4113275" y="2147438"/>
+                  <a:ext cx="306127" cy="306127"/>
+                </a:xfrm>
+                <a:custGeom>
+                  <a:avLst/>
+                  <a:gdLst>
+                    <a:gd name="connsiteX0" fmla="*/ 306127 w 306127"/>
+                    <a:gd name="connsiteY0" fmla="*/ 153064 h 306127"/>
+                    <a:gd name="connsiteX1" fmla="*/ 153064 w 306127"/>
+                    <a:gd name="connsiteY1" fmla="*/ 306127 h 306127"/>
+                    <a:gd name="connsiteX2" fmla="*/ 0 w 306127"/>
+                    <a:gd name="connsiteY2" fmla="*/ 153064 h 306127"/>
+                    <a:gd name="connsiteX3" fmla="*/ 153064 w 306127"/>
+                    <a:gd name="connsiteY3" fmla="*/ 0 h 306127"/>
+                    <a:gd name="connsiteX4" fmla="*/ 306127 w 306127"/>
+                    <a:gd name="connsiteY4" fmla="*/ 153064 h 306127"/>
+                  </a:gdLst>
+                  <a:ahLst/>
+                  <a:cxnLst>
+                    <a:cxn ang="0">
+                      <a:pos x="connsiteX0" y="connsiteY0"/>
+                    </a:cxn>
+                    <a:cxn ang="0">
+                      <a:pos x="connsiteX1" y="connsiteY1"/>
+                    </a:cxn>
+                    <a:cxn ang="0">
+                      <a:pos x="connsiteX2" y="connsiteY2"/>
+                    </a:cxn>
+                    <a:cxn ang="0">
+                      <a:pos x="connsiteX3" y="connsiteY3"/>
+                    </a:cxn>
+                    <a:cxn ang="0">
+                      <a:pos x="connsiteX4" y="connsiteY4"/>
+                    </a:cxn>
+                  </a:cxnLst>
+                  <a:rect l="l" t="t" r="r" b="b"/>
+                  <a:pathLst>
+                    <a:path w="306127" h="306127">
+                      <a:moveTo>
+                        <a:pt x="306127" y="153064"/>
+                      </a:moveTo>
+                      <a:cubicBezTo>
+                        <a:pt x="306127" y="237598"/>
+                        <a:pt x="237598" y="306127"/>
+                        <a:pt x="153064" y="306127"/>
+                      </a:cubicBezTo>
+                      <a:cubicBezTo>
+                        <a:pt x="68529" y="306127"/>
+                        <a:pt x="0" y="237599"/>
+                        <a:pt x="0" y="153064"/>
+                      </a:cubicBezTo>
+                      <a:cubicBezTo>
+                        <a:pt x="0" y="68529"/>
+                        <a:pt x="68529" y="0"/>
+                        <a:pt x="153064" y="0"/>
+                      </a:cubicBezTo>
+                      <a:cubicBezTo>
+                        <a:pt x="237599" y="0"/>
+                        <a:pt x="306127" y="68529"/>
+                        <a:pt x="306127" y="153064"/>
+                      </a:cubicBezTo>
+                      <a:close/>
+                    </a:path>
+                  </a:pathLst>
+                </a:custGeom>
+                <a:grpFill/>
+                <a:ln w="93785" cap="flat">
+                  <a:noFill/>
+                  <a:prstDash val="solid"/>
+                  <a:miter/>
+                </a:ln>
+                <a:effectLst>
+                  <a:outerShdw blurRad="190500" dist="228600" dir="2700000" algn="ctr">
+                    <a:srgbClr val="000000">
+                      <a:alpha val="30000"/>
+                    </a:srgbClr>
+                  </a:outerShdw>
+                </a:effectLst>
+                <a:sp3d prstMaterial="matte">
+                  <a:bevelT w="127000" h="63500"/>
+                </a:sp3d>
+              </p:spPr>
+              <p:txBody>
+                <a:bodyPr rtlCol="0" anchor="ctr"/>
+                <a:lstStyle/>
+                <a:p>
+                  <a:endParaRPr lang="en-US"/>
+                </a:p>
+              </p:txBody>
+            </p:sp>
+          </p:grpSp>
+        </p:grpSp>
+        <p:grpSp>
+          <p:nvGrpSpPr>
+            <p:cNvPr id="21" name="Group 20">
+              <a:extLst>
+                <a:ext uri="{FF2B5EF4-FFF2-40B4-BE49-F238E27FC236}">
+                  <a16:creationId xmlns:a16="http://schemas.microsoft.com/office/drawing/2014/main" id="{9161DDA9-CF54-7A22-F2D1-5F5CD47E641A}"/>
+                </a:ext>
+              </a:extLst>
+            </p:cNvPr>
+            <p:cNvGrpSpPr/>
+            <p:nvPr/>
+          </p:nvGrpSpPr>
+          <p:grpSpPr>
+            <a:xfrm>
+              <a:off x="5465342" y="2775955"/>
+              <a:ext cx="3764172" cy="1420390"/>
+              <a:chOff x="4166720" y="1481982"/>
+              <a:chExt cx="3941939" cy="1487469"/>
+            </a:xfrm>
+          </p:grpSpPr>
+          <p:grpSp>
+            <p:nvGrpSpPr>
+              <p:cNvPr id="19" name="Group 18">
+                <a:extLst>
+                  <a:ext uri="{FF2B5EF4-FFF2-40B4-BE49-F238E27FC236}">
+                    <a16:creationId xmlns:a16="http://schemas.microsoft.com/office/drawing/2014/main" id="{4D5A5288-75E0-9D43-D989-8448C3DB7890}"/>
+                  </a:ext>
+                </a:extLst>
+              </p:cNvPr>
+              <p:cNvGrpSpPr/>
+              <p:nvPr/>
+            </p:nvGrpSpPr>
+            <p:grpSpPr>
+              <a:xfrm>
+                <a:off x="4239903" y="1481982"/>
+                <a:ext cx="3764172" cy="885207"/>
+                <a:chOff x="3117176" y="1605518"/>
+                <a:chExt cx="5733565" cy="1402894"/>
+              </a:xfrm>
+              <a:solidFill>
+                <a:schemeClr val="tx1">
+                  <a:lumMod val="75000"/>
+                  <a:lumOff val="25000"/>
+                </a:schemeClr>
+              </a:solidFill>
+              <a:scene3d>
+                <a:camera prst="orthographicFront">
+                  <a:rot lat="0" lon="0" rev="0"/>
+                </a:camera>
+                <a:lightRig rig="balanced" dir="t">
+                  <a:rot lat="0" lon="0" rev="8700000"/>
+                </a:lightRig>
+              </a:scene3d>
+            </p:grpSpPr>
+            <p:sp>
+              <p:nvSpPr>
+                <p:cNvPr id="14" name="Freeform: Shape 13">
+                  <a:extLst>
+                    <a:ext uri="{FF2B5EF4-FFF2-40B4-BE49-F238E27FC236}">
+                      <a16:creationId xmlns:a16="http://schemas.microsoft.com/office/drawing/2014/main" id="{1A974BDA-B27E-A5CE-3AB3-36070133F305}"/>
+                    </a:ext>
+                  </a:extLst>
+                </p:cNvPr>
+                <p:cNvSpPr/>
+                <p:nvPr/>
+              </p:nvSpPr>
+              <p:spPr>
+                <a:xfrm>
+                  <a:off x="3117176" y="1605518"/>
+                  <a:ext cx="1915806" cy="1402894"/>
+                </a:xfrm>
+                <a:custGeom>
+                  <a:avLst/>
+                  <a:gdLst/>
+                  <a:ahLst/>
+                  <a:cxnLst/>
+                  <a:rect l="l" t="t" r="r" b="b"/>
+                  <a:pathLst>
+                    <a:path w="1915806" h="1098823">
+                      <a:moveTo>
+                        <a:pt x="418245" y="0"/>
+                      </a:moveTo>
+                      <a:lnTo>
+                        <a:pt x="590035" y="0"/>
+                      </a:lnTo>
+                      <a:lnTo>
+                        <a:pt x="354634" y="770439"/>
+                      </a:lnTo>
+                      <a:lnTo>
+                        <a:pt x="1353994" y="770439"/>
+                      </a:lnTo>
+                      <a:lnTo>
+                        <a:pt x="1546867" y="143010"/>
+                      </a:lnTo>
+                      <a:cubicBezTo>
+                        <a:pt x="1558291" y="101546"/>
+                        <a:pt x="1582477" y="67344"/>
+                        <a:pt x="1619425" y="40407"/>
+                      </a:cubicBezTo>
+                      <a:cubicBezTo>
+                        <a:pt x="1656373" y="13469"/>
+                        <a:pt x="1697892" y="0"/>
+                        <a:pt x="1743983" y="0"/>
+                      </a:cubicBezTo>
+                      <a:lnTo>
+                        <a:pt x="1915806" y="0"/>
+                      </a:lnTo>
+                      <a:lnTo>
+                        <a:pt x="1586040" y="1098823"/>
+                      </a:lnTo>
+                      <a:lnTo>
+                        <a:pt x="207611" y="1098823"/>
+                      </a:lnTo>
+                      <a:cubicBezTo>
+                        <a:pt x="172286" y="1098823"/>
+                        <a:pt x="140086" y="1091176"/>
+                        <a:pt x="111010" y="1075882"/>
+                      </a:cubicBezTo>
+                      <a:cubicBezTo>
+                        <a:pt x="81934" y="1060587"/>
+                        <a:pt x="58198" y="1040299"/>
+                        <a:pt x="39801" y="1015017"/>
+                      </a:cubicBezTo>
+                      <a:cubicBezTo>
+                        <a:pt x="21404" y="989735"/>
+                        <a:pt x="9256" y="961443"/>
+                        <a:pt x="3358" y="930142"/>
+                      </a:cubicBezTo>
+                      <a:cubicBezTo>
+                        <a:pt x="-2541" y="898840"/>
+                        <a:pt x="-666" y="872665"/>
+                        <a:pt x="8982" y="851614"/>
+                      </a:cubicBezTo>
+                      <a:lnTo>
+                        <a:pt x="221162" y="142780"/>
+                      </a:lnTo>
+                      <a:cubicBezTo>
+                        <a:pt x="232564" y="101425"/>
+                        <a:pt x="256728" y="67290"/>
+                        <a:pt x="293654" y="40374"/>
+                      </a:cubicBezTo>
+                      <a:cubicBezTo>
+                        <a:pt x="330579" y="13458"/>
+                        <a:pt x="372110" y="0"/>
+                        <a:pt x="418245" y="0"/>
+                      </a:cubicBezTo>
+                      <a:close/>
+                    </a:path>
+                  </a:pathLst>
+                </a:custGeom>
+                <a:grpFill/>
+                <a:ln w="0">
+                  <a:noFill/>
+                </a:ln>
+                <a:effectLst>
+                  <a:outerShdw blurRad="44450" dist="27940" dir="5400000" algn="ctr">
+                    <a:srgbClr val="000000">
+                      <a:alpha val="32000"/>
+                    </a:srgbClr>
+                  </a:outerShdw>
+                </a:effectLst>
+                <a:sp3d>
+                  <a:bevelT w="190500" h="38100"/>
+                </a:sp3d>
+              </p:spPr>
+              <p:txBody>
+                <a:bodyPr rot="0" spcFirstLastPara="0" vertOverflow="overflow" horzOverflow="overflow" vert="horz" wrap="square" lIns="91440" tIns="45720" rIns="91440" bIns="45720" numCol="1" spcCol="0" rtlCol="0" fromWordArt="0" anchor="t" anchorCtr="0" forceAA="0" compatLnSpc="1">
+                  <a:prstTxWarp prst="textNoShape">
+                    <a:avLst/>
+                  </a:prstTxWarp>
+                  <a:noAutofit/>
+                </a:bodyPr>
+                <a:lstStyle/>
+                <a:p>
+                  <a:endParaRPr lang="en-US" sz="16600" b="1" cap="none" spc="0" dirty="0">
+                    <a:ln w="0"/>
+                    <a:solidFill>
+                      <a:schemeClr val="tx1"/>
+                    </a:solidFill>
+                    <a:latin typeface="Siegra" pitchFamily="2" charset="0"/>
+                  </a:endParaRPr>
+                </a:p>
+              </p:txBody>
+            </p:sp>
+            <p:sp>
+              <p:nvSpPr>
+                <p:cNvPr id="17" name="Freeform: Shape 16">
+                  <a:extLst>
+                    <a:ext uri="{FF2B5EF4-FFF2-40B4-BE49-F238E27FC236}">
+                      <a16:creationId xmlns:a16="http://schemas.microsoft.com/office/drawing/2014/main" id="{DE58A1BC-F2F5-BA05-22E0-B658976DB259}"/>
+                    </a:ext>
+                  </a:extLst>
+                </p:cNvPr>
+                <p:cNvSpPr/>
+                <p:nvPr/>
+              </p:nvSpPr>
+              <p:spPr>
+                <a:xfrm>
+                  <a:off x="5032982" y="1624473"/>
+                  <a:ext cx="1981158" cy="1364983"/>
+                </a:xfrm>
+                <a:custGeom>
+                  <a:avLst/>
+                  <a:gdLst/>
+                  <a:ahLst/>
+                  <a:cxnLst/>
+                  <a:rect l="l" t="t" r="r" b="b"/>
+                  <a:pathLst>
+                    <a:path w="1981158" h="1098823">
+                      <a:moveTo>
+                        <a:pt x="613714" y="328384"/>
+                      </a:moveTo>
+                      <a:cubicBezTo>
+                        <a:pt x="597970" y="328384"/>
+                        <a:pt x="583903" y="333235"/>
+                        <a:pt x="571515" y="342938"/>
+                      </a:cubicBezTo>
+                      <a:cubicBezTo>
+                        <a:pt x="559126" y="352641"/>
+                        <a:pt x="550212" y="365145"/>
+                        <a:pt x="544774" y="380451"/>
+                      </a:cubicBezTo>
+                      <a:lnTo>
+                        <a:pt x="492280" y="530466"/>
+                      </a:lnTo>
+                      <a:lnTo>
+                        <a:pt x="1491641" y="530466"/>
+                      </a:lnTo>
+                      <a:lnTo>
+                        <a:pt x="1561172" y="328384"/>
+                      </a:lnTo>
+                      <a:close/>
+                      <a:moveTo>
+                        <a:pt x="588947" y="0"/>
+                      </a:moveTo>
+                      <a:lnTo>
+                        <a:pt x="1981158" y="0"/>
+                      </a:lnTo>
+                      <a:lnTo>
+                        <a:pt x="1694348" y="954695"/>
+                      </a:lnTo>
+                      <a:cubicBezTo>
+                        <a:pt x="1682661" y="997080"/>
+                        <a:pt x="1658393" y="1031698"/>
+                        <a:pt x="1621544" y="1058548"/>
+                      </a:cubicBezTo>
+                      <a:cubicBezTo>
+                        <a:pt x="1584695" y="1085398"/>
+                        <a:pt x="1543367" y="1098823"/>
+                        <a:pt x="1497561" y="1098823"/>
+                      </a:cubicBezTo>
+                      <a:lnTo>
+                        <a:pt x="1325738" y="1098823"/>
+                      </a:lnTo>
+                      <a:lnTo>
+                        <a:pt x="1398033" y="858850"/>
+                      </a:lnTo>
+                      <a:lnTo>
+                        <a:pt x="397949" y="858850"/>
+                      </a:lnTo>
+                      <a:lnTo>
+                        <a:pt x="368610" y="954464"/>
+                      </a:lnTo>
+                      <a:cubicBezTo>
+                        <a:pt x="356901" y="996872"/>
+                        <a:pt x="332622" y="1031534"/>
+                        <a:pt x="295773" y="1058449"/>
+                      </a:cubicBezTo>
+                      <a:cubicBezTo>
+                        <a:pt x="258924" y="1085365"/>
+                        <a:pt x="217596" y="1098823"/>
+                        <a:pt x="171790" y="1098823"/>
+                      </a:cubicBezTo>
+                      <a:lnTo>
+                        <a:pt x="0" y="1098823"/>
+                      </a:lnTo>
+                      <a:lnTo>
+                        <a:pt x="252603" y="248919"/>
+                      </a:lnTo>
+                      <a:cubicBezTo>
+                        <a:pt x="264159" y="211380"/>
+                        <a:pt x="280791" y="177420"/>
+                        <a:pt x="302499" y="147039"/>
+                      </a:cubicBezTo>
+                      <a:cubicBezTo>
+                        <a:pt x="324207" y="116659"/>
+                        <a:pt x="349676" y="90516"/>
+                        <a:pt x="378905" y="68611"/>
+                      </a:cubicBezTo>
+                      <a:cubicBezTo>
+                        <a:pt x="408134" y="46705"/>
+                        <a:pt x="441008" y="29794"/>
+                        <a:pt x="477528" y="17876"/>
+                      </a:cubicBezTo>
+                      <a:cubicBezTo>
+                        <a:pt x="514048" y="5959"/>
+                        <a:pt x="551188" y="0"/>
+                        <a:pt x="588947" y="0"/>
+                      </a:cubicBezTo>
+                      <a:close/>
+                    </a:path>
+                  </a:pathLst>
+                </a:custGeom>
+                <a:grpFill/>
+                <a:ln w="0">
+                  <a:noFill/>
+                </a:ln>
+                <a:effectLst>
+                  <a:outerShdw blurRad="44450" dist="27940" dir="5400000" algn="ctr">
+                    <a:srgbClr val="000000">
+                      <a:alpha val="32000"/>
+                    </a:srgbClr>
+                  </a:outerShdw>
+                </a:effectLst>
+                <a:sp3d>
+                  <a:bevelT w="190500" h="38100"/>
+                </a:sp3d>
+              </p:spPr>
+              <p:txBody>
+                <a:bodyPr rot="0" spcFirstLastPara="0" vertOverflow="overflow" horzOverflow="overflow" vert="horz" wrap="square" lIns="91440" tIns="45720" rIns="91440" bIns="45720" numCol="1" spcCol="0" rtlCol="0" fromWordArt="0" anchor="t" anchorCtr="0" forceAA="0" compatLnSpc="1">
+                  <a:prstTxWarp prst="textNoShape">
+                    <a:avLst/>
+                  </a:prstTxWarp>
+                  <a:noAutofit/>
+                </a:bodyPr>
+                <a:lstStyle/>
+                <a:p>
+                  <a:endParaRPr lang="en-US" sz="16600" b="1" cap="none" spc="0" dirty="0">
+                    <a:ln w="0"/>
+                    <a:solidFill>
+                      <a:schemeClr val="tx1"/>
+                    </a:solidFill>
+                    <a:latin typeface="Siegra" pitchFamily="2" charset="0"/>
+                  </a:endParaRPr>
+                </a:p>
+              </p:txBody>
+            </p:sp>
+            <p:sp>
+              <p:nvSpPr>
+                <p:cNvPr id="18" name="Freeform: Shape 17">
+                  <a:extLst>
+                    <a:ext uri="{FF2B5EF4-FFF2-40B4-BE49-F238E27FC236}">
+                      <a16:creationId xmlns:a16="http://schemas.microsoft.com/office/drawing/2014/main" id="{80BA3F4C-7A2D-AFAD-C812-69D0393D61A4}"/>
+                    </a:ext>
+                  </a:extLst>
+                </p:cNvPr>
+                <p:cNvSpPr/>
+                <p:nvPr/>
+              </p:nvSpPr>
+              <p:spPr>
+                <a:xfrm>
+                  <a:off x="7014140" y="1643428"/>
+                  <a:ext cx="1836601" cy="1364984"/>
+                </a:xfrm>
+                <a:custGeom>
+                  <a:avLst/>
+                  <a:gdLst/>
+                  <a:ahLst/>
+                  <a:cxnLst/>
+                  <a:rect l="l" t="t" r="r" b="b"/>
+                  <a:pathLst>
+                    <a:path w="1836601" h="1098823">
+                      <a:moveTo>
+                        <a:pt x="526980" y="0"/>
+                      </a:moveTo>
+                      <a:lnTo>
+                        <a:pt x="1836601" y="0"/>
+                      </a:lnTo>
+                      <a:lnTo>
+                        <a:pt x="1784535" y="188893"/>
+                      </a:lnTo>
+                      <a:cubicBezTo>
+                        <a:pt x="1773221" y="229854"/>
+                        <a:pt x="1749150" y="263342"/>
+                        <a:pt x="1712323" y="289359"/>
+                      </a:cubicBezTo>
+                      <a:cubicBezTo>
+                        <a:pt x="1675496" y="315376"/>
+                        <a:pt x="1634190" y="328384"/>
+                        <a:pt x="1588406" y="328384"/>
+                      </a:cubicBezTo>
+                      <a:lnTo>
+                        <a:pt x="561121" y="328384"/>
+                      </a:lnTo>
+                      <a:lnTo>
+                        <a:pt x="537702" y="383115"/>
+                      </a:lnTo>
+                      <a:lnTo>
+                        <a:pt x="1718917" y="383115"/>
+                      </a:lnTo>
+                      <a:lnTo>
+                        <a:pt x="1666851" y="572008"/>
+                      </a:lnTo>
+                      <a:cubicBezTo>
+                        <a:pt x="1655537" y="612968"/>
+                        <a:pt x="1631460" y="646457"/>
+                        <a:pt x="1594622" y="672473"/>
+                      </a:cubicBezTo>
+                      <a:cubicBezTo>
+                        <a:pt x="1557784" y="698490"/>
+                        <a:pt x="1516473" y="711499"/>
+                        <a:pt x="1470689" y="711499"/>
+                      </a:cubicBezTo>
+                      <a:lnTo>
+                        <a:pt x="443503" y="711499"/>
+                      </a:lnTo>
+                      <a:lnTo>
+                        <a:pt x="419985" y="770439"/>
+                      </a:lnTo>
+                      <a:lnTo>
+                        <a:pt x="1601200" y="770439"/>
+                      </a:lnTo>
+                      <a:lnTo>
+                        <a:pt x="1549299" y="956767"/>
+                      </a:lnTo>
+                      <a:cubicBezTo>
+                        <a:pt x="1537940" y="997859"/>
+                        <a:pt x="1513831" y="1031808"/>
+                        <a:pt x="1476971" y="1058614"/>
+                      </a:cubicBezTo>
+                      <a:cubicBezTo>
+                        <a:pt x="1440111" y="1085420"/>
+                        <a:pt x="1398789" y="1098823"/>
+                        <a:pt x="1353005" y="1098823"/>
+                      </a:cubicBezTo>
+                      <a:lnTo>
+                        <a:pt x="0" y="1098823"/>
+                      </a:lnTo>
+                      <a:lnTo>
+                        <a:pt x="272897" y="183466"/>
+                      </a:lnTo>
+                      <a:cubicBezTo>
+                        <a:pt x="287939" y="131476"/>
+                        <a:pt x="319416" y="87901"/>
+                        <a:pt x="367327" y="52741"/>
+                      </a:cubicBezTo>
+                      <a:cubicBezTo>
+                        <a:pt x="415238" y="17580"/>
+                        <a:pt x="468456" y="0"/>
+                        <a:pt x="526980" y="0"/>
+                      </a:cubicBezTo>
+                      <a:close/>
+                    </a:path>
+                  </a:pathLst>
+                </a:custGeom>
+                <a:grpFill/>
+                <a:ln w="0">
+                  <a:noFill/>
+                </a:ln>
+                <a:effectLst>
+                  <a:outerShdw blurRad="44450" dist="27940" dir="5400000" algn="ctr">
+                    <a:srgbClr val="000000">
+                      <a:alpha val="32000"/>
+                    </a:srgbClr>
+                  </a:outerShdw>
+                </a:effectLst>
+                <a:sp3d>
+                  <a:bevelT w="190500" h="38100"/>
+                </a:sp3d>
+              </p:spPr>
+              <p:txBody>
+                <a:bodyPr rot="0" spcFirstLastPara="0" vertOverflow="overflow" horzOverflow="overflow" vert="horz" wrap="square" lIns="91440" tIns="45720" rIns="91440" bIns="45720" numCol="1" spcCol="0" rtlCol="0" fromWordArt="0" anchor="t" anchorCtr="0" forceAA="0" compatLnSpc="1">
+                  <a:prstTxWarp prst="textNoShape">
+                    <a:avLst/>
+                  </a:prstTxWarp>
+                  <a:noAutofit/>
+                </a:bodyPr>
+                <a:lstStyle/>
+                <a:p>
+                  <a:endParaRPr lang="en-US" sz="16600" b="1" cap="none" spc="0" dirty="0">
+                    <a:ln w="0"/>
+                    <a:solidFill>
+                      <a:schemeClr val="tx1"/>
+                    </a:solidFill>
+                    <a:latin typeface="Siegra" pitchFamily="2" charset="0"/>
+                  </a:endParaRPr>
+                </a:p>
+              </p:txBody>
+            </p:sp>
+          </p:grpSp>
+          <p:sp>
+            <p:nvSpPr>
+              <p:cNvPr id="20" name="Rectangle 19">
+                <a:extLst>
+                  <a:ext uri="{FF2B5EF4-FFF2-40B4-BE49-F238E27FC236}">
+                    <a16:creationId xmlns:a16="http://schemas.microsoft.com/office/drawing/2014/main" id="{CD583955-1750-7BFF-835D-73FED06C0994}"/>
+                  </a:ext>
+                </a:extLst>
+              </p:cNvPr>
+              <p:cNvSpPr/>
+              <p:nvPr/>
+            </p:nvSpPr>
+            <p:spPr>
+              <a:xfrm>
+                <a:off x="4166720" y="2485983"/>
+                <a:ext cx="3941939" cy="483468"/>
+              </a:xfrm>
+              <a:prstGeom prst="rect">
+                <a:avLst/>
+              </a:prstGeom>
+              <a:noFill/>
+            </p:spPr>
+            <p:txBody>
+              <a:bodyPr wrap="none" lIns="91440" tIns="45720" rIns="91440" bIns="45720">
+                <a:spAutoFit/>
+              </a:bodyPr>
+              <a:lstStyle/>
+              <a:p>
+                <a:r>
+                  <a:rPr lang="en-US" sz="2400" b="0" cap="none" spc="300" dirty="0">
+                    <a:ln w="0"/>
+                    <a:solidFill>
+                      <a:schemeClr val="tx1">
+                        <a:lumMod val="50000"/>
+                        <a:lumOff val="50000"/>
+                      </a:schemeClr>
+                    </a:solidFill>
+                    <a:latin typeface="Poppins" panose="00000500000000000000" pitchFamily="2" charset="0"/>
+                    <a:cs typeface="Poppins" panose="00000500000000000000" pitchFamily="2" charset="0"/>
+                  </a:rPr>
+                  <a:t>MOVERS &amp; PACKERS</a:t>
+                </a:r>
+              </a:p>
+            </p:txBody>
+          </p:sp>
+        </p:grpSp>
+      </p:grpSp>
+    </p:spTree>
+    <p:extLst>
+      <p:ext uri="{BB962C8B-B14F-4D97-AF65-F5344CB8AC3E}">
+        <p14:creationId xmlns:p14="http://schemas.microsoft.com/office/powerpoint/2010/main" val="35715218"/>
+      </p:ext>
+    </p:extLst>
+  </p:cSld>
+  <p:clrMapOvr>
+    <a:masterClrMapping/>
+  </p:clrMapOvr>
+</p:sld>
+</file>
+
 <file path=ppt/theme/theme1.xml><?xml version="1.0" encoding="utf-8"?>
 <a:theme xmlns:a="http://schemas.openxmlformats.org/drawingml/2006/main" name="Office Theme">
   <a:themeElements>

</xml_diff>

<commit_message>
all pages done with sitemap
</commit_message>
<xml_diff>
--- a/INFO/logo.pptx
+++ b/INFO/logo.pptx
@@ -8,6 +8,7 @@
     <p:sldId id="256" r:id="rId2"/>
     <p:sldId id="257" r:id="rId3"/>
     <p:sldId id="258" r:id="rId4"/>
+    <p:sldId id="259" r:id="rId5"/>
   </p:sldIdLst>
   <p:sldSz cx="12192000" cy="6858000"/>
   <p:notesSz cx="6858000" cy="9144000"/>
@@ -261,7 +262,7 @@
           <a:p>
             <a:fld id="{076E1BF0-C6F9-4EF4-BC39-1B1A74D6C01B}" type="datetimeFigureOut">
               <a:rPr lang="en-US" smtClean="0"/>
-              <a:t>12/29/2024</a:t>
+              <a:t>12/30/2024</a:t>
             </a:fld>
             <a:endParaRPr lang="en-US"/>
           </a:p>
@@ -459,7 +460,7 @@
           <a:p>
             <a:fld id="{076E1BF0-C6F9-4EF4-BC39-1B1A74D6C01B}" type="datetimeFigureOut">
               <a:rPr lang="en-US" smtClean="0"/>
-              <a:t>12/29/2024</a:t>
+              <a:t>12/30/2024</a:t>
             </a:fld>
             <a:endParaRPr lang="en-US"/>
           </a:p>
@@ -667,7 +668,7 @@
           <a:p>
             <a:fld id="{076E1BF0-C6F9-4EF4-BC39-1B1A74D6C01B}" type="datetimeFigureOut">
               <a:rPr lang="en-US" smtClean="0"/>
-              <a:t>12/29/2024</a:t>
+              <a:t>12/30/2024</a:t>
             </a:fld>
             <a:endParaRPr lang="en-US"/>
           </a:p>
@@ -865,7 +866,7 @@
           <a:p>
             <a:fld id="{076E1BF0-C6F9-4EF4-BC39-1B1A74D6C01B}" type="datetimeFigureOut">
               <a:rPr lang="en-US" smtClean="0"/>
-              <a:t>12/29/2024</a:t>
+              <a:t>12/30/2024</a:t>
             </a:fld>
             <a:endParaRPr lang="en-US"/>
           </a:p>
@@ -1140,7 +1141,7 @@
           <a:p>
             <a:fld id="{076E1BF0-C6F9-4EF4-BC39-1B1A74D6C01B}" type="datetimeFigureOut">
               <a:rPr lang="en-US" smtClean="0"/>
-              <a:t>12/29/2024</a:t>
+              <a:t>12/30/2024</a:t>
             </a:fld>
             <a:endParaRPr lang="en-US"/>
           </a:p>
@@ -1405,7 +1406,7 @@
           <a:p>
             <a:fld id="{076E1BF0-C6F9-4EF4-BC39-1B1A74D6C01B}" type="datetimeFigureOut">
               <a:rPr lang="en-US" smtClean="0"/>
-              <a:t>12/29/2024</a:t>
+              <a:t>12/30/2024</a:t>
             </a:fld>
             <a:endParaRPr lang="en-US"/>
           </a:p>
@@ -1817,7 +1818,7 @@
           <a:p>
             <a:fld id="{076E1BF0-C6F9-4EF4-BC39-1B1A74D6C01B}" type="datetimeFigureOut">
               <a:rPr lang="en-US" smtClean="0"/>
-              <a:t>12/29/2024</a:t>
+              <a:t>12/30/2024</a:t>
             </a:fld>
             <a:endParaRPr lang="en-US"/>
           </a:p>
@@ -1958,7 +1959,7 @@
           <a:p>
             <a:fld id="{076E1BF0-C6F9-4EF4-BC39-1B1A74D6C01B}" type="datetimeFigureOut">
               <a:rPr lang="en-US" smtClean="0"/>
-              <a:t>12/29/2024</a:t>
+              <a:t>12/30/2024</a:t>
             </a:fld>
             <a:endParaRPr lang="en-US"/>
           </a:p>
@@ -2071,7 +2072,7 @@
           <a:p>
             <a:fld id="{076E1BF0-C6F9-4EF4-BC39-1B1A74D6C01B}" type="datetimeFigureOut">
               <a:rPr lang="en-US" smtClean="0"/>
-              <a:t>12/29/2024</a:t>
+              <a:t>12/30/2024</a:t>
             </a:fld>
             <a:endParaRPr lang="en-US"/>
           </a:p>
@@ -2382,7 +2383,7 @@
           <a:p>
             <a:fld id="{076E1BF0-C6F9-4EF4-BC39-1B1A74D6C01B}" type="datetimeFigureOut">
               <a:rPr lang="en-US" smtClean="0"/>
-              <a:t>12/29/2024</a:t>
+              <a:t>12/30/2024</a:t>
             </a:fld>
             <a:endParaRPr lang="en-US"/>
           </a:p>
@@ -2670,7 +2671,7 @@
           <a:p>
             <a:fld id="{076E1BF0-C6F9-4EF4-BC39-1B1A74D6C01B}" type="datetimeFigureOut">
               <a:rPr lang="en-US" smtClean="0"/>
-              <a:t>12/29/2024</a:t>
+              <a:t>12/30/2024</a:t>
             </a:fld>
             <a:endParaRPr lang="en-US"/>
           </a:p>
@@ -2911,7 +2912,7 @@
           <a:p>
             <a:fld id="{076E1BF0-C6F9-4EF4-BC39-1B1A74D6C01B}" type="datetimeFigureOut">
               <a:rPr lang="en-US" smtClean="0"/>
-              <a:t>12/29/2024</a:t>
+              <a:t>12/30/2024</a:t>
             </a:fld>
             <a:endParaRPr lang="en-US"/>
           </a:p>
@@ -8087,10 +8088,10 @@
       </p:grpSpPr>
       <p:grpSp>
         <p:nvGrpSpPr>
-          <p:cNvPr id="24" name="Group 23">
+          <p:cNvPr id="10" name="Group 9">
             <a:extLst>
               <a:ext uri="{FF2B5EF4-FFF2-40B4-BE49-F238E27FC236}">
-                <a16:creationId xmlns:a16="http://schemas.microsoft.com/office/drawing/2014/main" id="{DE9ED42A-A4F6-7523-13A3-2251248F9F80}"/>
+                <a16:creationId xmlns:a16="http://schemas.microsoft.com/office/drawing/2014/main" id="{7F1F3AA1-53C0-D4B4-13F2-8C70B0692492}"/>
               </a:ext>
             </a:extLst>
           </p:cNvPr>
@@ -8099,18 +8100,93 @@
         </p:nvGrpSpPr>
         <p:grpSpPr>
           <a:xfrm>
-            <a:off x="2962486" y="2437430"/>
-            <a:ext cx="6267028" cy="1983141"/>
-            <a:chOff x="2962486" y="2437430"/>
-            <a:chExt cx="6267028" cy="1983141"/>
+            <a:off x="2614757" y="1896517"/>
+            <a:ext cx="2255205" cy="1983141"/>
+            <a:chOff x="315585" y="1581059"/>
+            <a:chExt cx="3473411" cy="3090930"/>
           </a:xfrm>
         </p:grpSpPr>
+        <p:sp>
+          <p:nvSpPr>
+            <p:cNvPr id="2" name="Oval 1">
+              <a:extLst>
+                <a:ext uri="{FF2B5EF4-FFF2-40B4-BE49-F238E27FC236}">
+                  <a16:creationId xmlns:a16="http://schemas.microsoft.com/office/drawing/2014/main" id="{88A7FCBD-1769-1724-57D4-971B80D5C49A}"/>
+                </a:ext>
+              </a:extLst>
+            </p:cNvPr>
+            <p:cNvSpPr/>
+            <p:nvPr/>
+          </p:nvSpPr>
+          <p:spPr>
+            <a:xfrm>
+              <a:off x="698066" y="1581059"/>
+              <a:ext cx="3090930" cy="3090930"/>
+            </a:xfrm>
+            <a:prstGeom prst="ellipse">
+              <a:avLst/>
+            </a:prstGeom>
+            <a:gradFill flip="none" rotWithShape="1">
+              <a:gsLst>
+                <a:gs pos="0">
+                  <a:srgbClr val="7030A0">
+                    <a:shade val="30000"/>
+                    <a:satMod val="115000"/>
+                  </a:srgbClr>
+                </a:gs>
+                <a:gs pos="50000">
+                  <a:srgbClr val="7030A0">
+                    <a:shade val="67500"/>
+                    <a:satMod val="115000"/>
+                  </a:srgbClr>
+                </a:gs>
+                <a:gs pos="100000">
+                  <a:srgbClr val="7030A0">
+                    <a:shade val="100000"/>
+                    <a:satMod val="115000"/>
+                  </a:srgbClr>
+                </a:gs>
+              </a:gsLst>
+              <a:path path="circle">
+                <a:fillToRect l="50000" t="50000" r="50000" b="50000"/>
+              </a:path>
+              <a:tileRect/>
+            </a:gradFill>
+            <a:ln>
+              <a:noFill/>
+            </a:ln>
+          </p:spPr>
+          <p:style>
+            <a:lnRef idx="2">
+              <a:schemeClr val="accent1">
+                <a:shade val="15000"/>
+              </a:schemeClr>
+            </a:lnRef>
+            <a:fillRef idx="1">
+              <a:schemeClr val="accent1"/>
+            </a:fillRef>
+            <a:effectRef idx="0">
+              <a:schemeClr val="accent1"/>
+            </a:effectRef>
+            <a:fontRef idx="minor">
+              <a:schemeClr val="lt1"/>
+            </a:fontRef>
+          </p:style>
+          <p:txBody>
+            <a:bodyPr rtlCol="0" anchor="ctr"/>
+            <a:lstStyle/>
+            <a:p>
+              <a:pPr algn="ctr"/>
+              <a:endParaRPr lang="en-US"/>
+            </a:p>
+          </p:txBody>
+        </p:sp>
         <p:grpSp>
           <p:nvGrpSpPr>
-            <p:cNvPr id="10" name="Group 9">
+            <p:cNvPr id="5" name="Graphic 3">
               <a:extLst>
                 <a:ext uri="{FF2B5EF4-FFF2-40B4-BE49-F238E27FC236}">
-                  <a16:creationId xmlns:a16="http://schemas.microsoft.com/office/drawing/2014/main" id="{7F1F3AA1-53C0-D4B4-13F2-8C70B0692492}"/>
+                  <a16:creationId xmlns:a16="http://schemas.microsoft.com/office/drawing/2014/main" id="{8159C5FE-C9E1-7030-605F-25A51788A175}"/>
                 </a:ext>
               </a:extLst>
             </p:cNvPr>
@@ -8118,19 +8194,30 @@
             <p:nvPr/>
           </p:nvGrpSpPr>
           <p:grpSpPr>
-            <a:xfrm>
-              <a:off x="2962486" y="2437430"/>
-              <a:ext cx="2255205" cy="1983141"/>
-              <a:chOff x="315585" y="1581059"/>
-              <a:chExt cx="3473411" cy="3090930"/>
+            <a:xfrm flipH="1">
+              <a:off x="315585" y="1901978"/>
+              <a:ext cx="3130178" cy="2449092"/>
+              <a:chOff x="3388232" y="998707"/>
+              <a:chExt cx="4849536" cy="3794340"/>
             </a:xfrm>
+            <a:solidFill>
+              <a:schemeClr val="bg1"/>
+            </a:solidFill>
+            <a:scene3d>
+              <a:camera prst="orthographicFront">
+                <a:rot lat="0" lon="0" rev="0"/>
+              </a:camera>
+              <a:lightRig rig="glow" dir="t">
+                <a:rot lat="0" lon="0" rev="4800000"/>
+              </a:lightRig>
+            </a:scene3d>
           </p:grpSpPr>
           <p:sp>
             <p:nvSpPr>
-              <p:cNvPr id="2" name="Oval 1">
+              <p:cNvPr id="6" name="Freeform: Shape 5">
                 <a:extLst>
                   <a:ext uri="{FF2B5EF4-FFF2-40B4-BE49-F238E27FC236}">
-                    <a16:creationId xmlns:a16="http://schemas.microsoft.com/office/drawing/2014/main" id="{88A7FCBD-1769-1724-57D4-971B80D5C49A}"/>
+                    <a16:creationId xmlns:a16="http://schemas.microsoft.com/office/drawing/2014/main" id="{13D0F2FE-6D4D-68A6-FDA2-B3C25B8DD859}"/>
                   </a:ext>
                 </a:extLst>
               </p:cNvPr>
@@ -8139,1124 +8226,328 @@
             </p:nvSpPr>
             <p:spPr>
               <a:xfrm>
-                <a:off x="698066" y="1581059"/>
-                <a:ext cx="3090930" cy="3090930"/>
+                <a:off x="3388232" y="998707"/>
+                <a:ext cx="4849536" cy="3794340"/>
               </a:xfrm>
-              <a:prstGeom prst="ellipse">
+              <a:custGeom>
                 <a:avLst/>
-              </a:prstGeom>
-              <a:gradFill flip="none" rotWithShape="1">
-                <a:gsLst>
-                  <a:gs pos="0">
-                    <a:srgbClr val="7030A0">
-                      <a:shade val="30000"/>
-                      <a:satMod val="115000"/>
-                    </a:srgbClr>
-                  </a:gs>
-                  <a:gs pos="50000">
-                    <a:srgbClr val="7030A0">
-                      <a:shade val="67500"/>
-                      <a:satMod val="115000"/>
-                    </a:srgbClr>
-                  </a:gs>
-                  <a:gs pos="100000">
-                    <a:srgbClr val="7030A0">
-                      <a:shade val="100000"/>
-                      <a:satMod val="115000"/>
-                    </a:srgbClr>
-                  </a:gs>
-                </a:gsLst>
-                <a:path path="circle">
-                  <a:fillToRect l="50000" t="50000" r="50000" b="50000"/>
-                </a:path>
-                <a:tileRect/>
-              </a:gradFill>
-              <a:ln>
+                <a:gdLst>
+                  <a:gd name="connsiteX0" fmla="*/ 4735387 w 4849536"/>
+                  <a:gd name="connsiteY0" fmla="*/ 3154702 h 3794340"/>
+                  <a:gd name="connsiteX1" fmla="*/ 3452693 w 4849536"/>
+                  <a:gd name="connsiteY1" fmla="*/ 1979180 h 3794340"/>
+                  <a:gd name="connsiteX2" fmla="*/ 3370202 w 4849536"/>
+                  <a:gd name="connsiteY2" fmla="*/ 1873133 h 3794340"/>
+                  <a:gd name="connsiteX3" fmla="*/ 2697697 w 4849536"/>
+                  <a:gd name="connsiteY3" fmla="*/ 1155395 h 3794340"/>
+                  <a:gd name="connsiteX4" fmla="*/ 3543912 w 4849536"/>
+                  <a:gd name="connsiteY4" fmla="*/ 400775 h 3794340"/>
+                  <a:gd name="connsiteX5" fmla="*/ 3202122 w 4849536"/>
+                  <a:gd name="connsiteY5" fmla="*/ 59080 h 3794340"/>
+                  <a:gd name="connsiteX6" fmla="*/ 2263751 w 4849536"/>
+                  <a:gd name="connsiteY6" fmla="*/ 903229 h 3794340"/>
+                  <a:gd name="connsiteX7" fmla="*/ 2051939 w 4849536"/>
+                  <a:gd name="connsiteY7" fmla="*/ 1006085 h 3794340"/>
+                  <a:gd name="connsiteX8" fmla="*/ 2014682 w 4849536"/>
+                  <a:gd name="connsiteY8" fmla="*/ 1050850 h 3794340"/>
+                  <a:gd name="connsiteX9" fmla="*/ 1906853 w 4849536"/>
+                  <a:gd name="connsiteY9" fmla="*/ 1252995 h 3794340"/>
+                  <a:gd name="connsiteX10" fmla="*/ 1788324 w 4849536"/>
+                  <a:gd name="connsiteY10" fmla="*/ 1773093 h 3794340"/>
+                  <a:gd name="connsiteX11" fmla="*/ 1278362 w 4849536"/>
+                  <a:gd name="connsiteY11" fmla="*/ 1793176 h 3794340"/>
+                  <a:gd name="connsiteX12" fmla="*/ 1040743 w 4849536"/>
+                  <a:gd name="connsiteY12" fmla="*/ 1862341 h 3794340"/>
+                  <a:gd name="connsiteX13" fmla="*/ 936385 w 4849536"/>
+                  <a:gd name="connsiteY13" fmla="*/ 1839255 h 3794340"/>
+                  <a:gd name="connsiteX14" fmla="*/ 605764 w 4849536"/>
+                  <a:gd name="connsiteY14" fmla="*/ 1428676 h 3794340"/>
+                  <a:gd name="connsiteX15" fmla="*/ 6648 w 4849536"/>
+                  <a:gd name="connsiteY15" fmla="*/ 1749725 h 3794340"/>
+                  <a:gd name="connsiteX16" fmla="*/ 424453 w 4849536"/>
+                  <a:gd name="connsiteY16" fmla="*/ 2251898 h 3794340"/>
+                  <a:gd name="connsiteX17" fmla="*/ 897064 w 4849536"/>
+                  <a:gd name="connsiteY17" fmla="*/ 2018220 h 3794340"/>
+                  <a:gd name="connsiteX18" fmla="*/ 979649 w 4849536"/>
+                  <a:gd name="connsiteY18" fmla="*/ 2036332 h 3794340"/>
+                  <a:gd name="connsiteX19" fmla="*/ 1150074 w 4849536"/>
+                  <a:gd name="connsiteY19" fmla="*/ 2259124 h 3794340"/>
+                  <a:gd name="connsiteX20" fmla="*/ 2080656 w 4849536"/>
+                  <a:gd name="connsiteY20" fmla="*/ 2156738 h 3794340"/>
+                  <a:gd name="connsiteX21" fmla="*/ 2316493 w 4849536"/>
+                  <a:gd name="connsiteY21" fmla="*/ 1818515 h 3794340"/>
+                  <a:gd name="connsiteX22" fmla="*/ 2782816 w 4849536"/>
+                  <a:gd name="connsiteY22" fmla="*/ 2315808 h 3794340"/>
+                  <a:gd name="connsiteX23" fmla="*/ 2173471 w 4849536"/>
+                  <a:gd name="connsiteY23" fmla="*/ 3492174 h 3794340"/>
+                  <a:gd name="connsiteX24" fmla="*/ 2639606 w 4849536"/>
+                  <a:gd name="connsiteY24" fmla="*/ 3620650 h 3794340"/>
+                  <a:gd name="connsiteX25" fmla="*/ 3321401 w 4849536"/>
+                  <a:gd name="connsiteY25" fmla="*/ 2547421 h 3794340"/>
+                  <a:gd name="connsiteX26" fmla="*/ 4491668 w 4849536"/>
+                  <a:gd name="connsiteY26" fmla="*/ 3571662 h 3794340"/>
+                  <a:gd name="connsiteX27" fmla="*/ 4735387 w 4849536"/>
+                  <a:gd name="connsiteY27" fmla="*/ 3154702 h 3794340"/>
+                </a:gdLst>
+                <a:ahLst/>
+                <a:cxnLst>
+                  <a:cxn ang="0">
+                    <a:pos x="connsiteX0" y="connsiteY0"/>
+                  </a:cxn>
+                  <a:cxn ang="0">
+                    <a:pos x="connsiteX1" y="connsiteY1"/>
+                  </a:cxn>
+                  <a:cxn ang="0">
+                    <a:pos x="connsiteX2" y="connsiteY2"/>
+                  </a:cxn>
+                  <a:cxn ang="0">
+                    <a:pos x="connsiteX3" y="connsiteY3"/>
+                  </a:cxn>
+                  <a:cxn ang="0">
+                    <a:pos x="connsiteX4" y="connsiteY4"/>
+                  </a:cxn>
+                  <a:cxn ang="0">
+                    <a:pos x="connsiteX5" y="connsiteY5"/>
+                  </a:cxn>
+                  <a:cxn ang="0">
+                    <a:pos x="connsiteX6" y="connsiteY6"/>
+                  </a:cxn>
+                  <a:cxn ang="0">
+                    <a:pos x="connsiteX7" y="connsiteY7"/>
+                  </a:cxn>
+                  <a:cxn ang="0">
+                    <a:pos x="connsiteX8" y="connsiteY8"/>
+                  </a:cxn>
+                  <a:cxn ang="0">
+                    <a:pos x="connsiteX9" y="connsiteY9"/>
+                  </a:cxn>
+                  <a:cxn ang="0">
+                    <a:pos x="connsiteX10" y="connsiteY10"/>
+                  </a:cxn>
+                  <a:cxn ang="0">
+                    <a:pos x="connsiteX11" y="connsiteY11"/>
+                  </a:cxn>
+                  <a:cxn ang="0">
+                    <a:pos x="connsiteX12" y="connsiteY12"/>
+                  </a:cxn>
+                  <a:cxn ang="0">
+                    <a:pos x="connsiteX13" y="connsiteY13"/>
+                  </a:cxn>
+                  <a:cxn ang="0">
+                    <a:pos x="connsiteX14" y="connsiteY14"/>
+                  </a:cxn>
+                  <a:cxn ang="0">
+                    <a:pos x="connsiteX15" y="connsiteY15"/>
+                  </a:cxn>
+                  <a:cxn ang="0">
+                    <a:pos x="connsiteX16" y="connsiteY16"/>
+                  </a:cxn>
+                  <a:cxn ang="0">
+                    <a:pos x="connsiteX17" y="connsiteY17"/>
+                  </a:cxn>
+                  <a:cxn ang="0">
+                    <a:pos x="connsiteX18" y="connsiteY18"/>
+                  </a:cxn>
+                  <a:cxn ang="0">
+                    <a:pos x="connsiteX19" y="connsiteY19"/>
+                  </a:cxn>
+                  <a:cxn ang="0">
+                    <a:pos x="connsiteX20" y="connsiteY20"/>
+                  </a:cxn>
+                  <a:cxn ang="0">
+                    <a:pos x="connsiteX21" y="connsiteY21"/>
+                  </a:cxn>
+                  <a:cxn ang="0">
+                    <a:pos x="connsiteX22" y="connsiteY22"/>
+                  </a:cxn>
+                  <a:cxn ang="0">
+                    <a:pos x="connsiteX23" y="connsiteY23"/>
+                  </a:cxn>
+                  <a:cxn ang="0">
+                    <a:pos x="connsiteX24" y="connsiteY24"/>
+                  </a:cxn>
+                  <a:cxn ang="0">
+                    <a:pos x="connsiteX25" y="connsiteY25"/>
+                  </a:cxn>
+                  <a:cxn ang="0">
+                    <a:pos x="connsiteX26" y="connsiteY26"/>
+                  </a:cxn>
+                  <a:cxn ang="0">
+                    <a:pos x="connsiteX27" y="connsiteY27"/>
+                  </a:cxn>
+                </a:cxnLst>
+                <a:rect l="l" t="t" r="r" b="b"/>
+                <a:pathLst>
+                  <a:path w="4849536" h="3794340">
+                    <a:moveTo>
+                      <a:pt x="4735387" y="3154702"/>
+                    </a:moveTo>
+                    <a:cubicBezTo>
+                      <a:pt x="4245602" y="2850639"/>
+                      <a:pt x="3842531" y="2406182"/>
+                      <a:pt x="3452693" y="1979180"/>
+                    </a:cubicBezTo>
+                    <a:cubicBezTo>
+                      <a:pt x="3434017" y="1942392"/>
+                      <a:pt x="3407271" y="1906730"/>
+                      <a:pt x="3370202" y="1873133"/>
+                    </a:cubicBezTo>
+                    <a:cubicBezTo>
+                      <a:pt x="3126201" y="1652406"/>
+                      <a:pt x="2912887" y="1403056"/>
+                      <a:pt x="2697697" y="1155395"/>
+                    </a:cubicBezTo>
+                    <a:cubicBezTo>
+                      <a:pt x="2970228" y="893375"/>
+                      <a:pt x="3251767" y="641210"/>
+                      <a:pt x="3543912" y="400775"/>
+                    </a:cubicBezTo>
+                    <a:cubicBezTo>
+                      <a:pt x="3784628" y="202477"/>
+                      <a:pt x="3440586" y="-137341"/>
+                      <a:pt x="3202122" y="59080"/>
+                    </a:cubicBezTo>
+                    <a:cubicBezTo>
+                      <a:pt x="2876756" y="326636"/>
+                      <a:pt x="2564998" y="608833"/>
+                      <a:pt x="2263751" y="903229"/>
+                    </a:cubicBezTo>
+                    <a:cubicBezTo>
+                      <a:pt x="2183888" y="914585"/>
+                      <a:pt x="2107309" y="949777"/>
+                      <a:pt x="2051939" y="1006085"/>
+                    </a:cubicBezTo>
+                    <a:cubicBezTo>
+                      <a:pt x="2037862" y="1020350"/>
+                      <a:pt x="2025756" y="1035459"/>
+                      <a:pt x="2014682" y="1050850"/>
+                    </a:cubicBezTo>
+                    <a:cubicBezTo>
+                      <a:pt x="1949740" y="1086981"/>
+                      <a:pt x="1903474" y="1154269"/>
+                      <a:pt x="1906853" y="1252995"/>
+                    </a:cubicBezTo>
+                    <a:cubicBezTo>
+                      <a:pt x="1912765" y="1425861"/>
+                      <a:pt x="1916706" y="1639080"/>
+                      <a:pt x="1788324" y="1773093"/>
+                    </a:cubicBezTo>
+                    <a:cubicBezTo>
+                      <a:pt x="1665385" y="1901569"/>
+                      <a:pt x="1422886" y="1834375"/>
+                      <a:pt x="1278362" y="1793176"/>
+                    </a:cubicBezTo>
+                    <a:cubicBezTo>
+                      <a:pt x="1175319" y="1763896"/>
+                      <a:pt x="1092734" y="1799558"/>
+                      <a:pt x="1040743" y="1862341"/>
+                    </a:cubicBezTo>
+                    <a:lnTo>
+                      <a:pt x="936385" y="1839255"/>
+                    </a:lnTo>
+                    <a:cubicBezTo>
+                      <a:pt x="936010" y="1645931"/>
+                      <a:pt x="802185" y="1471939"/>
+                      <a:pt x="605764" y="1428676"/>
+                    </a:cubicBezTo>
+                    <a:cubicBezTo>
+                      <a:pt x="378374" y="1378656"/>
+                      <a:pt x="56668" y="1522429"/>
+                      <a:pt x="6648" y="1749725"/>
+                    </a:cubicBezTo>
+                    <a:cubicBezTo>
+                      <a:pt x="-43279" y="1977021"/>
+                      <a:pt x="197062" y="2202066"/>
+                      <a:pt x="424453" y="2251898"/>
+                    </a:cubicBezTo>
+                    <a:cubicBezTo>
+                      <a:pt x="621061" y="2295161"/>
+                      <a:pt x="815605" y="2193432"/>
+                      <a:pt x="897064" y="2018220"/>
+                    </a:cubicBezTo>
+                    <a:lnTo>
+                      <a:pt x="979649" y="2036332"/>
+                    </a:lnTo>
+                    <a:cubicBezTo>
+                      <a:pt x="980024" y="2131868"/>
+                      <a:pt x="1031452" y="2225527"/>
+                      <a:pt x="1150074" y="2259124"/>
+                    </a:cubicBezTo>
+                    <a:cubicBezTo>
+                      <a:pt x="1464741" y="2348466"/>
+                      <a:pt x="1810566" y="2369300"/>
+                      <a:pt x="2080656" y="2156738"/>
+                    </a:cubicBezTo>
+                    <a:cubicBezTo>
+                      <a:pt x="2194211" y="2067302"/>
+                      <a:pt x="2268631" y="1949055"/>
+                      <a:pt x="2316493" y="1818515"/>
+                    </a:cubicBezTo>
+                    <a:cubicBezTo>
+                      <a:pt x="2466084" y="1989785"/>
+                      <a:pt x="2618209" y="2158708"/>
+                      <a:pt x="2782816" y="2315808"/>
+                    </a:cubicBezTo>
+                    <a:cubicBezTo>
+                      <a:pt x="2451069" y="2602321"/>
+                      <a:pt x="2271634" y="3045089"/>
+                      <a:pt x="2173471" y="3492174"/>
+                    </a:cubicBezTo>
+                    <a:cubicBezTo>
+                      <a:pt x="2106746" y="3795767"/>
+                      <a:pt x="2572694" y="3924994"/>
+                      <a:pt x="2639606" y="3620650"/>
+                    </a:cubicBezTo>
+                    <a:cubicBezTo>
+                      <a:pt x="2734954" y="3186516"/>
+                      <a:pt x="2892898" y="2721037"/>
+                      <a:pt x="3321401" y="2547421"/>
+                    </a:cubicBezTo>
+                    <a:cubicBezTo>
+                      <a:pt x="3677174" y="2928062"/>
+                      <a:pt x="4052185" y="3298850"/>
+                      <a:pt x="4491668" y="3571662"/>
+                    </a:cubicBezTo>
+                    <a:cubicBezTo>
+                      <a:pt x="4757160" y="3737020"/>
+                      <a:pt x="4999753" y="3318746"/>
+                      <a:pt x="4735387" y="3154702"/>
+                    </a:cubicBezTo>
+                    <a:close/>
+                  </a:path>
+                </a:pathLst>
+              </a:custGeom>
+              <a:grpFill/>
+              <a:ln w="93785" cap="flat">
                 <a:noFill/>
+                <a:prstDash val="solid"/>
+                <a:miter/>
               </a:ln>
+              <a:effectLst>
+                <a:outerShdw blurRad="190500" dist="228600" dir="2700000" algn="ctr">
+                  <a:srgbClr val="000000">
+                    <a:alpha val="14000"/>
+                  </a:srgbClr>
+                </a:outerShdw>
+              </a:effectLst>
+              <a:sp3d prstMaterial="matte">
+                <a:bevelT w="127000" h="63500"/>
+              </a:sp3d>
             </p:spPr>
-            <p:style>
-              <a:lnRef idx="2">
-                <a:schemeClr val="accent1">
-                  <a:shade val="15000"/>
-                </a:schemeClr>
-              </a:lnRef>
-              <a:fillRef idx="1">
-                <a:schemeClr val="accent1"/>
-              </a:fillRef>
-              <a:effectRef idx="0">
-                <a:schemeClr val="accent1"/>
-              </a:effectRef>
-              <a:fontRef idx="minor">
-                <a:schemeClr val="lt1"/>
-              </a:fontRef>
-            </p:style>
             <p:txBody>
               <a:bodyPr rtlCol="0" anchor="ctr"/>
               <a:lstStyle/>
               <a:p>
-                <a:pPr algn="ctr"/>
-                <a:endParaRPr lang="en-US"/>
+                <a:endParaRPr lang="en-US" dirty="0"/>
               </a:p>
             </p:txBody>
           </p:sp>
-          <p:grpSp>
-            <p:nvGrpSpPr>
-              <p:cNvPr id="5" name="Graphic 3">
+          <p:sp>
+            <p:nvSpPr>
+              <p:cNvPr id="7" name="Freeform: Shape 6">
                 <a:extLst>
                   <a:ext uri="{FF2B5EF4-FFF2-40B4-BE49-F238E27FC236}">
-                    <a16:creationId xmlns:a16="http://schemas.microsoft.com/office/drawing/2014/main" id="{8159C5FE-C9E1-7030-605F-25A51788A175}"/>
-                  </a:ext>
-                </a:extLst>
-              </p:cNvPr>
-              <p:cNvGrpSpPr/>
-              <p:nvPr/>
-            </p:nvGrpSpPr>
-            <p:grpSpPr>
-              <a:xfrm flipH="1">
-                <a:off x="315585" y="1901978"/>
-                <a:ext cx="3130178" cy="2449092"/>
-                <a:chOff x="3388232" y="998707"/>
-                <a:chExt cx="4849536" cy="3794340"/>
-              </a:xfrm>
-              <a:solidFill>
-                <a:schemeClr val="bg1"/>
-              </a:solidFill>
-              <a:scene3d>
-                <a:camera prst="orthographicFront">
-                  <a:rot lat="0" lon="0" rev="0"/>
-                </a:camera>
-                <a:lightRig rig="glow" dir="t">
-                  <a:rot lat="0" lon="0" rev="4800000"/>
-                </a:lightRig>
-              </a:scene3d>
-            </p:grpSpPr>
-            <p:sp>
-              <p:nvSpPr>
-                <p:cNvPr id="6" name="Freeform: Shape 5">
-                  <a:extLst>
-                    <a:ext uri="{FF2B5EF4-FFF2-40B4-BE49-F238E27FC236}">
-                      <a16:creationId xmlns:a16="http://schemas.microsoft.com/office/drawing/2014/main" id="{13D0F2FE-6D4D-68A6-FDA2-B3C25B8DD859}"/>
-                    </a:ext>
-                  </a:extLst>
-                </p:cNvPr>
-                <p:cNvSpPr/>
-                <p:nvPr/>
-              </p:nvSpPr>
-              <p:spPr>
-                <a:xfrm>
-                  <a:off x="3388232" y="998707"/>
-                  <a:ext cx="4849536" cy="3794340"/>
-                </a:xfrm>
-                <a:custGeom>
-                  <a:avLst/>
-                  <a:gdLst>
-                    <a:gd name="connsiteX0" fmla="*/ 4735387 w 4849536"/>
-                    <a:gd name="connsiteY0" fmla="*/ 3154702 h 3794340"/>
-                    <a:gd name="connsiteX1" fmla="*/ 3452693 w 4849536"/>
-                    <a:gd name="connsiteY1" fmla="*/ 1979180 h 3794340"/>
-                    <a:gd name="connsiteX2" fmla="*/ 3370202 w 4849536"/>
-                    <a:gd name="connsiteY2" fmla="*/ 1873133 h 3794340"/>
-                    <a:gd name="connsiteX3" fmla="*/ 2697697 w 4849536"/>
-                    <a:gd name="connsiteY3" fmla="*/ 1155395 h 3794340"/>
-                    <a:gd name="connsiteX4" fmla="*/ 3543912 w 4849536"/>
-                    <a:gd name="connsiteY4" fmla="*/ 400775 h 3794340"/>
-                    <a:gd name="connsiteX5" fmla="*/ 3202122 w 4849536"/>
-                    <a:gd name="connsiteY5" fmla="*/ 59080 h 3794340"/>
-                    <a:gd name="connsiteX6" fmla="*/ 2263751 w 4849536"/>
-                    <a:gd name="connsiteY6" fmla="*/ 903229 h 3794340"/>
-                    <a:gd name="connsiteX7" fmla="*/ 2051939 w 4849536"/>
-                    <a:gd name="connsiteY7" fmla="*/ 1006085 h 3794340"/>
-                    <a:gd name="connsiteX8" fmla="*/ 2014682 w 4849536"/>
-                    <a:gd name="connsiteY8" fmla="*/ 1050850 h 3794340"/>
-                    <a:gd name="connsiteX9" fmla="*/ 1906853 w 4849536"/>
-                    <a:gd name="connsiteY9" fmla="*/ 1252995 h 3794340"/>
-                    <a:gd name="connsiteX10" fmla="*/ 1788324 w 4849536"/>
-                    <a:gd name="connsiteY10" fmla="*/ 1773093 h 3794340"/>
-                    <a:gd name="connsiteX11" fmla="*/ 1278362 w 4849536"/>
-                    <a:gd name="connsiteY11" fmla="*/ 1793176 h 3794340"/>
-                    <a:gd name="connsiteX12" fmla="*/ 1040743 w 4849536"/>
-                    <a:gd name="connsiteY12" fmla="*/ 1862341 h 3794340"/>
-                    <a:gd name="connsiteX13" fmla="*/ 936385 w 4849536"/>
-                    <a:gd name="connsiteY13" fmla="*/ 1839255 h 3794340"/>
-                    <a:gd name="connsiteX14" fmla="*/ 605764 w 4849536"/>
-                    <a:gd name="connsiteY14" fmla="*/ 1428676 h 3794340"/>
-                    <a:gd name="connsiteX15" fmla="*/ 6648 w 4849536"/>
-                    <a:gd name="connsiteY15" fmla="*/ 1749725 h 3794340"/>
-                    <a:gd name="connsiteX16" fmla="*/ 424453 w 4849536"/>
-                    <a:gd name="connsiteY16" fmla="*/ 2251898 h 3794340"/>
-                    <a:gd name="connsiteX17" fmla="*/ 897064 w 4849536"/>
-                    <a:gd name="connsiteY17" fmla="*/ 2018220 h 3794340"/>
-                    <a:gd name="connsiteX18" fmla="*/ 979649 w 4849536"/>
-                    <a:gd name="connsiteY18" fmla="*/ 2036332 h 3794340"/>
-                    <a:gd name="connsiteX19" fmla="*/ 1150074 w 4849536"/>
-                    <a:gd name="connsiteY19" fmla="*/ 2259124 h 3794340"/>
-                    <a:gd name="connsiteX20" fmla="*/ 2080656 w 4849536"/>
-                    <a:gd name="connsiteY20" fmla="*/ 2156738 h 3794340"/>
-                    <a:gd name="connsiteX21" fmla="*/ 2316493 w 4849536"/>
-                    <a:gd name="connsiteY21" fmla="*/ 1818515 h 3794340"/>
-                    <a:gd name="connsiteX22" fmla="*/ 2782816 w 4849536"/>
-                    <a:gd name="connsiteY22" fmla="*/ 2315808 h 3794340"/>
-                    <a:gd name="connsiteX23" fmla="*/ 2173471 w 4849536"/>
-                    <a:gd name="connsiteY23" fmla="*/ 3492174 h 3794340"/>
-                    <a:gd name="connsiteX24" fmla="*/ 2639606 w 4849536"/>
-                    <a:gd name="connsiteY24" fmla="*/ 3620650 h 3794340"/>
-                    <a:gd name="connsiteX25" fmla="*/ 3321401 w 4849536"/>
-                    <a:gd name="connsiteY25" fmla="*/ 2547421 h 3794340"/>
-                    <a:gd name="connsiteX26" fmla="*/ 4491668 w 4849536"/>
-                    <a:gd name="connsiteY26" fmla="*/ 3571662 h 3794340"/>
-                    <a:gd name="connsiteX27" fmla="*/ 4735387 w 4849536"/>
-                    <a:gd name="connsiteY27" fmla="*/ 3154702 h 3794340"/>
-                  </a:gdLst>
-                  <a:ahLst/>
-                  <a:cxnLst>
-                    <a:cxn ang="0">
-                      <a:pos x="connsiteX0" y="connsiteY0"/>
-                    </a:cxn>
-                    <a:cxn ang="0">
-                      <a:pos x="connsiteX1" y="connsiteY1"/>
-                    </a:cxn>
-                    <a:cxn ang="0">
-                      <a:pos x="connsiteX2" y="connsiteY2"/>
-                    </a:cxn>
-                    <a:cxn ang="0">
-                      <a:pos x="connsiteX3" y="connsiteY3"/>
-                    </a:cxn>
-                    <a:cxn ang="0">
-                      <a:pos x="connsiteX4" y="connsiteY4"/>
-                    </a:cxn>
-                    <a:cxn ang="0">
-                      <a:pos x="connsiteX5" y="connsiteY5"/>
-                    </a:cxn>
-                    <a:cxn ang="0">
-                      <a:pos x="connsiteX6" y="connsiteY6"/>
-                    </a:cxn>
-                    <a:cxn ang="0">
-                      <a:pos x="connsiteX7" y="connsiteY7"/>
-                    </a:cxn>
-                    <a:cxn ang="0">
-                      <a:pos x="connsiteX8" y="connsiteY8"/>
-                    </a:cxn>
-                    <a:cxn ang="0">
-                      <a:pos x="connsiteX9" y="connsiteY9"/>
-                    </a:cxn>
-                    <a:cxn ang="0">
-                      <a:pos x="connsiteX10" y="connsiteY10"/>
-                    </a:cxn>
-                    <a:cxn ang="0">
-                      <a:pos x="connsiteX11" y="connsiteY11"/>
-                    </a:cxn>
-                    <a:cxn ang="0">
-                      <a:pos x="connsiteX12" y="connsiteY12"/>
-                    </a:cxn>
-                    <a:cxn ang="0">
-                      <a:pos x="connsiteX13" y="connsiteY13"/>
-                    </a:cxn>
-                    <a:cxn ang="0">
-                      <a:pos x="connsiteX14" y="connsiteY14"/>
-                    </a:cxn>
-                    <a:cxn ang="0">
-                      <a:pos x="connsiteX15" y="connsiteY15"/>
-                    </a:cxn>
-                    <a:cxn ang="0">
-                      <a:pos x="connsiteX16" y="connsiteY16"/>
-                    </a:cxn>
-                    <a:cxn ang="0">
-                      <a:pos x="connsiteX17" y="connsiteY17"/>
-                    </a:cxn>
-                    <a:cxn ang="0">
-                      <a:pos x="connsiteX18" y="connsiteY18"/>
-                    </a:cxn>
-                    <a:cxn ang="0">
-                      <a:pos x="connsiteX19" y="connsiteY19"/>
-                    </a:cxn>
-                    <a:cxn ang="0">
-                      <a:pos x="connsiteX20" y="connsiteY20"/>
-                    </a:cxn>
-                    <a:cxn ang="0">
-                      <a:pos x="connsiteX21" y="connsiteY21"/>
-                    </a:cxn>
-                    <a:cxn ang="0">
-                      <a:pos x="connsiteX22" y="connsiteY22"/>
-                    </a:cxn>
-                    <a:cxn ang="0">
-                      <a:pos x="connsiteX23" y="connsiteY23"/>
-                    </a:cxn>
-                    <a:cxn ang="0">
-                      <a:pos x="connsiteX24" y="connsiteY24"/>
-                    </a:cxn>
-                    <a:cxn ang="0">
-                      <a:pos x="connsiteX25" y="connsiteY25"/>
-                    </a:cxn>
-                    <a:cxn ang="0">
-                      <a:pos x="connsiteX26" y="connsiteY26"/>
-                    </a:cxn>
-                    <a:cxn ang="0">
-                      <a:pos x="connsiteX27" y="connsiteY27"/>
-                    </a:cxn>
-                  </a:cxnLst>
-                  <a:rect l="l" t="t" r="r" b="b"/>
-                  <a:pathLst>
-                    <a:path w="4849536" h="3794340">
-                      <a:moveTo>
-                        <a:pt x="4735387" y="3154702"/>
-                      </a:moveTo>
-                      <a:cubicBezTo>
-                        <a:pt x="4245602" y="2850639"/>
-                        <a:pt x="3842531" y="2406182"/>
-                        <a:pt x="3452693" y="1979180"/>
-                      </a:cubicBezTo>
-                      <a:cubicBezTo>
-                        <a:pt x="3434017" y="1942392"/>
-                        <a:pt x="3407271" y="1906730"/>
-                        <a:pt x="3370202" y="1873133"/>
-                      </a:cubicBezTo>
-                      <a:cubicBezTo>
-                        <a:pt x="3126201" y="1652406"/>
-                        <a:pt x="2912887" y="1403056"/>
-                        <a:pt x="2697697" y="1155395"/>
-                      </a:cubicBezTo>
-                      <a:cubicBezTo>
-                        <a:pt x="2970228" y="893375"/>
-                        <a:pt x="3251767" y="641210"/>
-                        <a:pt x="3543912" y="400775"/>
-                      </a:cubicBezTo>
-                      <a:cubicBezTo>
-                        <a:pt x="3784628" y="202477"/>
-                        <a:pt x="3440586" y="-137341"/>
-                        <a:pt x="3202122" y="59080"/>
-                      </a:cubicBezTo>
-                      <a:cubicBezTo>
-                        <a:pt x="2876756" y="326636"/>
-                        <a:pt x="2564998" y="608833"/>
-                        <a:pt x="2263751" y="903229"/>
-                      </a:cubicBezTo>
-                      <a:cubicBezTo>
-                        <a:pt x="2183888" y="914585"/>
-                        <a:pt x="2107309" y="949777"/>
-                        <a:pt x="2051939" y="1006085"/>
-                      </a:cubicBezTo>
-                      <a:cubicBezTo>
-                        <a:pt x="2037862" y="1020350"/>
-                        <a:pt x="2025756" y="1035459"/>
-                        <a:pt x="2014682" y="1050850"/>
-                      </a:cubicBezTo>
-                      <a:cubicBezTo>
-                        <a:pt x="1949740" y="1086981"/>
-                        <a:pt x="1903474" y="1154269"/>
-                        <a:pt x="1906853" y="1252995"/>
-                      </a:cubicBezTo>
-                      <a:cubicBezTo>
-                        <a:pt x="1912765" y="1425861"/>
-                        <a:pt x="1916706" y="1639080"/>
-                        <a:pt x="1788324" y="1773093"/>
-                      </a:cubicBezTo>
-                      <a:cubicBezTo>
-                        <a:pt x="1665385" y="1901569"/>
-                        <a:pt x="1422886" y="1834375"/>
-                        <a:pt x="1278362" y="1793176"/>
-                      </a:cubicBezTo>
-                      <a:cubicBezTo>
-                        <a:pt x="1175319" y="1763896"/>
-                        <a:pt x="1092734" y="1799558"/>
-                        <a:pt x="1040743" y="1862341"/>
-                      </a:cubicBezTo>
-                      <a:lnTo>
-                        <a:pt x="936385" y="1839255"/>
-                      </a:lnTo>
-                      <a:cubicBezTo>
-                        <a:pt x="936010" y="1645931"/>
-                        <a:pt x="802185" y="1471939"/>
-                        <a:pt x="605764" y="1428676"/>
-                      </a:cubicBezTo>
-                      <a:cubicBezTo>
-                        <a:pt x="378374" y="1378656"/>
-                        <a:pt x="56668" y="1522429"/>
-                        <a:pt x="6648" y="1749725"/>
-                      </a:cubicBezTo>
-                      <a:cubicBezTo>
-                        <a:pt x="-43279" y="1977021"/>
-                        <a:pt x="197062" y="2202066"/>
-                        <a:pt x="424453" y="2251898"/>
-                      </a:cubicBezTo>
-                      <a:cubicBezTo>
-                        <a:pt x="621061" y="2295161"/>
-                        <a:pt x="815605" y="2193432"/>
-                        <a:pt x="897064" y="2018220"/>
-                      </a:cubicBezTo>
-                      <a:lnTo>
-                        <a:pt x="979649" y="2036332"/>
-                      </a:lnTo>
-                      <a:cubicBezTo>
-                        <a:pt x="980024" y="2131868"/>
-                        <a:pt x="1031452" y="2225527"/>
-                        <a:pt x="1150074" y="2259124"/>
-                      </a:cubicBezTo>
-                      <a:cubicBezTo>
-                        <a:pt x="1464741" y="2348466"/>
-                        <a:pt x="1810566" y="2369300"/>
-                        <a:pt x="2080656" y="2156738"/>
-                      </a:cubicBezTo>
-                      <a:cubicBezTo>
-                        <a:pt x="2194211" y="2067302"/>
-                        <a:pt x="2268631" y="1949055"/>
-                        <a:pt x="2316493" y="1818515"/>
-                      </a:cubicBezTo>
-                      <a:cubicBezTo>
-                        <a:pt x="2466084" y="1989785"/>
-                        <a:pt x="2618209" y="2158708"/>
-                        <a:pt x="2782816" y="2315808"/>
-                      </a:cubicBezTo>
-                      <a:cubicBezTo>
-                        <a:pt x="2451069" y="2602321"/>
-                        <a:pt x="2271634" y="3045089"/>
-                        <a:pt x="2173471" y="3492174"/>
-                      </a:cubicBezTo>
-                      <a:cubicBezTo>
-                        <a:pt x="2106746" y="3795767"/>
-                        <a:pt x="2572694" y="3924994"/>
-                        <a:pt x="2639606" y="3620650"/>
-                      </a:cubicBezTo>
-                      <a:cubicBezTo>
-                        <a:pt x="2734954" y="3186516"/>
-                        <a:pt x="2892898" y="2721037"/>
-                        <a:pt x="3321401" y="2547421"/>
-                      </a:cubicBezTo>
-                      <a:cubicBezTo>
-                        <a:pt x="3677174" y="2928062"/>
-                        <a:pt x="4052185" y="3298850"/>
-                        <a:pt x="4491668" y="3571662"/>
-                      </a:cubicBezTo>
-                      <a:cubicBezTo>
-                        <a:pt x="4757160" y="3737020"/>
-                        <a:pt x="4999753" y="3318746"/>
-                        <a:pt x="4735387" y="3154702"/>
-                      </a:cubicBezTo>
-                      <a:close/>
-                    </a:path>
-                  </a:pathLst>
-                </a:custGeom>
-                <a:grpFill/>
-                <a:ln w="93785" cap="flat">
-                  <a:noFill/>
-                  <a:prstDash val="solid"/>
-                  <a:miter/>
-                </a:ln>
-                <a:effectLst>
-                  <a:outerShdw blurRad="190500" dist="228600" dir="2700000" algn="ctr">
-                    <a:srgbClr val="000000">
-                      <a:alpha val="14000"/>
-                    </a:srgbClr>
-                  </a:outerShdw>
-                </a:effectLst>
-                <a:sp3d prstMaterial="matte">
-                  <a:bevelT w="127000" h="63500"/>
-                </a:sp3d>
-              </p:spPr>
-              <p:txBody>
-                <a:bodyPr rtlCol="0" anchor="ctr"/>
-                <a:lstStyle/>
-                <a:p>
-                  <a:endParaRPr lang="en-US" dirty="0"/>
-                </a:p>
-              </p:txBody>
-            </p:sp>
-            <p:sp>
-              <p:nvSpPr>
-                <p:cNvPr id="7" name="Freeform: Shape 6">
-                  <a:extLst>
-                    <a:ext uri="{FF2B5EF4-FFF2-40B4-BE49-F238E27FC236}">
-                      <a16:creationId xmlns:a16="http://schemas.microsoft.com/office/drawing/2014/main" id="{FE58AF83-D54D-021C-22D6-F6B003A3A7A8}"/>
-                    </a:ext>
-                  </a:extLst>
-                </p:cNvPr>
-                <p:cNvSpPr/>
-                <p:nvPr/>
-              </p:nvSpPr>
-              <p:spPr>
-                <a:xfrm>
-                  <a:off x="4635812" y="1260776"/>
-                  <a:ext cx="869957" cy="869957"/>
-                </a:xfrm>
-                <a:custGeom>
-                  <a:avLst/>
-                  <a:gdLst>
-                    <a:gd name="connsiteX0" fmla="*/ 869957 w 869957"/>
-                    <a:gd name="connsiteY0" fmla="*/ 434979 h 869957"/>
-                    <a:gd name="connsiteX1" fmla="*/ 434979 w 869957"/>
-                    <a:gd name="connsiteY1" fmla="*/ 869957 h 869957"/>
-                    <a:gd name="connsiteX2" fmla="*/ 0 w 869957"/>
-                    <a:gd name="connsiteY2" fmla="*/ 434979 h 869957"/>
-                    <a:gd name="connsiteX3" fmla="*/ 434979 w 869957"/>
-                    <a:gd name="connsiteY3" fmla="*/ 0 h 869957"/>
-                    <a:gd name="connsiteX4" fmla="*/ 869957 w 869957"/>
-                    <a:gd name="connsiteY4" fmla="*/ 434979 h 869957"/>
-                  </a:gdLst>
-                  <a:ahLst/>
-                  <a:cxnLst>
-                    <a:cxn ang="0">
-                      <a:pos x="connsiteX0" y="connsiteY0"/>
-                    </a:cxn>
-                    <a:cxn ang="0">
-                      <a:pos x="connsiteX1" y="connsiteY1"/>
-                    </a:cxn>
-                    <a:cxn ang="0">
-                      <a:pos x="connsiteX2" y="connsiteY2"/>
-                    </a:cxn>
-                    <a:cxn ang="0">
-                      <a:pos x="connsiteX3" y="connsiteY3"/>
-                    </a:cxn>
-                    <a:cxn ang="0">
-                      <a:pos x="connsiteX4" y="connsiteY4"/>
-                    </a:cxn>
-                  </a:cxnLst>
-                  <a:rect l="l" t="t" r="r" b="b"/>
-                  <a:pathLst>
-                    <a:path w="869957" h="869957">
-                      <a:moveTo>
-                        <a:pt x="869957" y="434979"/>
-                      </a:moveTo>
-                      <a:cubicBezTo>
-                        <a:pt x="869957" y="675211"/>
-                        <a:pt x="675211" y="869957"/>
-                        <a:pt x="434979" y="869957"/>
-                      </a:cubicBezTo>
-                      <a:cubicBezTo>
-                        <a:pt x="194746" y="869957"/>
-                        <a:pt x="0" y="675211"/>
-                        <a:pt x="0" y="434979"/>
-                      </a:cubicBezTo>
-                      <a:cubicBezTo>
-                        <a:pt x="0" y="194747"/>
-                        <a:pt x="194746" y="0"/>
-                        <a:pt x="434979" y="0"/>
-                      </a:cubicBezTo>
-                      <a:cubicBezTo>
-                        <a:pt x="675211" y="0"/>
-                        <a:pt x="869957" y="194747"/>
-                        <a:pt x="869957" y="434979"/>
-                      </a:cubicBezTo>
-                      <a:close/>
-                    </a:path>
-                  </a:pathLst>
-                </a:custGeom>
-                <a:grpFill/>
-                <a:ln w="93785" cap="flat">
-                  <a:noFill/>
-                  <a:prstDash val="solid"/>
-                  <a:miter/>
-                </a:ln>
-                <a:effectLst>
-                  <a:outerShdw blurRad="190500" dist="228600" dir="2700000" algn="ctr">
-                    <a:srgbClr val="000000">
-                      <a:alpha val="30000"/>
-                    </a:srgbClr>
-                  </a:outerShdw>
-                </a:effectLst>
-                <a:sp3d prstMaterial="matte">
-                  <a:bevelT w="127000" h="63500"/>
-                </a:sp3d>
-              </p:spPr>
-              <p:txBody>
-                <a:bodyPr rtlCol="0" anchor="ctr"/>
-                <a:lstStyle/>
-                <a:p>
-                  <a:endParaRPr lang="en-US"/>
-                </a:p>
-              </p:txBody>
-            </p:sp>
-            <p:sp>
-              <p:nvSpPr>
-                <p:cNvPr id="8" name="Freeform: Shape 7">
-                  <a:extLst>
-                    <a:ext uri="{FF2B5EF4-FFF2-40B4-BE49-F238E27FC236}">
-                      <a16:creationId xmlns:a16="http://schemas.microsoft.com/office/drawing/2014/main" id="{03935BF2-201A-747D-330B-028C0C97D943}"/>
-                    </a:ext>
-                  </a:extLst>
-                </p:cNvPr>
-                <p:cNvSpPr/>
-                <p:nvPr/>
-              </p:nvSpPr>
-              <p:spPr>
-                <a:xfrm>
-                  <a:off x="4113275" y="2147438"/>
-                  <a:ext cx="306127" cy="306127"/>
-                </a:xfrm>
-                <a:custGeom>
-                  <a:avLst/>
-                  <a:gdLst>
-                    <a:gd name="connsiteX0" fmla="*/ 306127 w 306127"/>
-                    <a:gd name="connsiteY0" fmla="*/ 153064 h 306127"/>
-                    <a:gd name="connsiteX1" fmla="*/ 153064 w 306127"/>
-                    <a:gd name="connsiteY1" fmla="*/ 306127 h 306127"/>
-                    <a:gd name="connsiteX2" fmla="*/ 0 w 306127"/>
-                    <a:gd name="connsiteY2" fmla="*/ 153064 h 306127"/>
-                    <a:gd name="connsiteX3" fmla="*/ 153064 w 306127"/>
-                    <a:gd name="connsiteY3" fmla="*/ 0 h 306127"/>
-                    <a:gd name="connsiteX4" fmla="*/ 306127 w 306127"/>
-                    <a:gd name="connsiteY4" fmla="*/ 153064 h 306127"/>
-                  </a:gdLst>
-                  <a:ahLst/>
-                  <a:cxnLst>
-                    <a:cxn ang="0">
-                      <a:pos x="connsiteX0" y="connsiteY0"/>
-                    </a:cxn>
-                    <a:cxn ang="0">
-                      <a:pos x="connsiteX1" y="connsiteY1"/>
-                    </a:cxn>
-                    <a:cxn ang="0">
-                      <a:pos x="connsiteX2" y="connsiteY2"/>
-                    </a:cxn>
-                    <a:cxn ang="0">
-                      <a:pos x="connsiteX3" y="connsiteY3"/>
-                    </a:cxn>
-                    <a:cxn ang="0">
-                      <a:pos x="connsiteX4" y="connsiteY4"/>
-                    </a:cxn>
-                  </a:cxnLst>
-                  <a:rect l="l" t="t" r="r" b="b"/>
-                  <a:pathLst>
-                    <a:path w="306127" h="306127">
-                      <a:moveTo>
-                        <a:pt x="306127" y="153064"/>
-                      </a:moveTo>
-                      <a:cubicBezTo>
-                        <a:pt x="306127" y="237598"/>
-                        <a:pt x="237598" y="306127"/>
-                        <a:pt x="153064" y="306127"/>
-                      </a:cubicBezTo>
-                      <a:cubicBezTo>
-                        <a:pt x="68529" y="306127"/>
-                        <a:pt x="0" y="237599"/>
-                        <a:pt x="0" y="153064"/>
-                      </a:cubicBezTo>
-                      <a:cubicBezTo>
-                        <a:pt x="0" y="68529"/>
-                        <a:pt x="68529" y="0"/>
-                        <a:pt x="153064" y="0"/>
-                      </a:cubicBezTo>
-                      <a:cubicBezTo>
-                        <a:pt x="237599" y="0"/>
-                        <a:pt x="306127" y="68529"/>
-                        <a:pt x="306127" y="153064"/>
-                      </a:cubicBezTo>
-                      <a:close/>
-                    </a:path>
-                  </a:pathLst>
-                </a:custGeom>
-                <a:grpFill/>
-                <a:ln w="93785" cap="flat">
-                  <a:noFill/>
-                  <a:prstDash val="solid"/>
-                  <a:miter/>
-                </a:ln>
-                <a:effectLst>
-                  <a:outerShdw blurRad="190500" dist="228600" dir="2700000" algn="ctr">
-                    <a:srgbClr val="000000">
-                      <a:alpha val="30000"/>
-                    </a:srgbClr>
-                  </a:outerShdw>
-                </a:effectLst>
-                <a:sp3d prstMaterial="matte">
-                  <a:bevelT w="127000" h="63500"/>
-                </a:sp3d>
-              </p:spPr>
-              <p:txBody>
-                <a:bodyPr rtlCol="0" anchor="ctr"/>
-                <a:lstStyle/>
-                <a:p>
-                  <a:endParaRPr lang="en-US"/>
-                </a:p>
-              </p:txBody>
-            </p:sp>
-          </p:grpSp>
-        </p:grpSp>
-        <p:grpSp>
-          <p:nvGrpSpPr>
-            <p:cNvPr id="21" name="Group 20">
-              <a:extLst>
-                <a:ext uri="{FF2B5EF4-FFF2-40B4-BE49-F238E27FC236}">
-                  <a16:creationId xmlns:a16="http://schemas.microsoft.com/office/drawing/2014/main" id="{9161DDA9-CF54-7A22-F2D1-5F5CD47E641A}"/>
-                </a:ext>
-              </a:extLst>
-            </p:cNvPr>
-            <p:cNvGrpSpPr/>
-            <p:nvPr/>
-          </p:nvGrpSpPr>
-          <p:grpSpPr>
-            <a:xfrm>
-              <a:off x="5465342" y="2775955"/>
-              <a:ext cx="3764172" cy="1420390"/>
-              <a:chOff x="4166720" y="1481982"/>
-              <a:chExt cx="3941939" cy="1487469"/>
-            </a:xfrm>
-          </p:grpSpPr>
-          <p:grpSp>
-            <p:nvGrpSpPr>
-              <p:cNvPr id="19" name="Group 18">
-                <a:extLst>
-                  <a:ext uri="{FF2B5EF4-FFF2-40B4-BE49-F238E27FC236}">
-                    <a16:creationId xmlns:a16="http://schemas.microsoft.com/office/drawing/2014/main" id="{4D5A5288-75E0-9D43-D989-8448C3DB7890}"/>
-                  </a:ext>
-                </a:extLst>
-              </p:cNvPr>
-              <p:cNvGrpSpPr/>
-              <p:nvPr/>
-            </p:nvGrpSpPr>
-            <p:grpSpPr>
-              <a:xfrm>
-                <a:off x="4239903" y="1481982"/>
-                <a:ext cx="3764172" cy="885207"/>
-                <a:chOff x="3117176" y="1605518"/>
-                <a:chExt cx="5733565" cy="1402894"/>
-              </a:xfrm>
-              <a:solidFill>
-                <a:schemeClr val="tx1">
-                  <a:lumMod val="75000"/>
-                  <a:lumOff val="25000"/>
-                </a:schemeClr>
-              </a:solidFill>
-              <a:scene3d>
-                <a:camera prst="orthographicFront">
-                  <a:rot lat="0" lon="0" rev="0"/>
-                </a:camera>
-                <a:lightRig rig="balanced" dir="t">
-                  <a:rot lat="0" lon="0" rev="8700000"/>
-                </a:lightRig>
-              </a:scene3d>
-            </p:grpSpPr>
-            <p:sp>
-              <p:nvSpPr>
-                <p:cNvPr id="14" name="Freeform: Shape 13">
-                  <a:extLst>
-                    <a:ext uri="{FF2B5EF4-FFF2-40B4-BE49-F238E27FC236}">
-                      <a16:creationId xmlns:a16="http://schemas.microsoft.com/office/drawing/2014/main" id="{1A974BDA-B27E-A5CE-3AB3-36070133F305}"/>
-                    </a:ext>
-                  </a:extLst>
-                </p:cNvPr>
-                <p:cNvSpPr/>
-                <p:nvPr/>
-              </p:nvSpPr>
-              <p:spPr>
-                <a:xfrm>
-                  <a:off x="3117176" y="1605518"/>
-                  <a:ext cx="1915806" cy="1402894"/>
-                </a:xfrm>
-                <a:custGeom>
-                  <a:avLst/>
-                  <a:gdLst/>
-                  <a:ahLst/>
-                  <a:cxnLst/>
-                  <a:rect l="l" t="t" r="r" b="b"/>
-                  <a:pathLst>
-                    <a:path w="1915806" h="1098823">
-                      <a:moveTo>
-                        <a:pt x="418245" y="0"/>
-                      </a:moveTo>
-                      <a:lnTo>
-                        <a:pt x="590035" y="0"/>
-                      </a:lnTo>
-                      <a:lnTo>
-                        <a:pt x="354634" y="770439"/>
-                      </a:lnTo>
-                      <a:lnTo>
-                        <a:pt x="1353994" y="770439"/>
-                      </a:lnTo>
-                      <a:lnTo>
-                        <a:pt x="1546867" y="143010"/>
-                      </a:lnTo>
-                      <a:cubicBezTo>
-                        <a:pt x="1558291" y="101546"/>
-                        <a:pt x="1582477" y="67344"/>
-                        <a:pt x="1619425" y="40407"/>
-                      </a:cubicBezTo>
-                      <a:cubicBezTo>
-                        <a:pt x="1656373" y="13469"/>
-                        <a:pt x="1697892" y="0"/>
-                        <a:pt x="1743983" y="0"/>
-                      </a:cubicBezTo>
-                      <a:lnTo>
-                        <a:pt x="1915806" y="0"/>
-                      </a:lnTo>
-                      <a:lnTo>
-                        <a:pt x="1586040" y="1098823"/>
-                      </a:lnTo>
-                      <a:lnTo>
-                        <a:pt x="207611" y="1098823"/>
-                      </a:lnTo>
-                      <a:cubicBezTo>
-                        <a:pt x="172286" y="1098823"/>
-                        <a:pt x="140086" y="1091176"/>
-                        <a:pt x="111010" y="1075882"/>
-                      </a:cubicBezTo>
-                      <a:cubicBezTo>
-                        <a:pt x="81934" y="1060587"/>
-                        <a:pt x="58198" y="1040299"/>
-                        <a:pt x="39801" y="1015017"/>
-                      </a:cubicBezTo>
-                      <a:cubicBezTo>
-                        <a:pt x="21404" y="989735"/>
-                        <a:pt x="9256" y="961443"/>
-                        <a:pt x="3358" y="930142"/>
-                      </a:cubicBezTo>
-                      <a:cubicBezTo>
-                        <a:pt x="-2541" y="898840"/>
-                        <a:pt x="-666" y="872665"/>
-                        <a:pt x="8982" y="851614"/>
-                      </a:cubicBezTo>
-                      <a:lnTo>
-                        <a:pt x="221162" y="142780"/>
-                      </a:lnTo>
-                      <a:cubicBezTo>
-                        <a:pt x="232564" y="101425"/>
-                        <a:pt x="256728" y="67290"/>
-                        <a:pt x="293654" y="40374"/>
-                      </a:cubicBezTo>
-                      <a:cubicBezTo>
-                        <a:pt x="330579" y="13458"/>
-                        <a:pt x="372110" y="0"/>
-                        <a:pt x="418245" y="0"/>
-                      </a:cubicBezTo>
-                      <a:close/>
-                    </a:path>
-                  </a:pathLst>
-                </a:custGeom>
-                <a:grpFill/>
-                <a:ln w="0">
-                  <a:noFill/>
-                </a:ln>
-                <a:effectLst>
-                  <a:outerShdw blurRad="44450" dist="27940" dir="5400000" algn="ctr">
-                    <a:srgbClr val="000000">
-                      <a:alpha val="32000"/>
-                    </a:srgbClr>
-                  </a:outerShdw>
-                </a:effectLst>
-                <a:sp3d>
-                  <a:bevelT w="190500" h="38100"/>
-                </a:sp3d>
-              </p:spPr>
-              <p:txBody>
-                <a:bodyPr rot="0" spcFirstLastPara="0" vertOverflow="overflow" horzOverflow="overflow" vert="horz" wrap="square" lIns="91440" tIns="45720" rIns="91440" bIns="45720" numCol="1" spcCol="0" rtlCol="0" fromWordArt="0" anchor="t" anchorCtr="0" forceAA="0" compatLnSpc="1">
-                  <a:prstTxWarp prst="textNoShape">
-                    <a:avLst/>
-                  </a:prstTxWarp>
-                  <a:noAutofit/>
-                </a:bodyPr>
-                <a:lstStyle/>
-                <a:p>
-                  <a:endParaRPr lang="en-US" sz="16600" b="1" cap="none" spc="0" dirty="0">
-                    <a:ln w="0"/>
-                    <a:solidFill>
-                      <a:schemeClr val="tx1"/>
-                    </a:solidFill>
-                    <a:latin typeface="Siegra" pitchFamily="2" charset="0"/>
-                  </a:endParaRPr>
-                </a:p>
-              </p:txBody>
-            </p:sp>
-            <p:sp>
-              <p:nvSpPr>
-                <p:cNvPr id="17" name="Freeform: Shape 16">
-                  <a:extLst>
-                    <a:ext uri="{FF2B5EF4-FFF2-40B4-BE49-F238E27FC236}">
-                      <a16:creationId xmlns:a16="http://schemas.microsoft.com/office/drawing/2014/main" id="{DE58A1BC-F2F5-BA05-22E0-B658976DB259}"/>
-                    </a:ext>
-                  </a:extLst>
-                </p:cNvPr>
-                <p:cNvSpPr/>
-                <p:nvPr/>
-              </p:nvSpPr>
-              <p:spPr>
-                <a:xfrm>
-                  <a:off x="5032982" y="1624473"/>
-                  <a:ext cx="1981158" cy="1364983"/>
-                </a:xfrm>
-                <a:custGeom>
-                  <a:avLst/>
-                  <a:gdLst/>
-                  <a:ahLst/>
-                  <a:cxnLst/>
-                  <a:rect l="l" t="t" r="r" b="b"/>
-                  <a:pathLst>
-                    <a:path w="1981158" h="1098823">
-                      <a:moveTo>
-                        <a:pt x="613714" y="328384"/>
-                      </a:moveTo>
-                      <a:cubicBezTo>
-                        <a:pt x="597970" y="328384"/>
-                        <a:pt x="583903" y="333235"/>
-                        <a:pt x="571515" y="342938"/>
-                      </a:cubicBezTo>
-                      <a:cubicBezTo>
-                        <a:pt x="559126" y="352641"/>
-                        <a:pt x="550212" y="365145"/>
-                        <a:pt x="544774" y="380451"/>
-                      </a:cubicBezTo>
-                      <a:lnTo>
-                        <a:pt x="492280" y="530466"/>
-                      </a:lnTo>
-                      <a:lnTo>
-                        <a:pt x="1491641" y="530466"/>
-                      </a:lnTo>
-                      <a:lnTo>
-                        <a:pt x="1561172" y="328384"/>
-                      </a:lnTo>
-                      <a:close/>
-                      <a:moveTo>
-                        <a:pt x="588947" y="0"/>
-                      </a:moveTo>
-                      <a:lnTo>
-                        <a:pt x="1981158" y="0"/>
-                      </a:lnTo>
-                      <a:lnTo>
-                        <a:pt x="1694348" y="954695"/>
-                      </a:lnTo>
-                      <a:cubicBezTo>
-                        <a:pt x="1682661" y="997080"/>
-                        <a:pt x="1658393" y="1031698"/>
-                        <a:pt x="1621544" y="1058548"/>
-                      </a:cubicBezTo>
-                      <a:cubicBezTo>
-                        <a:pt x="1584695" y="1085398"/>
-                        <a:pt x="1543367" y="1098823"/>
-                        <a:pt x="1497561" y="1098823"/>
-                      </a:cubicBezTo>
-                      <a:lnTo>
-                        <a:pt x="1325738" y="1098823"/>
-                      </a:lnTo>
-                      <a:lnTo>
-                        <a:pt x="1398033" y="858850"/>
-                      </a:lnTo>
-                      <a:lnTo>
-                        <a:pt x="397949" y="858850"/>
-                      </a:lnTo>
-                      <a:lnTo>
-                        <a:pt x="368610" y="954464"/>
-                      </a:lnTo>
-                      <a:cubicBezTo>
-                        <a:pt x="356901" y="996872"/>
-                        <a:pt x="332622" y="1031534"/>
-                        <a:pt x="295773" y="1058449"/>
-                      </a:cubicBezTo>
-                      <a:cubicBezTo>
-                        <a:pt x="258924" y="1085365"/>
-                        <a:pt x="217596" y="1098823"/>
-                        <a:pt x="171790" y="1098823"/>
-                      </a:cubicBezTo>
-                      <a:lnTo>
-                        <a:pt x="0" y="1098823"/>
-                      </a:lnTo>
-                      <a:lnTo>
-                        <a:pt x="252603" y="248919"/>
-                      </a:lnTo>
-                      <a:cubicBezTo>
-                        <a:pt x="264159" y="211380"/>
-                        <a:pt x="280791" y="177420"/>
-                        <a:pt x="302499" y="147039"/>
-                      </a:cubicBezTo>
-                      <a:cubicBezTo>
-                        <a:pt x="324207" y="116659"/>
-                        <a:pt x="349676" y="90516"/>
-                        <a:pt x="378905" y="68611"/>
-                      </a:cubicBezTo>
-                      <a:cubicBezTo>
-                        <a:pt x="408134" y="46705"/>
-                        <a:pt x="441008" y="29794"/>
-                        <a:pt x="477528" y="17876"/>
-                      </a:cubicBezTo>
-                      <a:cubicBezTo>
-                        <a:pt x="514048" y="5959"/>
-                        <a:pt x="551188" y="0"/>
-                        <a:pt x="588947" y="0"/>
-                      </a:cubicBezTo>
-                      <a:close/>
-                    </a:path>
-                  </a:pathLst>
-                </a:custGeom>
-                <a:grpFill/>
-                <a:ln w="0">
-                  <a:noFill/>
-                </a:ln>
-                <a:effectLst>
-                  <a:outerShdw blurRad="44450" dist="27940" dir="5400000" algn="ctr">
-                    <a:srgbClr val="000000">
-                      <a:alpha val="32000"/>
-                    </a:srgbClr>
-                  </a:outerShdw>
-                </a:effectLst>
-                <a:sp3d>
-                  <a:bevelT w="190500" h="38100"/>
-                </a:sp3d>
-              </p:spPr>
-              <p:txBody>
-                <a:bodyPr rot="0" spcFirstLastPara="0" vertOverflow="overflow" horzOverflow="overflow" vert="horz" wrap="square" lIns="91440" tIns="45720" rIns="91440" bIns="45720" numCol="1" spcCol="0" rtlCol="0" fromWordArt="0" anchor="t" anchorCtr="0" forceAA="0" compatLnSpc="1">
-                  <a:prstTxWarp prst="textNoShape">
-                    <a:avLst/>
-                  </a:prstTxWarp>
-                  <a:noAutofit/>
-                </a:bodyPr>
-                <a:lstStyle/>
-                <a:p>
-                  <a:endParaRPr lang="en-US" sz="16600" b="1" cap="none" spc="0" dirty="0">
-                    <a:ln w="0"/>
-                    <a:solidFill>
-                      <a:schemeClr val="tx1"/>
-                    </a:solidFill>
-                    <a:latin typeface="Siegra" pitchFamily="2" charset="0"/>
-                  </a:endParaRPr>
-                </a:p>
-              </p:txBody>
-            </p:sp>
-            <p:sp>
-              <p:nvSpPr>
-                <p:cNvPr id="18" name="Freeform: Shape 17">
-                  <a:extLst>
-                    <a:ext uri="{FF2B5EF4-FFF2-40B4-BE49-F238E27FC236}">
-                      <a16:creationId xmlns:a16="http://schemas.microsoft.com/office/drawing/2014/main" id="{80BA3F4C-7A2D-AFAD-C812-69D0393D61A4}"/>
-                    </a:ext>
-                  </a:extLst>
-                </p:cNvPr>
-                <p:cNvSpPr/>
-                <p:nvPr/>
-              </p:nvSpPr>
-              <p:spPr>
-                <a:xfrm>
-                  <a:off x="7014140" y="1643428"/>
-                  <a:ext cx="1836601" cy="1364984"/>
-                </a:xfrm>
-                <a:custGeom>
-                  <a:avLst/>
-                  <a:gdLst/>
-                  <a:ahLst/>
-                  <a:cxnLst/>
-                  <a:rect l="l" t="t" r="r" b="b"/>
-                  <a:pathLst>
-                    <a:path w="1836601" h="1098823">
-                      <a:moveTo>
-                        <a:pt x="526980" y="0"/>
-                      </a:moveTo>
-                      <a:lnTo>
-                        <a:pt x="1836601" y="0"/>
-                      </a:lnTo>
-                      <a:lnTo>
-                        <a:pt x="1784535" y="188893"/>
-                      </a:lnTo>
-                      <a:cubicBezTo>
-                        <a:pt x="1773221" y="229854"/>
-                        <a:pt x="1749150" y="263342"/>
-                        <a:pt x="1712323" y="289359"/>
-                      </a:cubicBezTo>
-                      <a:cubicBezTo>
-                        <a:pt x="1675496" y="315376"/>
-                        <a:pt x="1634190" y="328384"/>
-                        <a:pt x="1588406" y="328384"/>
-                      </a:cubicBezTo>
-                      <a:lnTo>
-                        <a:pt x="561121" y="328384"/>
-                      </a:lnTo>
-                      <a:lnTo>
-                        <a:pt x="537702" y="383115"/>
-                      </a:lnTo>
-                      <a:lnTo>
-                        <a:pt x="1718917" y="383115"/>
-                      </a:lnTo>
-                      <a:lnTo>
-                        <a:pt x="1666851" y="572008"/>
-                      </a:lnTo>
-                      <a:cubicBezTo>
-                        <a:pt x="1655537" y="612968"/>
-                        <a:pt x="1631460" y="646457"/>
-                        <a:pt x="1594622" y="672473"/>
-                      </a:cubicBezTo>
-                      <a:cubicBezTo>
-                        <a:pt x="1557784" y="698490"/>
-                        <a:pt x="1516473" y="711499"/>
-                        <a:pt x="1470689" y="711499"/>
-                      </a:cubicBezTo>
-                      <a:lnTo>
-                        <a:pt x="443503" y="711499"/>
-                      </a:lnTo>
-                      <a:lnTo>
-                        <a:pt x="419985" y="770439"/>
-                      </a:lnTo>
-                      <a:lnTo>
-                        <a:pt x="1601200" y="770439"/>
-                      </a:lnTo>
-                      <a:lnTo>
-                        <a:pt x="1549299" y="956767"/>
-                      </a:lnTo>
-                      <a:cubicBezTo>
-                        <a:pt x="1537940" y="997859"/>
-                        <a:pt x="1513831" y="1031808"/>
-                        <a:pt x="1476971" y="1058614"/>
-                      </a:cubicBezTo>
-                      <a:cubicBezTo>
-                        <a:pt x="1440111" y="1085420"/>
-                        <a:pt x="1398789" y="1098823"/>
-                        <a:pt x="1353005" y="1098823"/>
-                      </a:cubicBezTo>
-                      <a:lnTo>
-                        <a:pt x="0" y="1098823"/>
-                      </a:lnTo>
-                      <a:lnTo>
-                        <a:pt x="272897" y="183466"/>
-                      </a:lnTo>
-                      <a:cubicBezTo>
-                        <a:pt x="287939" y="131476"/>
-                        <a:pt x="319416" y="87901"/>
-                        <a:pt x="367327" y="52741"/>
-                      </a:cubicBezTo>
-                      <a:cubicBezTo>
-                        <a:pt x="415238" y="17580"/>
-                        <a:pt x="468456" y="0"/>
-                        <a:pt x="526980" y="0"/>
-                      </a:cubicBezTo>
-                      <a:close/>
-                    </a:path>
-                  </a:pathLst>
-                </a:custGeom>
-                <a:grpFill/>
-                <a:ln w="0">
-                  <a:noFill/>
-                </a:ln>
-                <a:effectLst>
-                  <a:outerShdw blurRad="44450" dist="27940" dir="5400000" algn="ctr">
-                    <a:srgbClr val="000000">
-                      <a:alpha val="32000"/>
-                    </a:srgbClr>
-                  </a:outerShdw>
-                </a:effectLst>
-                <a:sp3d>
-                  <a:bevelT w="190500" h="38100"/>
-                </a:sp3d>
-              </p:spPr>
-              <p:txBody>
-                <a:bodyPr rot="0" spcFirstLastPara="0" vertOverflow="overflow" horzOverflow="overflow" vert="horz" wrap="square" lIns="91440" tIns="45720" rIns="91440" bIns="45720" numCol="1" spcCol="0" rtlCol="0" fromWordArt="0" anchor="t" anchorCtr="0" forceAA="0" compatLnSpc="1">
-                  <a:prstTxWarp prst="textNoShape">
-                    <a:avLst/>
-                  </a:prstTxWarp>
-                  <a:noAutofit/>
-                </a:bodyPr>
-                <a:lstStyle/>
-                <a:p>
-                  <a:endParaRPr lang="en-US" sz="16600" b="1" cap="none" spc="0" dirty="0">
-                    <a:ln w="0"/>
-                    <a:solidFill>
-                      <a:schemeClr val="tx1"/>
-                    </a:solidFill>
-                    <a:latin typeface="Siegra" pitchFamily="2" charset="0"/>
-                  </a:endParaRPr>
-                </a:p>
-              </p:txBody>
-            </p:sp>
-          </p:grpSp>
-          <p:sp>
-            <p:nvSpPr>
-              <p:cNvPr id="20" name="Rectangle 19">
-                <a:extLst>
-                  <a:ext uri="{FF2B5EF4-FFF2-40B4-BE49-F238E27FC236}">
-                    <a16:creationId xmlns:a16="http://schemas.microsoft.com/office/drawing/2014/main" id="{CD583955-1750-7BFF-835D-73FED06C0994}"/>
+                    <a16:creationId xmlns:a16="http://schemas.microsoft.com/office/drawing/2014/main" id="{FE58AF83-D54D-021C-22D6-F6B003A3A7A8}"/>
                   </a:ext>
                 </a:extLst>
               </p:cNvPr>
@@ -9265,34 +8556,2579 @@
             </p:nvSpPr>
             <p:spPr>
               <a:xfrm>
-                <a:off x="4166720" y="2485983"/>
-                <a:ext cx="3941939" cy="483468"/>
+                <a:off x="4635812" y="1260776"/>
+                <a:ext cx="869957" cy="869957"/>
               </a:xfrm>
-              <a:prstGeom prst="rect">
+              <a:custGeom>
                 <a:avLst/>
-              </a:prstGeom>
-              <a:noFill/>
+                <a:gdLst>
+                  <a:gd name="connsiteX0" fmla="*/ 869957 w 869957"/>
+                  <a:gd name="connsiteY0" fmla="*/ 434979 h 869957"/>
+                  <a:gd name="connsiteX1" fmla="*/ 434979 w 869957"/>
+                  <a:gd name="connsiteY1" fmla="*/ 869957 h 869957"/>
+                  <a:gd name="connsiteX2" fmla="*/ 0 w 869957"/>
+                  <a:gd name="connsiteY2" fmla="*/ 434979 h 869957"/>
+                  <a:gd name="connsiteX3" fmla="*/ 434979 w 869957"/>
+                  <a:gd name="connsiteY3" fmla="*/ 0 h 869957"/>
+                  <a:gd name="connsiteX4" fmla="*/ 869957 w 869957"/>
+                  <a:gd name="connsiteY4" fmla="*/ 434979 h 869957"/>
+                </a:gdLst>
+                <a:ahLst/>
+                <a:cxnLst>
+                  <a:cxn ang="0">
+                    <a:pos x="connsiteX0" y="connsiteY0"/>
+                  </a:cxn>
+                  <a:cxn ang="0">
+                    <a:pos x="connsiteX1" y="connsiteY1"/>
+                  </a:cxn>
+                  <a:cxn ang="0">
+                    <a:pos x="connsiteX2" y="connsiteY2"/>
+                  </a:cxn>
+                  <a:cxn ang="0">
+                    <a:pos x="connsiteX3" y="connsiteY3"/>
+                  </a:cxn>
+                  <a:cxn ang="0">
+                    <a:pos x="connsiteX4" y="connsiteY4"/>
+                  </a:cxn>
+                </a:cxnLst>
+                <a:rect l="l" t="t" r="r" b="b"/>
+                <a:pathLst>
+                  <a:path w="869957" h="869957">
+                    <a:moveTo>
+                      <a:pt x="869957" y="434979"/>
+                    </a:moveTo>
+                    <a:cubicBezTo>
+                      <a:pt x="869957" y="675211"/>
+                      <a:pt x="675211" y="869957"/>
+                      <a:pt x="434979" y="869957"/>
+                    </a:cubicBezTo>
+                    <a:cubicBezTo>
+                      <a:pt x="194746" y="869957"/>
+                      <a:pt x="0" y="675211"/>
+                      <a:pt x="0" y="434979"/>
+                    </a:cubicBezTo>
+                    <a:cubicBezTo>
+                      <a:pt x="0" y="194747"/>
+                      <a:pt x="194746" y="0"/>
+                      <a:pt x="434979" y="0"/>
+                    </a:cubicBezTo>
+                    <a:cubicBezTo>
+                      <a:pt x="675211" y="0"/>
+                      <a:pt x="869957" y="194747"/>
+                      <a:pt x="869957" y="434979"/>
+                    </a:cubicBezTo>
+                    <a:close/>
+                  </a:path>
+                </a:pathLst>
+              </a:custGeom>
+              <a:grpFill/>
+              <a:ln w="93785" cap="flat">
+                <a:noFill/>
+                <a:prstDash val="solid"/>
+                <a:miter/>
+              </a:ln>
+              <a:effectLst>
+                <a:outerShdw blurRad="190500" dist="228600" dir="2700000" algn="ctr">
+                  <a:srgbClr val="000000">
+                    <a:alpha val="30000"/>
+                  </a:srgbClr>
+                </a:outerShdw>
+              </a:effectLst>
+              <a:sp3d prstMaterial="matte">
+                <a:bevelT w="127000" h="63500"/>
+              </a:sp3d>
             </p:spPr>
             <p:txBody>
-              <a:bodyPr wrap="none" lIns="91440" tIns="45720" rIns="91440" bIns="45720">
-                <a:spAutoFit/>
-              </a:bodyPr>
+              <a:bodyPr rtlCol="0" anchor="ctr"/>
               <a:lstStyle/>
               <a:p>
-                <a:r>
-                  <a:rPr lang="en-US" sz="2400" b="0" cap="none" spc="300" dirty="0">
-                    <a:ln w="0"/>
-                    <a:solidFill>
-                      <a:schemeClr val="tx1">
-                        <a:lumMod val="50000"/>
-                        <a:lumOff val="50000"/>
-                      </a:schemeClr>
-                    </a:solidFill>
-                    <a:latin typeface="Poppins" panose="00000500000000000000" pitchFamily="2" charset="0"/>
-                    <a:cs typeface="Poppins" panose="00000500000000000000" pitchFamily="2" charset="0"/>
-                  </a:rPr>
-                  <a:t>MOVERS &amp; PACKERS</a:t>
-                </a:r>
+                <a:endParaRPr lang="en-US"/>
+              </a:p>
+            </p:txBody>
+          </p:sp>
+          <p:sp>
+            <p:nvSpPr>
+              <p:cNvPr id="8" name="Freeform: Shape 7">
+                <a:extLst>
+                  <a:ext uri="{FF2B5EF4-FFF2-40B4-BE49-F238E27FC236}">
+                    <a16:creationId xmlns:a16="http://schemas.microsoft.com/office/drawing/2014/main" id="{03935BF2-201A-747D-330B-028C0C97D943}"/>
+                  </a:ext>
+                </a:extLst>
+              </p:cNvPr>
+              <p:cNvSpPr/>
+              <p:nvPr/>
+            </p:nvSpPr>
+            <p:spPr>
+              <a:xfrm>
+                <a:off x="4113275" y="2147438"/>
+                <a:ext cx="306127" cy="306127"/>
+              </a:xfrm>
+              <a:custGeom>
+                <a:avLst/>
+                <a:gdLst>
+                  <a:gd name="connsiteX0" fmla="*/ 306127 w 306127"/>
+                  <a:gd name="connsiteY0" fmla="*/ 153064 h 306127"/>
+                  <a:gd name="connsiteX1" fmla="*/ 153064 w 306127"/>
+                  <a:gd name="connsiteY1" fmla="*/ 306127 h 306127"/>
+                  <a:gd name="connsiteX2" fmla="*/ 0 w 306127"/>
+                  <a:gd name="connsiteY2" fmla="*/ 153064 h 306127"/>
+                  <a:gd name="connsiteX3" fmla="*/ 153064 w 306127"/>
+                  <a:gd name="connsiteY3" fmla="*/ 0 h 306127"/>
+                  <a:gd name="connsiteX4" fmla="*/ 306127 w 306127"/>
+                  <a:gd name="connsiteY4" fmla="*/ 153064 h 306127"/>
+                </a:gdLst>
+                <a:ahLst/>
+                <a:cxnLst>
+                  <a:cxn ang="0">
+                    <a:pos x="connsiteX0" y="connsiteY0"/>
+                  </a:cxn>
+                  <a:cxn ang="0">
+                    <a:pos x="connsiteX1" y="connsiteY1"/>
+                  </a:cxn>
+                  <a:cxn ang="0">
+                    <a:pos x="connsiteX2" y="connsiteY2"/>
+                  </a:cxn>
+                  <a:cxn ang="0">
+                    <a:pos x="connsiteX3" y="connsiteY3"/>
+                  </a:cxn>
+                  <a:cxn ang="0">
+                    <a:pos x="connsiteX4" y="connsiteY4"/>
+                  </a:cxn>
+                </a:cxnLst>
+                <a:rect l="l" t="t" r="r" b="b"/>
+                <a:pathLst>
+                  <a:path w="306127" h="306127">
+                    <a:moveTo>
+                      <a:pt x="306127" y="153064"/>
+                    </a:moveTo>
+                    <a:cubicBezTo>
+                      <a:pt x="306127" y="237598"/>
+                      <a:pt x="237598" y="306127"/>
+                      <a:pt x="153064" y="306127"/>
+                    </a:cubicBezTo>
+                    <a:cubicBezTo>
+                      <a:pt x="68529" y="306127"/>
+                      <a:pt x="0" y="237599"/>
+                      <a:pt x="0" y="153064"/>
+                    </a:cubicBezTo>
+                    <a:cubicBezTo>
+                      <a:pt x="0" y="68529"/>
+                      <a:pt x="68529" y="0"/>
+                      <a:pt x="153064" y="0"/>
+                    </a:cubicBezTo>
+                    <a:cubicBezTo>
+                      <a:pt x="237599" y="0"/>
+                      <a:pt x="306127" y="68529"/>
+                      <a:pt x="306127" y="153064"/>
+                    </a:cubicBezTo>
+                    <a:close/>
+                  </a:path>
+                </a:pathLst>
+              </a:custGeom>
+              <a:grpFill/>
+              <a:ln w="93785" cap="flat">
+                <a:noFill/>
+                <a:prstDash val="solid"/>
+                <a:miter/>
+              </a:ln>
+              <a:effectLst>
+                <a:outerShdw blurRad="190500" dist="228600" dir="2700000" algn="ctr">
+                  <a:srgbClr val="000000">
+                    <a:alpha val="30000"/>
+                  </a:srgbClr>
+                </a:outerShdw>
+              </a:effectLst>
+              <a:sp3d prstMaterial="matte">
+                <a:bevelT w="127000" h="63500"/>
+              </a:sp3d>
+            </p:spPr>
+            <p:txBody>
+              <a:bodyPr rtlCol="0" anchor="ctr"/>
+              <a:lstStyle/>
+              <a:p>
+                <a:endParaRPr lang="en-US"/>
+              </a:p>
+            </p:txBody>
+          </p:sp>
+        </p:grpSp>
+      </p:grpSp>
+      <p:grpSp>
+        <p:nvGrpSpPr>
+          <p:cNvPr id="19" name="Group 18">
+            <a:extLst>
+              <a:ext uri="{FF2B5EF4-FFF2-40B4-BE49-F238E27FC236}">
+                <a16:creationId xmlns:a16="http://schemas.microsoft.com/office/drawing/2014/main" id="{4D5A5288-75E0-9D43-D989-8448C3DB7890}"/>
+              </a:ext>
+            </a:extLst>
+          </p:cNvPr>
+          <p:cNvGrpSpPr/>
+          <p:nvPr/>
+        </p:nvGrpSpPr>
+        <p:grpSpPr>
+          <a:xfrm>
+            <a:off x="5187496" y="2235042"/>
+            <a:ext cx="3594422" cy="845288"/>
+            <a:chOff x="3117176" y="1605518"/>
+            <a:chExt cx="5733565" cy="1402894"/>
+          </a:xfrm>
+          <a:solidFill>
+            <a:schemeClr val="tx1">
+              <a:lumMod val="75000"/>
+              <a:lumOff val="25000"/>
+            </a:schemeClr>
+          </a:solidFill>
+          <a:scene3d>
+            <a:camera prst="orthographicFront">
+              <a:rot lat="0" lon="0" rev="0"/>
+            </a:camera>
+            <a:lightRig rig="balanced" dir="t">
+              <a:rot lat="0" lon="0" rev="8700000"/>
+            </a:lightRig>
+          </a:scene3d>
+        </p:grpSpPr>
+        <p:sp>
+          <p:nvSpPr>
+            <p:cNvPr id="14" name="Freeform: Shape 13">
+              <a:extLst>
+                <a:ext uri="{FF2B5EF4-FFF2-40B4-BE49-F238E27FC236}">
+                  <a16:creationId xmlns:a16="http://schemas.microsoft.com/office/drawing/2014/main" id="{1A974BDA-B27E-A5CE-3AB3-36070133F305}"/>
+                </a:ext>
+              </a:extLst>
+            </p:cNvPr>
+            <p:cNvSpPr/>
+            <p:nvPr/>
+          </p:nvSpPr>
+          <p:spPr>
+            <a:xfrm>
+              <a:off x="3117176" y="1605518"/>
+              <a:ext cx="1915806" cy="1402894"/>
+            </a:xfrm>
+            <a:custGeom>
+              <a:avLst/>
+              <a:gdLst/>
+              <a:ahLst/>
+              <a:cxnLst/>
+              <a:rect l="l" t="t" r="r" b="b"/>
+              <a:pathLst>
+                <a:path w="1915806" h="1098823">
+                  <a:moveTo>
+                    <a:pt x="418245" y="0"/>
+                  </a:moveTo>
+                  <a:lnTo>
+                    <a:pt x="590035" y="0"/>
+                  </a:lnTo>
+                  <a:lnTo>
+                    <a:pt x="354634" y="770439"/>
+                  </a:lnTo>
+                  <a:lnTo>
+                    <a:pt x="1353994" y="770439"/>
+                  </a:lnTo>
+                  <a:lnTo>
+                    <a:pt x="1546867" y="143010"/>
+                  </a:lnTo>
+                  <a:cubicBezTo>
+                    <a:pt x="1558291" y="101546"/>
+                    <a:pt x="1582477" y="67344"/>
+                    <a:pt x="1619425" y="40407"/>
+                  </a:cubicBezTo>
+                  <a:cubicBezTo>
+                    <a:pt x="1656373" y="13469"/>
+                    <a:pt x="1697892" y="0"/>
+                    <a:pt x="1743983" y="0"/>
+                  </a:cubicBezTo>
+                  <a:lnTo>
+                    <a:pt x="1915806" y="0"/>
+                  </a:lnTo>
+                  <a:lnTo>
+                    <a:pt x="1586040" y="1098823"/>
+                  </a:lnTo>
+                  <a:lnTo>
+                    <a:pt x="207611" y="1098823"/>
+                  </a:lnTo>
+                  <a:cubicBezTo>
+                    <a:pt x="172286" y="1098823"/>
+                    <a:pt x="140086" y="1091176"/>
+                    <a:pt x="111010" y="1075882"/>
+                  </a:cubicBezTo>
+                  <a:cubicBezTo>
+                    <a:pt x="81934" y="1060587"/>
+                    <a:pt x="58198" y="1040299"/>
+                    <a:pt x="39801" y="1015017"/>
+                  </a:cubicBezTo>
+                  <a:cubicBezTo>
+                    <a:pt x="21404" y="989735"/>
+                    <a:pt x="9256" y="961443"/>
+                    <a:pt x="3358" y="930142"/>
+                  </a:cubicBezTo>
+                  <a:cubicBezTo>
+                    <a:pt x="-2541" y="898840"/>
+                    <a:pt x="-666" y="872665"/>
+                    <a:pt x="8982" y="851614"/>
+                  </a:cubicBezTo>
+                  <a:lnTo>
+                    <a:pt x="221162" y="142780"/>
+                  </a:lnTo>
+                  <a:cubicBezTo>
+                    <a:pt x="232564" y="101425"/>
+                    <a:pt x="256728" y="67290"/>
+                    <a:pt x="293654" y="40374"/>
+                  </a:cubicBezTo>
+                  <a:cubicBezTo>
+                    <a:pt x="330579" y="13458"/>
+                    <a:pt x="372110" y="0"/>
+                    <a:pt x="418245" y="0"/>
+                  </a:cubicBezTo>
+                  <a:close/>
+                </a:path>
+              </a:pathLst>
+            </a:custGeom>
+            <a:grpFill/>
+            <a:ln w="0">
+              <a:noFill/>
+            </a:ln>
+            <a:effectLst>
+              <a:outerShdw blurRad="44450" dist="27940" dir="5400000" algn="ctr">
+                <a:srgbClr val="000000">
+                  <a:alpha val="32000"/>
+                </a:srgbClr>
+              </a:outerShdw>
+            </a:effectLst>
+            <a:sp3d>
+              <a:bevelT w="190500" h="38100"/>
+            </a:sp3d>
+          </p:spPr>
+          <p:txBody>
+            <a:bodyPr rot="0" spcFirstLastPara="0" vertOverflow="overflow" horzOverflow="overflow" vert="horz" wrap="square" lIns="91440" tIns="45720" rIns="91440" bIns="45720" numCol="1" spcCol="0" rtlCol="0" fromWordArt="0" anchor="t" anchorCtr="0" forceAA="0" compatLnSpc="1">
+              <a:prstTxWarp prst="textNoShape">
+                <a:avLst/>
+              </a:prstTxWarp>
+              <a:noAutofit/>
+            </a:bodyPr>
+            <a:lstStyle/>
+            <a:p>
+              <a:endParaRPr lang="en-US" sz="16600" b="1" cap="none" spc="0" dirty="0">
+                <a:ln w="0"/>
+                <a:solidFill>
+                  <a:schemeClr val="tx1"/>
+                </a:solidFill>
+                <a:latin typeface="Siegra" pitchFamily="2" charset="0"/>
+              </a:endParaRPr>
+            </a:p>
+          </p:txBody>
+        </p:sp>
+        <p:sp>
+          <p:nvSpPr>
+            <p:cNvPr id="17" name="Freeform: Shape 16">
+              <a:extLst>
+                <a:ext uri="{FF2B5EF4-FFF2-40B4-BE49-F238E27FC236}">
+                  <a16:creationId xmlns:a16="http://schemas.microsoft.com/office/drawing/2014/main" id="{DE58A1BC-F2F5-BA05-22E0-B658976DB259}"/>
+                </a:ext>
+              </a:extLst>
+            </p:cNvPr>
+            <p:cNvSpPr/>
+            <p:nvPr/>
+          </p:nvSpPr>
+          <p:spPr>
+            <a:xfrm>
+              <a:off x="5032982" y="1624473"/>
+              <a:ext cx="1981158" cy="1364983"/>
+            </a:xfrm>
+            <a:custGeom>
+              <a:avLst/>
+              <a:gdLst/>
+              <a:ahLst/>
+              <a:cxnLst/>
+              <a:rect l="l" t="t" r="r" b="b"/>
+              <a:pathLst>
+                <a:path w="1981158" h="1098823">
+                  <a:moveTo>
+                    <a:pt x="613714" y="328384"/>
+                  </a:moveTo>
+                  <a:cubicBezTo>
+                    <a:pt x="597970" y="328384"/>
+                    <a:pt x="583903" y="333235"/>
+                    <a:pt x="571515" y="342938"/>
+                  </a:cubicBezTo>
+                  <a:cubicBezTo>
+                    <a:pt x="559126" y="352641"/>
+                    <a:pt x="550212" y="365145"/>
+                    <a:pt x="544774" y="380451"/>
+                  </a:cubicBezTo>
+                  <a:lnTo>
+                    <a:pt x="492280" y="530466"/>
+                  </a:lnTo>
+                  <a:lnTo>
+                    <a:pt x="1491641" y="530466"/>
+                  </a:lnTo>
+                  <a:lnTo>
+                    <a:pt x="1561172" y="328384"/>
+                  </a:lnTo>
+                  <a:close/>
+                  <a:moveTo>
+                    <a:pt x="588947" y="0"/>
+                  </a:moveTo>
+                  <a:lnTo>
+                    <a:pt x="1981158" y="0"/>
+                  </a:lnTo>
+                  <a:lnTo>
+                    <a:pt x="1694348" y="954695"/>
+                  </a:lnTo>
+                  <a:cubicBezTo>
+                    <a:pt x="1682661" y="997080"/>
+                    <a:pt x="1658393" y="1031698"/>
+                    <a:pt x="1621544" y="1058548"/>
+                  </a:cubicBezTo>
+                  <a:cubicBezTo>
+                    <a:pt x="1584695" y="1085398"/>
+                    <a:pt x="1543367" y="1098823"/>
+                    <a:pt x="1497561" y="1098823"/>
+                  </a:cubicBezTo>
+                  <a:lnTo>
+                    <a:pt x="1325738" y="1098823"/>
+                  </a:lnTo>
+                  <a:lnTo>
+                    <a:pt x="1398033" y="858850"/>
+                  </a:lnTo>
+                  <a:lnTo>
+                    <a:pt x="397949" y="858850"/>
+                  </a:lnTo>
+                  <a:lnTo>
+                    <a:pt x="368610" y="954464"/>
+                  </a:lnTo>
+                  <a:cubicBezTo>
+                    <a:pt x="356901" y="996872"/>
+                    <a:pt x="332622" y="1031534"/>
+                    <a:pt x="295773" y="1058449"/>
+                  </a:cubicBezTo>
+                  <a:cubicBezTo>
+                    <a:pt x="258924" y="1085365"/>
+                    <a:pt x="217596" y="1098823"/>
+                    <a:pt x="171790" y="1098823"/>
+                  </a:cubicBezTo>
+                  <a:lnTo>
+                    <a:pt x="0" y="1098823"/>
+                  </a:lnTo>
+                  <a:lnTo>
+                    <a:pt x="252603" y="248919"/>
+                  </a:lnTo>
+                  <a:cubicBezTo>
+                    <a:pt x="264159" y="211380"/>
+                    <a:pt x="280791" y="177420"/>
+                    <a:pt x="302499" y="147039"/>
+                  </a:cubicBezTo>
+                  <a:cubicBezTo>
+                    <a:pt x="324207" y="116659"/>
+                    <a:pt x="349676" y="90516"/>
+                    <a:pt x="378905" y="68611"/>
+                  </a:cubicBezTo>
+                  <a:cubicBezTo>
+                    <a:pt x="408134" y="46705"/>
+                    <a:pt x="441008" y="29794"/>
+                    <a:pt x="477528" y="17876"/>
+                  </a:cubicBezTo>
+                  <a:cubicBezTo>
+                    <a:pt x="514048" y="5959"/>
+                    <a:pt x="551188" y="0"/>
+                    <a:pt x="588947" y="0"/>
+                  </a:cubicBezTo>
+                  <a:close/>
+                </a:path>
+              </a:pathLst>
+            </a:custGeom>
+            <a:grpFill/>
+            <a:ln w="0">
+              <a:noFill/>
+            </a:ln>
+            <a:effectLst>
+              <a:outerShdw blurRad="44450" dist="27940" dir="5400000" algn="ctr">
+                <a:srgbClr val="000000">
+                  <a:alpha val="32000"/>
+                </a:srgbClr>
+              </a:outerShdw>
+            </a:effectLst>
+            <a:sp3d>
+              <a:bevelT w="190500" h="38100"/>
+            </a:sp3d>
+          </p:spPr>
+          <p:txBody>
+            <a:bodyPr rot="0" spcFirstLastPara="0" vertOverflow="overflow" horzOverflow="overflow" vert="horz" wrap="square" lIns="91440" tIns="45720" rIns="91440" bIns="45720" numCol="1" spcCol="0" rtlCol="0" fromWordArt="0" anchor="t" anchorCtr="0" forceAA="0" compatLnSpc="1">
+              <a:prstTxWarp prst="textNoShape">
+                <a:avLst/>
+              </a:prstTxWarp>
+              <a:noAutofit/>
+            </a:bodyPr>
+            <a:lstStyle/>
+            <a:p>
+              <a:endParaRPr lang="en-US" sz="16600" b="1" cap="none" spc="0" dirty="0">
+                <a:ln w="0"/>
+                <a:solidFill>
+                  <a:schemeClr val="tx1"/>
+                </a:solidFill>
+                <a:latin typeface="Siegra" pitchFamily="2" charset="0"/>
+              </a:endParaRPr>
+            </a:p>
+          </p:txBody>
+        </p:sp>
+        <p:sp>
+          <p:nvSpPr>
+            <p:cNvPr id="18" name="Freeform: Shape 17">
+              <a:extLst>
+                <a:ext uri="{FF2B5EF4-FFF2-40B4-BE49-F238E27FC236}">
+                  <a16:creationId xmlns:a16="http://schemas.microsoft.com/office/drawing/2014/main" id="{80BA3F4C-7A2D-AFAD-C812-69D0393D61A4}"/>
+                </a:ext>
+              </a:extLst>
+            </p:cNvPr>
+            <p:cNvSpPr/>
+            <p:nvPr/>
+          </p:nvSpPr>
+          <p:spPr>
+            <a:xfrm>
+              <a:off x="7014140" y="1643428"/>
+              <a:ext cx="1836601" cy="1364984"/>
+            </a:xfrm>
+            <a:custGeom>
+              <a:avLst/>
+              <a:gdLst/>
+              <a:ahLst/>
+              <a:cxnLst/>
+              <a:rect l="l" t="t" r="r" b="b"/>
+              <a:pathLst>
+                <a:path w="1836601" h="1098823">
+                  <a:moveTo>
+                    <a:pt x="526980" y="0"/>
+                  </a:moveTo>
+                  <a:lnTo>
+                    <a:pt x="1836601" y="0"/>
+                  </a:lnTo>
+                  <a:lnTo>
+                    <a:pt x="1784535" y="188893"/>
+                  </a:lnTo>
+                  <a:cubicBezTo>
+                    <a:pt x="1773221" y="229854"/>
+                    <a:pt x="1749150" y="263342"/>
+                    <a:pt x="1712323" y="289359"/>
+                  </a:cubicBezTo>
+                  <a:cubicBezTo>
+                    <a:pt x="1675496" y="315376"/>
+                    <a:pt x="1634190" y="328384"/>
+                    <a:pt x="1588406" y="328384"/>
+                  </a:cubicBezTo>
+                  <a:lnTo>
+                    <a:pt x="561121" y="328384"/>
+                  </a:lnTo>
+                  <a:lnTo>
+                    <a:pt x="537702" y="383115"/>
+                  </a:lnTo>
+                  <a:lnTo>
+                    <a:pt x="1718917" y="383115"/>
+                  </a:lnTo>
+                  <a:lnTo>
+                    <a:pt x="1666851" y="572008"/>
+                  </a:lnTo>
+                  <a:cubicBezTo>
+                    <a:pt x="1655537" y="612968"/>
+                    <a:pt x="1631460" y="646457"/>
+                    <a:pt x="1594622" y="672473"/>
+                  </a:cubicBezTo>
+                  <a:cubicBezTo>
+                    <a:pt x="1557784" y="698490"/>
+                    <a:pt x="1516473" y="711499"/>
+                    <a:pt x="1470689" y="711499"/>
+                  </a:cubicBezTo>
+                  <a:lnTo>
+                    <a:pt x="443503" y="711499"/>
+                  </a:lnTo>
+                  <a:lnTo>
+                    <a:pt x="419985" y="770439"/>
+                  </a:lnTo>
+                  <a:lnTo>
+                    <a:pt x="1601200" y="770439"/>
+                  </a:lnTo>
+                  <a:lnTo>
+                    <a:pt x="1549299" y="956767"/>
+                  </a:lnTo>
+                  <a:cubicBezTo>
+                    <a:pt x="1537940" y="997859"/>
+                    <a:pt x="1513831" y="1031808"/>
+                    <a:pt x="1476971" y="1058614"/>
+                  </a:cubicBezTo>
+                  <a:cubicBezTo>
+                    <a:pt x="1440111" y="1085420"/>
+                    <a:pt x="1398789" y="1098823"/>
+                    <a:pt x="1353005" y="1098823"/>
+                  </a:cubicBezTo>
+                  <a:lnTo>
+                    <a:pt x="0" y="1098823"/>
+                  </a:lnTo>
+                  <a:lnTo>
+                    <a:pt x="272897" y="183466"/>
+                  </a:lnTo>
+                  <a:cubicBezTo>
+                    <a:pt x="287939" y="131476"/>
+                    <a:pt x="319416" y="87901"/>
+                    <a:pt x="367327" y="52741"/>
+                  </a:cubicBezTo>
+                  <a:cubicBezTo>
+                    <a:pt x="415238" y="17580"/>
+                    <a:pt x="468456" y="0"/>
+                    <a:pt x="526980" y="0"/>
+                  </a:cubicBezTo>
+                  <a:close/>
+                </a:path>
+              </a:pathLst>
+            </a:custGeom>
+            <a:grpFill/>
+            <a:ln w="0">
+              <a:noFill/>
+            </a:ln>
+            <a:effectLst>
+              <a:outerShdw blurRad="44450" dist="27940" dir="5400000" algn="ctr">
+                <a:srgbClr val="000000">
+                  <a:alpha val="32000"/>
+                </a:srgbClr>
+              </a:outerShdw>
+            </a:effectLst>
+            <a:sp3d>
+              <a:bevelT w="190500" h="38100"/>
+            </a:sp3d>
+          </p:spPr>
+          <p:txBody>
+            <a:bodyPr rot="0" spcFirstLastPara="0" vertOverflow="overflow" horzOverflow="overflow" vert="horz" wrap="square" lIns="91440" tIns="45720" rIns="91440" bIns="45720" numCol="1" spcCol="0" rtlCol="0" fromWordArt="0" anchor="t" anchorCtr="0" forceAA="0" compatLnSpc="1">
+              <a:prstTxWarp prst="textNoShape">
+                <a:avLst/>
+              </a:prstTxWarp>
+              <a:noAutofit/>
+            </a:bodyPr>
+            <a:lstStyle/>
+            <a:p>
+              <a:endParaRPr lang="en-US" sz="16600" b="1" cap="none" spc="0" dirty="0">
+                <a:ln w="0"/>
+                <a:solidFill>
+                  <a:schemeClr val="tx1"/>
+                </a:solidFill>
+                <a:latin typeface="Siegra" pitchFamily="2" charset="0"/>
+              </a:endParaRPr>
+            </a:p>
+          </p:txBody>
+        </p:sp>
+      </p:grpSp>
+      <p:sp>
+        <p:nvSpPr>
+          <p:cNvPr id="4" name="Freeform: Shape 3">
+            <a:extLst>
+              <a:ext uri="{FF2B5EF4-FFF2-40B4-BE49-F238E27FC236}">
+                <a16:creationId xmlns:a16="http://schemas.microsoft.com/office/drawing/2014/main" id="{54F2A551-97A5-88E2-1349-80C8884C2A35}"/>
+              </a:ext>
+            </a:extLst>
+          </p:cNvPr>
+          <p:cNvSpPr/>
+          <p:nvPr/>
+        </p:nvSpPr>
+        <p:spPr>
+          <a:xfrm>
+            <a:off x="5187496" y="3318814"/>
+            <a:ext cx="3471824" cy="220371"/>
+          </a:xfrm>
+          <a:custGeom>
+            <a:avLst/>
+            <a:gdLst/>
+            <a:ahLst/>
+            <a:cxnLst/>
+            <a:rect l="l" t="t" r="r" b="b"/>
+            <a:pathLst>
+              <a:path w="3471824" h="220371">
+                <a:moveTo>
+                  <a:pt x="1626184" y="107595"/>
+                </a:moveTo>
+                <a:cubicBezTo>
+                  <a:pt x="1600174" y="117552"/>
+                  <a:pt x="1587170" y="133300"/>
+                  <a:pt x="1587170" y="154839"/>
+                </a:cubicBezTo>
+                <a:cubicBezTo>
+                  <a:pt x="1587170" y="166828"/>
+                  <a:pt x="1591488" y="176784"/>
+                  <a:pt x="1600124" y="184709"/>
+                </a:cubicBezTo>
+                <a:cubicBezTo>
+                  <a:pt x="1608760" y="192634"/>
+                  <a:pt x="1619986" y="196596"/>
+                  <a:pt x="1633804" y="196596"/>
+                </a:cubicBezTo>
+                <a:cubicBezTo>
+                  <a:pt x="1644777" y="196596"/>
+                  <a:pt x="1654683" y="194463"/>
+                  <a:pt x="1663522" y="190196"/>
+                </a:cubicBezTo>
+                <a:cubicBezTo>
+                  <a:pt x="1672361" y="185928"/>
+                  <a:pt x="1680743" y="179324"/>
+                  <a:pt x="1688668" y="170384"/>
+                </a:cubicBezTo>
+                <a:close/>
+                <a:moveTo>
+                  <a:pt x="2260473" y="39624"/>
+                </a:moveTo>
+                <a:lnTo>
+                  <a:pt x="2222068" y="146914"/>
+                </a:lnTo>
+                <a:lnTo>
+                  <a:pt x="2298878" y="146914"/>
+                </a:lnTo>
+                <a:close/>
+                <a:moveTo>
+                  <a:pt x="3142412" y="27128"/>
+                </a:moveTo>
+                <a:lnTo>
+                  <a:pt x="3142412" y="107595"/>
+                </a:lnTo>
+                <a:lnTo>
+                  <a:pt x="3183255" y="107595"/>
+                </a:lnTo>
+                <a:cubicBezTo>
+                  <a:pt x="3198291" y="107595"/>
+                  <a:pt x="3209569" y="103886"/>
+                  <a:pt x="3217088" y="96470"/>
+                </a:cubicBezTo>
+                <a:cubicBezTo>
+                  <a:pt x="3224606" y="89053"/>
+                  <a:pt x="3228365" y="79147"/>
+                  <a:pt x="3228365" y="66752"/>
+                </a:cubicBezTo>
+                <a:cubicBezTo>
+                  <a:pt x="3228365" y="54153"/>
+                  <a:pt x="3224656" y="44400"/>
+                  <a:pt x="3217240" y="37491"/>
+                </a:cubicBezTo>
+                <a:cubicBezTo>
+                  <a:pt x="3209823" y="30582"/>
+                  <a:pt x="3198495" y="27128"/>
+                  <a:pt x="3183255" y="27128"/>
+                </a:cubicBezTo>
+                <a:close/>
+                <a:moveTo>
+                  <a:pt x="1989887" y="27128"/>
+                </a:moveTo>
+                <a:lnTo>
+                  <a:pt x="1989887" y="105156"/>
+                </a:lnTo>
+                <a:lnTo>
+                  <a:pt x="2030730" y="105156"/>
+                </a:lnTo>
+                <a:cubicBezTo>
+                  <a:pt x="2046173" y="105156"/>
+                  <a:pt x="2057552" y="101804"/>
+                  <a:pt x="2064867" y="95098"/>
+                </a:cubicBezTo>
+                <a:cubicBezTo>
+                  <a:pt x="2072183" y="88392"/>
+                  <a:pt x="2075840" y="78842"/>
+                  <a:pt x="2075840" y="66447"/>
+                </a:cubicBezTo>
+                <a:cubicBezTo>
+                  <a:pt x="2075840" y="40234"/>
+                  <a:pt x="2060803" y="27128"/>
+                  <a:pt x="2030730" y="27128"/>
+                </a:cubicBezTo>
+                <a:close/>
+                <a:moveTo>
+                  <a:pt x="1046912" y="27128"/>
+                </a:moveTo>
+                <a:lnTo>
+                  <a:pt x="1046912" y="107595"/>
+                </a:lnTo>
+                <a:lnTo>
+                  <a:pt x="1087755" y="107595"/>
+                </a:lnTo>
+                <a:cubicBezTo>
+                  <a:pt x="1102792" y="107595"/>
+                  <a:pt x="1114069" y="103886"/>
+                  <a:pt x="1121588" y="96470"/>
+                </a:cubicBezTo>
+                <a:cubicBezTo>
+                  <a:pt x="1129106" y="89053"/>
+                  <a:pt x="1132865" y="79147"/>
+                  <a:pt x="1132865" y="66752"/>
+                </a:cubicBezTo>
+                <a:cubicBezTo>
+                  <a:pt x="1132865" y="54153"/>
+                  <a:pt x="1129157" y="44400"/>
+                  <a:pt x="1121740" y="37491"/>
+                </a:cubicBezTo>
+                <a:cubicBezTo>
+                  <a:pt x="1114323" y="30582"/>
+                  <a:pt x="1102995" y="27128"/>
+                  <a:pt x="1087755" y="27128"/>
+                </a:cubicBezTo>
+                <a:close/>
+                <a:moveTo>
+                  <a:pt x="401117" y="25908"/>
+                </a:moveTo>
+                <a:cubicBezTo>
+                  <a:pt x="386080" y="25908"/>
+                  <a:pt x="372669" y="29363"/>
+                  <a:pt x="360883" y="36272"/>
+                </a:cubicBezTo>
+                <a:cubicBezTo>
+                  <a:pt x="349098" y="43180"/>
+                  <a:pt x="339801" y="52985"/>
+                  <a:pt x="332994" y="65685"/>
+                </a:cubicBezTo>
+                <a:cubicBezTo>
+                  <a:pt x="326187" y="78385"/>
+                  <a:pt x="322783" y="93269"/>
+                  <a:pt x="322783" y="110338"/>
+                </a:cubicBezTo>
+                <a:cubicBezTo>
+                  <a:pt x="322783" y="127204"/>
+                  <a:pt x="326187" y="142037"/>
+                  <a:pt x="332994" y="154839"/>
+                </a:cubicBezTo>
+                <a:cubicBezTo>
+                  <a:pt x="339801" y="167640"/>
+                  <a:pt x="349148" y="177496"/>
+                  <a:pt x="361035" y="184404"/>
+                </a:cubicBezTo>
+                <a:cubicBezTo>
+                  <a:pt x="372923" y="191313"/>
+                  <a:pt x="386283" y="194768"/>
+                  <a:pt x="401117" y="194768"/>
+                </a:cubicBezTo>
+                <a:cubicBezTo>
+                  <a:pt x="415950" y="194768"/>
+                  <a:pt x="429311" y="191313"/>
+                  <a:pt x="441198" y="184404"/>
+                </a:cubicBezTo>
+                <a:cubicBezTo>
+                  <a:pt x="453085" y="177496"/>
+                  <a:pt x="462432" y="167640"/>
+                  <a:pt x="469239" y="154839"/>
+                </a:cubicBezTo>
+                <a:cubicBezTo>
+                  <a:pt x="476047" y="142037"/>
+                  <a:pt x="479450" y="127204"/>
+                  <a:pt x="479450" y="110338"/>
+                </a:cubicBezTo>
+                <a:cubicBezTo>
+                  <a:pt x="479450" y="93269"/>
+                  <a:pt x="476047" y="78385"/>
+                  <a:pt x="469239" y="65685"/>
+                </a:cubicBezTo>
+                <a:cubicBezTo>
+                  <a:pt x="462432" y="52985"/>
+                  <a:pt x="453136" y="43180"/>
+                  <a:pt x="441350" y="36272"/>
+                </a:cubicBezTo>
+                <a:cubicBezTo>
+                  <a:pt x="429565" y="29363"/>
+                  <a:pt x="416153" y="25908"/>
+                  <a:pt x="401117" y="25908"/>
+                </a:cubicBezTo>
+                <a:close/>
+                <a:moveTo>
+                  <a:pt x="0" y="5792"/>
+                </a:moveTo>
+                <a:lnTo>
+                  <a:pt x="29870" y="5792"/>
+                </a:lnTo>
+                <a:lnTo>
+                  <a:pt x="107899" y="180137"/>
+                </a:lnTo>
+                <a:lnTo>
+                  <a:pt x="185928" y="5792"/>
+                </a:lnTo>
+                <a:lnTo>
+                  <a:pt x="215493" y="5792"/>
+                </a:lnTo>
+                <a:lnTo>
+                  <a:pt x="215493" y="216713"/>
+                </a:lnTo>
+                <a:lnTo>
+                  <a:pt x="187757" y="216713"/>
+                </a:lnTo>
+                <a:lnTo>
+                  <a:pt x="187757" y="59436"/>
+                </a:lnTo>
+                <a:lnTo>
+                  <a:pt x="117653" y="216713"/>
+                </a:lnTo>
+                <a:lnTo>
+                  <a:pt x="98145" y="216713"/>
+                </a:lnTo>
+                <a:lnTo>
+                  <a:pt x="27737" y="59132"/>
+                </a:lnTo>
+                <a:lnTo>
+                  <a:pt x="27737" y="216713"/>
+                </a:lnTo>
+                <a:lnTo>
+                  <a:pt x="0" y="216713"/>
+                </a:lnTo>
+                <a:close/>
+                <a:moveTo>
+                  <a:pt x="2244623" y="5487"/>
+                </a:moveTo>
+                <a:lnTo>
+                  <a:pt x="2276627" y="5487"/>
+                </a:lnTo>
+                <a:lnTo>
+                  <a:pt x="2353132" y="216713"/>
+                </a:lnTo>
+                <a:lnTo>
+                  <a:pt x="2323871" y="216713"/>
+                </a:lnTo>
+                <a:lnTo>
+                  <a:pt x="2306802" y="169469"/>
+                </a:lnTo>
+                <a:lnTo>
+                  <a:pt x="2214143" y="169469"/>
+                </a:lnTo>
+                <a:lnTo>
+                  <a:pt x="2197074" y="216713"/>
+                </a:lnTo>
+                <a:lnTo>
+                  <a:pt x="2167814" y="216713"/>
+                </a:lnTo>
+                <a:close/>
+                <a:moveTo>
+                  <a:pt x="3114675" y="4268"/>
+                </a:moveTo>
+                <a:lnTo>
+                  <a:pt x="3183255" y="4268"/>
+                </a:lnTo>
+                <a:cubicBezTo>
+                  <a:pt x="3199308" y="4268"/>
+                  <a:pt x="3212871" y="7011"/>
+                  <a:pt x="3223946" y="12497"/>
+                </a:cubicBezTo>
+                <a:cubicBezTo>
+                  <a:pt x="3235020" y="17984"/>
+                  <a:pt x="3243300" y="25400"/>
+                  <a:pt x="3248787" y="34748"/>
+                </a:cubicBezTo>
+                <a:cubicBezTo>
+                  <a:pt x="3254273" y="44095"/>
+                  <a:pt x="3257016" y="54763"/>
+                  <a:pt x="3257016" y="66752"/>
+                </a:cubicBezTo>
+                <a:cubicBezTo>
+                  <a:pt x="3257016" y="81382"/>
+                  <a:pt x="3252800" y="94285"/>
+                  <a:pt x="3244367" y="105461"/>
+                </a:cubicBezTo>
+                <a:cubicBezTo>
+                  <a:pt x="3235934" y="116637"/>
+                  <a:pt x="3223285" y="124054"/>
+                  <a:pt x="3206420" y="127712"/>
+                </a:cubicBezTo>
+                <a:lnTo>
+                  <a:pt x="3259760" y="216713"/>
+                </a:lnTo>
+                <a:lnTo>
+                  <a:pt x="3226536" y="216713"/>
+                </a:lnTo>
+                <a:lnTo>
+                  <a:pt x="3175940" y="129845"/>
+                </a:lnTo>
+                <a:lnTo>
+                  <a:pt x="3142412" y="129845"/>
+                </a:lnTo>
+                <a:lnTo>
+                  <a:pt x="3142412" y="216713"/>
+                </a:lnTo>
+                <a:lnTo>
+                  <a:pt x="3114675" y="216713"/>
+                </a:lnTo>
+                <a:close/>
+                <a:moveTo>
+                  <a:pt x="2705100" y="4268"/>
+                </a:moveTo>
+                <a:lnTo>
+                  <a:pt x="2732837" y="4268"/>
+                </a:lnTo>
+                <a:lnTo>
+                  <a:pt x="2732837" y="102718"/>
+                </a:lnTo>
+                <a:lnTo>
+                  <a:pt x="2820619" y="4268"/>
+                </a:lnTo>
+                <a:lnTo>
+                  <a:pt x="2855671" y="4268"/>
+                </a:lnTo>
+                <a:lnTo>
+                  <a:pt x="2759354" y="110643"/>
+                </a:lnTo>
+                <a:lnTo>
+                  <a:pt x="2856585" y="216713"/>
+                </a:lnTo>
+                <a:lnTo>
+                  <a:pt x="2820314" y="216713"/>
+                </a:lnTo>
+                <a:lnTo>
+                  <a:pt x="2732837" y="119787"/>
+                </a:lnTo>
+                <a:lnTo>
+                  <a:pt x="2732837" y="216713"/>
+                </a:lnTo>
+                <a:lnTo>
+                  <a:pt x="2705100" y="216713"/>
+                </a:lnTo>
+                <a:close/>
+                <a:moveTo>
+                  <a:pt x="1962150" y="4268"/>
+                </a:moveTo>
+                <a:lnTo>
+                  <a:pt x="2030730" y="4268"/>
+                </a:lnTo>
+                <a:cubicBezTo>
+                  <a:pt x="2054707" y="4268"/>
+                  <a:pt x="2072945" y="10059"/>
+                  <a:pt x="2085441" y="21641"/>
+                </a:cubicBezTo>
+                <a:cubicBezTo>
+                  <a:pt x="2097938" y="33224"/>
+                  <a:pt x="2104187" y="48159"/>
+                  <a:pt x="2104187" y="66447"/>
+                </a:cubicBezTo>
+                <a:cubicBezTo>
+                  <a:pt x="2104187" y="84125"/>
+                  <a:pt x="2098141" y="98806"/>
+                  <a:pt x="2086051" y="110490"/>
+                </a:cubicBezTo>
+                <a:cubicBezTo>
+                  <a:pt x="2073961" y="122174"/>
+                  <a:pt x="2055520" y="128016"/>
+                  <a:pt x="2030730" y="128016"/>
+                </a:cubicBezTo>
+                <a:lnTo>
+                  <a:pt x="1989887" y="128016"/>
+                </a:lnTo>
+                <a:lnTo>
+                  <a:pt x="1989887" y="216713"/>
+                </a:lnTo>
+                <a:lnTo>
+                  <a:pt x="1962150" y="216713"/>
+                </a:lnTo>
+                <a:close/>
+                <a:moveTo>
+                  <a:pt x="1019175" y="4268"/>
+                </a:moveTo>
+                <a:lnTo>
+                  <a:pt x="1087755" y="4268"/>
+                </a:lnTo>
+                <a:cubicBezTo>
+                  <a:pt x="1103808" y="4268"/>
+                  <a:pt x="1117371" y="7011"/>
+                  <a:pt x="1128446" y="12497"/>
+                </a:cubicBezTo>
+                <a:cubicBezTo>
+                  <a:pt x="1139520" y="17984"/>
+                  <a:pt x="1147800" y="25400"/>
+                  <a:pt x="1153287" y="34748"/>
+                </a:cubicBezTo>
+                <a:cubicBezTo>
+                  <a:pt x="1158773" y="44095"/>
+                  <a:pt x="1161516" y="54763"/>
+                  <a:pt x="1161516" y="66752"/>
+                </a:cubicBezTo>
+                <a:cubicBezTo>
+                  <a:pt x="1161516" y="81382"/>
+                  <a:pt x="1157300" y="94285"/>
+                  <a:pt x="1148867" y="105461"/>
+                </a:cubicBezTo>
+                <a:cubicBezTo>
+                  <a:pt x="1140434" y="116637"/>
+                  <a:pt x="1127785" y="124054"/>
+                  <a:pt x="1110920" y="127712"/>
+                </a:cubicBezTo>
+                <a:lnTo>
+                  <a:pt x="1164260" y="216713"/>
+                </a:lnTo>
+                <a:lnTo>
+                  <a:pt x="1131037" y="216713"/>
+                </a:lnTo>
+                <a:lnTo>
+                  <a:pt x="1080440" y="129845"/>
+                </a:lnTo>
+                <a:lnTo>
+                  <a:pt x="1046912" y="129845"/>
+                </a:lnTo>
+                <a:lnTo>
+                  <a:pt x="1046912" y="216713"/>
+                </a:lnTo>
+                <a:lnTo>
+                  <a:pt x="1019175" y="216713"/>
+                </a:lnTo>
+                <a:close/>
+                <a:moveTo>
+                  <a:pt x="564261" y="4268"/>
+                </a:moveTo>
+                <a:lnTo>
+                  <a:pt x="593826" y="4268"/>
+                </a:lnTo>
+                <a:lnTo>
+                  <a:pt x="660578" y="187452"/>
+                </a:lnTo>
+                <a:lnTo>
+                  <a:pt x="727329" y="4268"/>
+                </a:lnTo>
+                <a:lnTo>
+                  <a:pt x="756590" y="4268"/>
+                </a:lnTo>
+                <a:lnTo>
+                  <a:pt x="676427" y="216713"/>
+                </a:lnTo>
+                <a:lnTo>
+                  <a:pt x="644423" y="216713"/>
+                </a:lnTo>
+                <a:close/>
+                <a:moveTo>
+                  <a:pt x="2924175" y="3963"/>
+                </a:moveTo>
+                <a:lnTo>
+                  <a:pt x="3038475" y="3963"/>
+                </a:lnTo>
+                <a:lnTo>
+                  <a:pt x="3038475" y="26823"/>
+                </a:lnTo>
+                <a:lnTo>
+                  <a:pt x="2951912" y="26823"/>
+                </a:lnTo>
+                <a:lnTo>
+                  <a:pt x="2951912" y="97841"/>
+                </a:lnTo>
+                <a:lnTo>
+                  <a:pt x="3029331" y="97841"/>
+                </a:lnTo>
+                <a:lnTo>
+                  <a:pt x="3029331" y="120701"/>
+                </a:lnTo>
+                <a:lnTo>
+                  <a:pt x="2951912" y="120701"/>
+                </a:lnTo>
+                <a:lnTo>
+                  <a:pt x="2951912" y="193853"/>
+                </a:lnTo>
+                <a:lnTo>
+                  <a:pt x="3038475" y="193853"/>
+                </a:lnTo>
+                <a:lnTo>
+                  <a:pt x="3038475" y="216713"/>
+                </a:lnTo>
+                <a:lnTo>
+                  <a:pt x="2924175" y="216713"/>
+                </a:lnTo>
+                <a:close/>
+                <a:moveTo>
+                  <a:pt x="828675" y="3963"/>
+                </a:moveTo>
+                <a:lnTo>
+                  <a:pt x="942975" y="3963"/>
+                </a:lnTo>
+                <a:lnTo>
+                  <a:pt x="942975" y="26823"/>
+                </a:lnTo>
+                <a:lnTo>
+                  <a:pt x="856412" y="26823"/>
+                </a:lnTo>
+                <a:lnTo>
+                  <a:pt x="856412" y="97841"/>
+                </a:lnTo>
+                <a:lnTo>
+                  <a:pt x="933831" y="97841"/>
+                </a:lnTo>
+                <a:lnTo>
+                  <a:pt x="933831" y="120701"/>
+                </a:lnTo>
+                <a:lnTo>
+                  <a:pt x="856412" y="120701"/>
+                </a:lnTo>
+                <a:lnTo>
+                  <a:pt x="856412" y="193853"/>
+                </a:lnTo>
+                <a:lnTo>
+                  <a:pt x="942975" y="193853"/>
+                </a:lnTo>
+                <a:lnTo>
+                  <a:pt x="942975" y="216713"/>
+                </a:lnTo>
+                <a:lnTo>
+                  <a:pt x="828675" y="216713"/>
+                </a:lnTo>
+                <a:close/>
+                <a:moveTo>
+                  <a:pt x="401117" y="1829"/>
+                </a:moveTo>
+                <a:cubicBezTo>
+                  <a:pt x="421030" y="1829"/>
+                  <a:pt x="439115" y="6452"/>
+                  <a:pt x="455371" y="15698"/>
+                </a:cubicBezTo>
+                <a:cubicBezTo>
+                  <a:pt x="471627" y="24943"/>
+                  <a:pt x="484429" y="37796"/>
+                  <a:pt x="493776" y="54255"/>
+                </a:cubicBezTo>
+                <a:cubicBezTo>
+                  <a:pt x="503123" y="70714"/>
+                  <a:pt x="507797" y="89408"/>
+                  <a:pt x="507797" y="110338"/>
+                </a:cubicBezTo>
+                <a:cubicBezTo>
+                  <a:pt x="507797" y="131268"/>
+                  <a:pt x="503123" y="149962"/>
+                  <a:pt x="493776" y="166421"/>
+                </a:cubicBezTo>
+                <a:cubicBezTo>
+                  <a:pt x="484429" y="182880"/>
+                  <a:pt x="471627" y="195733"/>
+                  <a:pt x="455371" y="204978"/>
+                </a:cubicBezTo>
+                <a:cubicBezTo>
+                  <a:pt x="439115" y="214224"/>
+                  <a:pt x="421030" y="218847"/>
+                  <a:pt x="401117" y="218847"/>
+                </a:cubicBezTo>
+                <a:cubicBezTo>
+                  <a:pt x="381406" y="218847"/>
+                  <a:pt x="363423" y="214224"/>
+                  <a:pt x="347167" y="204978"/>
+                </a:cubicBezTo>
+                <a:cubicBezTo>
+                  <a:pt x="330911" y="195733"/>
+                  <a:pt x="318059" y="182830"/>
+                  <a:pt x="308610" y="166269"/>
+                </a:cubicBezTo>
+                <a:cubicBezTo>
+                  <a:pt x="299161" y="149708"/>
+                  <a:pt x="294437" y="131064"/>
+                  <a:pt x="294437" y="110338"/>
+                </a:cubicBezTo>
+                <a:cubicBezTo>
+                  <a:pt x="294437" y="89612"/>
+                  <a:pt x="299161" y="70968"/>
+                  <a:pt x="308610" y="54407"/>
+                </a:cubicBezTo>
+                <a:cubicBezTo>
+                  <a:pt x="318059" y="37846"/>
+                  <a:pt x="330911" y="24943"/>
+                  <a:pt x="347167" y="15698"/>
+                </a:cubicBezTo>
+                <a:cubicBezTo>
+                  <a:pt x="363423" y="6452"/>
+                  <a:pt x="381406" y="1829"/>
+                  <a:pt x="401117" y="1829"/>
+                </a:cubicBezTo>
+                <a:close/>
+                <a:moveTo>
+                  <a:pt x="3399282" y="1524"/>
+                </a:moveTo>
+                <a:cubicBezTo>
+                  <a:pt x="3419195" y="1524"/>
+                  <a:pt x="3435502" y="6503"/>
+                  <a:pt x="3448202" y="16460"/>
+                </a:cubicBezTo>
+                <a:cubicBezTo>
+                  <a:pt x="3460902" y="26416"/>
+                  <a:pt x="3468065" y="39624"/>
+                  <a:pt x="3469690" y="56084"/>
+                </a:cubicBezTo>
+                <a:lnTo>
+                  <a:pt x="3439210" y="56084"/>
+                </a:lnTo>
+                <a:cubicBezTo>
+                  <a:pt x="3438195" y="47956"/>
+                  <a:pt x="3433928" y="40793"/>
+                  <a:pt x="3426409" y="34595"/>
+                </a:cubicBezTo>
+                <a:cubicBezTo>
+                  <a:pt x="3418890" y="28398"/>
+                  <a:pt x="3408934" y="25299"/>
+                  <a:pt x="3396538" y="25299"/>
+                </a:cubicBezTo>
+                <a:cubicBezTo>
+                  <a:pt x="3384956" y="25299"/>
+                  <a:pt x="3375507" y="28296"/>
+                  <a:pt x="3368192" y="34290"/>
+                </a:cubicBezTo>
+                <a:cubicBezTo>
+                  <a:pt x="3360877" y="40285"/>
+                  <a:pt x="3357219" y="48667"/>
+                  <a:pt x="3357219" y="59436"/>
+                </a:cubicBezTo>
+                <a:cubicBezTo>
+                  <a:pt x="3357219" y="67158"/>
+                  <a:pt x="3359404" y="73457"/>
+                  <a:pt x="3363772" y="78334"/>
+                </a:cubicBezTo>
+                <a:cubicBezTo>
+                  <a:pt x="3368141" y="83211"/>
+                  <a:pt x="3373526" y="86919"/>
+                  <a:pt x="3379927" y="89459"/>
+                </a:cubicBezTo>
+                <a:cubicBezTo>
+                  <a:pt x="3386328" y="91999"/>
+                  <a:pt x="3395319" y="94895"/>
+                  <a:pt x="3406902" y="98146"/>
+                </a:cubicBezTo>
+                <a:cubicBezTo>
+                  <a:pt x="3420922" y="102007"/>
+                  <a:pt x="3432200" y="105817"/>
+                  <a:pt x="3440734" y="109576"/>
+                </a:cubicBezTo>
+                <a:cubicBezTo>
+                  <a:pt x="3449269" y="113335"/>
+                  <a:pt x="3456584" y="119126"/>
+                  <a:pt x="3462680" y="126950"/>
+                </a:cubicBezTo>
+                <a:cubicBezTo>
+                  <a:pt x="3468776" y="134773"/>
+                  <a:pt x="3471824" y="145390"/>
+                  <a:pt x="3471824" y="158801"/>
+                </a:cubicBezTo>
+                <a:cubicBezTo>
+                  <a:pt x="3471824" y="169164"/>
+                  <a:pt x="3469081" y="178918"/>
+                  <a:pt x="3463594" y="188062"/>
+                </a:cubicBezTo>
+                <a:cubicBezTo>
+                  <a:pt x="3458108" y="197206"/>
+                  <a:pt x="3449980" y="204623"/>
+                  <a:pt x="3439210" y="210312"/>
+                </a:cubicBezTo>
+                <a:cubicBezTo>
+                  <a:pt x="3428441" y="216002"/>
+                  <a:pt x="3415741" y="218847"/>
+                  <a:pt x="3401110" y="218847"/>
+                </a:cubicBezTo>
+                <a:cubicBezTo>
+                  <a:pt x="3387090" y="218847"/>
+                  <a:pt x="3374542" y="216358"/>
+                  <a:pt x="3363468" y="211379"/>
+                </a:cubicBezTo>
+                <a:cubicBezTo>
+                  <a:pt x="3352394" y="206401"/>
+                  <a:pt x="3343706" y="199492"/>
+                  <a:pt x="3337407" y="190653"/>
+                </a:cubicBezTo>
+                <a:cubicBezTo>
+                  <a:pt x="3331108" y="181814"/>
+                  <a:pt x="3327857" y="171603"/>
+                  <a:pt x="3327654" y="160020"/>
+                </a:cubicBezTo>
+                <a:lnTo>
+                  <a:pt x="3357219" y="160020"/>
+                </a:lnTo>
+                <a:cubicBezTo>
+                  <a:pt x="3358235" y="169977"/>
+                  <a:pt x="3362350" y="178359"/>
+                  <a:pt x="3369564" y="185166"/>
+                </a:cubicBezTo>
+                <a:cubicBezTo>
+                  <a:pt x="3376778" y="191974"/>
+                  <a:pt x="3387293" y="195377"/>
+                  <a:pt x="3401110" y="195377"/>
+                </a:cubicBezTo>
+                <a:cubicBezTo>
+                  <a:pt x="3414318" y="195377"/>
+                  <a:pt x="3424732" y="192075"/>
+                  <a:pt x="3432352" y="185471"/>
+                </a:cubicBezTo>
+                <a:cubicBezTo>
+                  <a:pt x="3439972" y="178867"/>
+                  <a:pt x="3443782" y="170384"/>
+                  <a:pt x="3443782" y="160020"/>
+                </a:cubicBezTo>
+                <a:cubicBezTo>
+                  <a:pt x="3443782" y="151892"/>
+                  <a:pt x="3441547" y="145288"/>
+                  <a:pt x="3437077" y="140208"/>
+                </a:cubicBezTo>
+                <a:cubicBezTo>
+                  <a:pt x="3432606" y="135128"/>
+                  <a:pt x="3427018" y="131268"/>
+                  <a:pt x="3420313" y="128626"/>
+                </a:cubicBezTo>
+                <a:cubicBezTo>
+                  <a:pt x="3413607" y="125984"/>
+                  <a:pt x="3404565" y="123140"/>
+                  <a:pt x="3393186" y="120092"/>
+                </a:cubicBezTo>
+                <a:cubicBezTo>
+                  <a:pt x="3379165" y="116434"/>
+                  <a:pt x="3367938" y="112776"/>
+                  <a:pt x="3359505" y="109119"/>
+                </a:cubicBezTo>
+                <a:cubicBezTo>
+                  <a:pt x="3351072" y="105461"/>
+                  <a:pt x="3343859" y="99721"/>
+                  <a:pt x="3337864" y="91898"/>
+                </a:cubicBezTo>
+                <a:cubicBezTo>
+                  <a:pt x="3331870" y="84074"/>
+                  <a:pt x="3328873" y="73559"/>
+                  <a:pt x="3328873" y="60351"/>
+                </a:cubicBezTo>
+                <a:cubicBezTo>
+                  <a:pt x="3328873" y="48768"/>
+                  <a:pt x="3331820" y="38507"/>
+                  <a:pt x="3337712" y="29566"/>
+                </a:cubicBezTo>
+                <a:cubicBezTo>
+                  <a:pt x="3343605" y="20625"/>
+                  <a:pt x="3351885" y="13716"/>
+                  <a:pt x="3362553" y="8840"/>
+                </a:cubicBezTo>
+                <a:cubicBezTo>
+                  <a:pt x="3373221" y="3963"/>
+                  <a:pt x="3385464" y="1524"/>
+                  <a:pt x="3399282" y="1524"/>
+                </a:cubicBezTo>
+                <a:close/>
+                <a:moveTo>
+                  <a:pt x="2524582" y="1524"/>
+                </a:moveTo>
+                <a:cubicBezTo>
+                  <a:pt x="2547747" y="1524"/>
+                  <a:pt x="2567965" y="7112"/>
+                  <a:pt x="2585237" y="18288"/>
+                </a:cubicBezTo>
+                <a:cubicBezTo>
+                  <a:pt x="2602509" y="29464"/>
+                  <a:pt x="2615107" y="45314"/>
+                  <a:pt x="2623032" y="65837"/>
+                </a:cubicBezTo>
+                <a:lnTo>
+                  <a:pt x="2589809" y="65837"/>
+                </a:lnTo>
+                <a:cubicBezTo>
+                  <a:pt x="2583916" y="53036"/>
+                  <a:pt x="2575433" y="43180"/>
+                  <a:pt x="2564358" y="36272"/>
+                </a:cubicBezTo>
+                <a:cubicBezTo>
+                  <a:pt x="2553284" y="29363"/>
+                  <a:pt x="2540025" y="25908"/>
+                  <a:pt x="2524582" y="25908"/>
+                </a:cubicBezTo>
+                <a:cubicBezTo>
+                  <a:pt x="2509748" y="25908"/>
+                  <a:pt x="2496439" y="29363"/>
+                  <a:pt x="2484653" y="36272"/>
+                </a:cubicBezTo>
+                <a:cubicBezTo>
+                  <a:pt x="2472868" y="43180"/>
+                  <a:pt x="2463622" y="52985"/>
+                  <a:pt x="2456916" y="65685"/>
+                </a:cubicBezTo>
+                <a:cubicBezTo>
+                  <a:pt x="2450211" y="78385"/>
+                  <a:pt x="2446858" y="93269"/>
+                  <a:pt x="2446858" y="110338"/>
+                </a:cubicBezTo>
+                <a:cubicBezTo>
+                  <a:pt x="2446858" y="127204"/>
+                  <a:pt x="2450211" y="141986"/>
+                  <a:pt x="2456916" y="154686"/>
+                </a:cubicBezTo>
+                <a:cubicBezTo>
+                  <a:pt x="2463622" y="167386"/>
+                  <a:pt x="2472868" y="177191"/>
+                  <a:pt x="2484653" y="184100"/>
+                </a:cubicBezTo>
+                <a:cubicBezTo>
+                  <a:pt x="2496439" y="191008"/>
+                  <a:pt x="2509748" y="194463"/>
+                  <a:pt x="2524582" y="194463"/>
+                </a:cubicBezTo>
+                <a:cubicBezTo>
+                  <a:pt x="2540025" y="194463"/>
+                  <a:pt x="2553284" y="191059"/>
+                  <a:pt x="2564358" y="184252"/>
+                </a:cubicBezTo>
+                <a:cubicBezTo>
+                  <a:pt x="2575433" y="177445"/>
+                  <a:pt x="2583916" y="167640"/>
+                  <a:pt x="2589809" y="154839"/>
+                </a:cubicBezTo>
+                <a:lnTo>
+                  <a:pt x="2623032" y="154839"/>
+                </a:lnTo>
+                <a:cubicBezTo>
+                  <a:pt x="2615107" y="175159"/>
+                  <a:pt x="2602509" y="190856"/>
+                  <a:pt x="2585237" y="201930"/>
+                </a:cubicBezTo>
+                <a:cubicBezTo>
+                  <a:pt x="2567965" y="213005"/>
+                  <a:pt x="2547747" y="218542"/>
+                  <a:pt x="2524582" y="218542"/>
+                </a:cubicBezTo>
+                <a:cubicBezTo>
+                  <a:pt x="2504871" y="218542"/>
+                  <a:pt x="2486939" y="213919"/>
+                  <a:pt x="2470785" y="204674"/>
+                </a:cubicBezTo>
+                <a:cubicBezTo>
+                  <a:pt x="2454630" y="195428"/>
+                  <a:pt x="2441879" y="182576"/>
+                  <a:pt x="2432532" y="166116"/>
+                </a:cubicBezTo>
+                <a:cubicBezTo>
+                  <a:pt x="2423185" y="149657"/>
+                  <a:pt x="2418512" y="131064"/>
+                  <a:pt x="2418512" y="110338"/>
+                </a:cubicBezTo>
+                <a:cubicBezTo>
+                  <a:pt x="2418512" y="89612"/>
+                  <a:pt x="2423185" y="70968"/>
+                  <a:pt x="2432532" y="54407"/>
+                </a:cubicBezTo>
+                <a:cubicBezTo>
+                  <a:pt x="2441879" y="37846"/>
+                  <a:pt x="2454630" y="24892"/>
+                  <a:pt x="2470785" y="15545"/>
+                </a:cubicBezTo>
+                <a:cubicBezTo>
+                  <a:pt x="2486939" y="6198"/>
+                  <a:pt x="2504871" y="1524"/>
+                  <a:pt x="2524582" y="1524"/>
+                </a:cubicBezTo>
+                <a:close/>
+                <a:moveTo>
+                  <a:pt x="1303782" y="1524"/>
+                </a:moveTo>
+                <a:cubicBezTo>
+                  <a:pt x="1323696" y="1524"/>
+                  <a:pt x="1340002" y="6503"/>
+                  <a:pt x="1352702" y="16460"/>
+                </a:cubicBezTo>
+                <a:cubicBezTo>
+                  <a:pt x="1365402" y="26416"/>
+                  <a:pt x="1372565" y="39624"/>
+                  <a:pt x="1374191" y="56084"/>
+                </a:cubicBezTo>
+                <a:lnTo>
+                  <a:pt x="1343711" y="56084"/>
+                </a:lnTo>
+                <a:cubicBezTo>
+                  <a:pt x="1342695" y="47956"/>
+                  <a:pt x="1338427" y="40793"/>
+                  <a:pt x="1330909" y="34595"/>
+                </a:cubicBezTo>
+                <a:cubicBezTo>
+                  <a:pt x="1323391" y="28398"/>
+                  <a:pt x="1313434" y="25299"/>
+                  <a:pt x="1301039" y="25299"/>
+                </a:cubicBezTo>
+                <a:cubicBezTo>
+                  <a:pt x="1289456" y="25299"/>
+                  <a:pt x="1280008" y="28296"/>
+                  <a:pt x="1272692" y="34290"/>
+                </a:cubicBezTo>
+                <a:cubicBezTo>
+                  <a:pt x="1265377" y="40285"/>
+                  <a:pt x="1261719" y="48667"/>
+                  <a:pt x="1261719" y="59436"/>
+                </a:cubicBezTo>
+                <a:cubicBezTo>
+                  <a:pt x="1261719" y="67158"/>
+                  <a:pt x="1263904" y="73457"/>
+                  <a:pt x="1268273" y="78334"/>
+                </a:cubicBezTo>
+                <a:cubicBezTo>
+                  <a:pt x="1272642" y="83211"/>
+                  <a:pt x="1278026" y="86919"/>
+                  <a:pt x="1284427" y="89459"/>
+                </a:cubicBezTo>
+                <a:cubicBezTo>
+                  <a:pt x="1290828" y="91999"/>
+                  <a:pt x="1299819" y="94895"/>
+                  <a:pt x="1311402" y="98146"/>
+                </a:cubicBezTo>
+                <a:cubicBezTo>
+                  <a:pt x="1325423" y="102007"/>
+                  <a:pt x="1336700" y="105817"/>
+                  <a:pt x="1345235" y="109576"/>
+                </a:cubicBezTo>
+                <a:cubicBezTo>
+                  <a:pt x="1353769" y="113335"/>
+                  <a:pt x="1361084" y="119126"/>
+                  <a:pt x="1367180" y="126950"/>
+                </a:cubicBezTo>
+                <a:cubicBezTo>
+                  <a:pt x="1373276" y="134773"/>
+                  <a:pt x="1376324" y="145390"/>
+                  <a:pt x="1376324" y="158801"/>
+                </a:cubicBezTo>
+                <a:cubicBezTo>
+                  <a:pt x="1376324" y="169164"/>
+                  <a:pt x="1373581" y="178918"/>
+                  <a:pt x="1368095" y="188062"/>
+                </a:cubicBezTo>
+                <a:cubicBezTo>
+                  <a:pt x="1362608" y="197206"/>
+                  <a:pt x="1354480" y="204623"/>
+                  <a:pt x="1343711" y="210312"/>
+                </a:cubicBezTo>
+                <a:cubicBezTo>
+                  <a:pt x="1332941" y="216002"/>
+                  <a:pt x="1320241" y="218847"/>
+                  <a:pt x="1305611" y="218847"/>
+                </a:cubicBezTo>
+                <a:cubicBezTo>
+                  <a:pt x="1291590" y="218847"/>
+                  <a:pt x="1279042" y="216358"/>
+                  <a:pt x="1267968" y="211379"/>
+                </a:cubicBezTo>
+                <a:cubicBezTo>
+                  <a:pt x="1256893" y="206401"/>
+                  <a:pt x="1248207" y="199492"/>
+                  <a:pt x="1241908" y="190653"/>
+                </a:cubicBezTo>
+                <a:cubicBezTo>
+                  <a:pt x="1235608" y="181814"/>
+                  <a:pt x="1232357" y="171603"/>
+                  <a:pt x="1232154" y="160020"/>
+                </a:cubicBezTo>
+                <a:lnTo>
+                  <a:pt x="1261719" y="160020"/>
+                </a:lnTo>
+                <a:cubicBezTo>
+                  <a:pt x="1262735" y="169977"/>
+                  <a:pt x="1266850" y="178359"/>
+                  <a:pt x="1274064" y="185166"/>
+                </a:cubicBezTo>
+                <a:cubicBezTo>
+                  <a:pt x="1281277" y="191974"/>
+                  <a:pt x="1291793" y="195377"/>
+                  <a:pt x="1305611" y="195377"/>
+                </a:cubicBezTo>
+                <a:cubicBezTo>
+                  <a:pt x="1318819" y="195377"/>
+                  <a:pt x="1329233" y="192075"/>
+                  <a:pt x="1336853" y="185471"/>
+                </a:cubicBezTo>
+                <a:cubicBezTo>
+                  <a:pt x="1344473" y="178867"/>
+                  <a:pt x="1348283" y="170384"/>
+                  <a:pt x="1348283" y="160020"/>
+                </a:cubicBezTo>
+                <a:cubicBezTo>
+                  <a:pt x="1348283" y="151892"/>
+                  <a:pt x="1346047" y="145288"/>
+                  <a:pt x="1341577" y="140208"/>
+                </a:cubicBezTo>
+                <a:cubicBezTo>
+                  <a:pt x="1337107" y="135128"/>
+                  <a:pt x="1331519" y="131268"/>
+                  <a:pt x="1324813" y="128626"/>
+                </a:cubicBezTo>
+                <a:cubicBezTo>
+                  <a:pt x="1318108" y="125984"/>
+                  <a:pt x="1309065" y="123140"/>
+                  <a:pt x="1297686" y="120092"/>
+                </a:cubicBezTo>
+                <a:cubicBezTo>
+                  <a:pt x="1283665" y="116434"/>
+                  <a:pt x="1272438" y="112776"/>
+                  <a:pt x="1264005" y="109119"/>
+                </a:cubicBezTo>
+                <a:cubicBezTo>
+                  <a:pt x="1255573" y="105461"/>
+                  <a:pt x="1248359" y="99721"/>
+                  <a:pt x="1242365" y="91898"/>
+                </a:cubicBezTo>
+                <a:cubicBezTo>
+                  <a:pt x="1236370" y="84074"/>
+                  <a:pt x="1233373" y="73559"/>
+                  <a:pt x="1233373" y="60351"/>
+                </a:cubicBezTo>
+                <a:cubicBezTo>
+                  <a:pt x="1233373" y="48768"/>
+                  <a:pt x="1236319" y="38507"/>
+                  <a:pt x="1242212" y="29566"/>
+                </a:cubicBezTo>
+                <a:cubicBezTo>
+                  <a:pt x="1248105" y="20625"/>
+                  <a:pt x="1256385" y="13716"/>
+                  <a:pt x="1267054" y="8840"/>
+                </a:cubicBezTo>
+                <a:cubicBezTo>
+                  <a:pt x="1277721" y="3963"/>
+                  <a:pt x="1289964" y="1524"/>
+                  <a:pt x="1303782" y="1524"/>
+                </a:cubicBezTo>
+                <a:close/>
+                <a:moveTo>
+                  <a:pt x="1647215" y="0"/>
+                </a:moveTo>
+                <a:cubicBezTo>
+                  <a:pt x="1658188" y="0"/>
+                  <a:pt x="1667738" y="2134"/>
+                  <a:pt x="1675866" y="6401"/>
+                </a:cubicBezTo>
+                <a:cubicBezTo>
+                  <a:pt x="1683994" y="10668"/>
+                  <a:pt x="1690090" y="16612"/>
+                  <a:pt x="1694154" y="24232"/>
+                </a:cubicBezTo>
+                <a:cubicBezTo>
+                  <a:pt x="1698218" y="31852"/>
+                  <a:pt x="1700047" y="40336"/>
+                  <a:pt x="1699641" y="49683"/>
+                </a:cubicBezTo>
+                <a:lnTo>
+                  <a:pt x="1671904" y="49683"/>
+                </a:lnTo>
+                <a:cubicBezTo>
+                  <a:pt x="1672107" y="41352"/>
+                  <a:pt x="1669770" y="34798"/>
+                  <a:pt x="1664894" y="30023"/>
+                </a:cubicBezTo>
+                <a:cubicBezTo>
+                  <a:pt x="1660017" y="25248"/>
+                  <a:pt x="1653718" y="22860"/>
+                  <a:pt x="1645996" y="22860"/>
+                </a:cubicBezTo>
+                <a:cubicBezTo>
+                  <a:pt x="1637868" y="22860"/>
+                  <a:pt x="1631315" y="25146"/>
+                  <a:pt x="1626336" y="29718"/>
+                </a:cubicBezTo>
+                <a:cubicBezTo>
+                  <a:pt x="1621358" y="34290"/>
+                  <a:pt x="1618869" y="40132"/>
+                  <a:pt x="1618869" y="47244"/>
+                </a:cubicBezTo>
+                <a:cubicBezTo>
+                  <a:pt x="1618869" y="53340"/>
+                  <a:pt x="1620545" y="59233"/>
+                  <a:pt x="1623898" y="64923"/>
+                </a:cubicBezTo>
+                <a:cubicBezTo>
+                  <a:pt x="1627251" y="70612"/>
+                  <a:pt x="1632890" y="77623"/>
+                  <a:pt x="1640814" y="85954"/>
+                </a:cubicBezTo>
+                <a:lnTo>
+                  <a:pt x="1704213" y="149657"/>
+                </a:lnTo>
+                <a:lnTo>
+                  <a:pt x="1709699" y="141123"/>
+                </a:lnTo>
+                <a:lnTo>
+                  <a:pt x="1730426" y="106376"/>
+                </a:lnTo>
+                <a:lnTo>
+                  <a:pt x="1760296" y="106376"/>
+                </a:lnTo>
+                <a:lnTo>
+                  <a:pt x="1735302" y="149657"/>
+                </a:lnTo>
+                <a:cubicBezTo>
+                  <a:pt x="1731848" y="155753"/>
+                  <a:pt x="1727784" y="162154"/>
+                  <a:pt x="1723110" y="168860"/>
+                </a:cubicBezTo>
+                <a:lnTo>
+                  <a:pt x="1770964" y="216713"/>
+                </a:lnTo>
+                <a:lnTo>
+                  <a:pt x="1734693" y="216713"/>
+                </a:lnTo>
+                <a:lnTo>
+                  <a:pt x="1706956" y="188672"/>
+                </a:lnTo>
+                <a:cubicBezTo>
+                  <a:pt x="1696593" y="199441"/>
+                  <a:pt x="1685518" y="207417"/>
+                  <a:pt x="1673733" y="212598"/>
+                </a:cubicBezTo>
+                <a:cubicBezTo>
+                  <a:pt x="1661947" y="217780"/>
+                  <a:pt x="1648638" y="220371"/>
+                  <a:pt x="1633804" y="220371"/>
+                </a:cubicBezTo>
+                <a:cubicBezTo>
+                  <a:pt x="1619174" y="220371"/>
+                  <a:pt x="1606220" y="217729"/>
+                  <a:pt x="1594942" y="212446"/>
+                </a:cubicBezTo>
+                <a:cubicBezTo>
+                  <a:pt x="1583664" y="207163"/>
+                  <a:pt x="1574927" y="199644"/>
+                  <a:pt x="1568729" y="189891"/>
+                </a:cubicBezTo>
+                <a:cubicBezTo>
+                  <a:pt x="1562532" y="180137"/>
+                  <a:pt x="1559433" y="168758"/>
+                  <a:pt x="1559433" y="155753"/>
+                </a:cubicBezTo>
+                <a:cubicBezTo>
+                  <a:pt x="1559433" y="140920"/>
+                  <a:pt x="1563649" y="127864"/>
+                  <a:pt x="1572082" y="116586"/>
+                </a:cubicBezTo>
+                <a:cubicBezTo>
+                  <a:pt x="1580515" y="105309"/>
+                  <a:pt x="1592961" y="96419"/>
+                  <a:pt x="1609420" y="89916"/>
+                </a:cubicBezTo>
+                <a:cubicBezTo>
+                  <a:pt x="1602918" y="82195"/>
+                  <a:pt x="1598244" y="75083"/>
+                  <a:pt x="1595399" y="68580"/>
+                </a:cubicBezTo>
+                <a:cubicBezTo>
+                  <a:pt x="1592554" y="62078"/>
+                  <a:pt x="1591132" y="54966"/>
+                  <a:pt x="1591132" y="47244"/>
+                </a:cubicBezTo>
+                <a:cubicBezTo>
+                  <a:pt x="1591132" y="38304"/>
+                  <a:pt x="1593418" y="30226"/>
+                  <a:pt x="1597990" y="23013"/>
+                </a:cubicBezTo>
+                <a:cubicBezTo>
+                  <a:pt x="1602562" y="15799"/>
+                  <a:pt x="1609115" y="10160"/>
+                  <a:pt x="1617650" y="6096"/>
+                </a:cubicBezTo>
+                <a:cubicBezTo>
+                  <a:pt x="1626184" y="2032"/>
+                  <a:pt x="1636039" y="0"/>
+                  <a:pt x="1647215" y="0"/>
+                </a:cubicBezTo>
+                <a:close/>
+              </a:path>
+            </a:pathLst>
+          </a:custGeom>
+          <a:solidFill>
+            <a:schemeClr val="tx1">
+              <a:lumMod val="50000"/>
+              <a:lumOff val="50000"/>
+            </a:schemeClr>
+          </a:solidFill>
+          <a:ln w="0">
+            <a:noFill/>
+          </a:ln>
+          <a:effectLst/>
+        </p:spPr>
+        <p:txBody>
+          <a:bodyPr rot="0" spcFirstLastPara="0" vertOverflow="overflow" horzOverflow="overflow" vert="horz" wrap="square" lIns="91440" tIns="45720" rIns="91440" bIns="45720" numCol="1" spcCol="0" rtlCol="0" fromWordArt="0" anchor="t" anchorCtr="0" forceAA="0" compatLnSpc="1">
+            <a:prstTxWarp prst="textNoShape">
+              <a:avLst/>
+            </a:prstTxWarp>
+            <a:noAutofit/>
+          </a:bodyPr>
+          <a:lstStyle/>
+          <a:p>
+            <a:endParaRPr lang="en-US" sz="2400" b="0" cap="none" spc="300" dirty="0">
+              <a:ln w="0"/>
+              <a:solidFill>
+                <a:schemeClr val="tx1">
+                  <a:lumMod val="50000"/>
+                  <a:lumOff val="50000"/>
+                </a:schemeClr>
+              </a:solidFill>
+              <a:latin typeface="Poppins" panose="00000500000000000000" pitchFamily="2" charset="0"/>
+              <a:cs typeface="Poppins" panose="00000500000000000000" pitchFamily="2" charset="0"/>
+            </a:endParaRPr>
+          </a:p>
+        </p:txBody>
+      </p:sp>
+    </p:spTree>
+    <p:extLst>
+      <p:ext uri="{BB962C8B-B14F-4D97-AF65-F5344CB8AC3E}">
+        <p14:creationId xmlns:p14="http://schemas.microsoft.com/office/powerpoint/2010/main" val="35715218"/>
+      </p:ext>
+    </p:extLst>
+  </p:cSld>
+  <p:clrMapOvr>
+    <a:masterClrMapping/>
+  </p:clrMapOvr>
+</p:sld>
+</file>
+
+<file path=ppt/slides/slide4.xml><?xml version="1.0" encoding="utf-8"?>
+<p:sld xmlns:a="http://schemas.openxmlformats.org/drawingml/2006/main" xmlns:r="http://schemas.openxmlformats.org/officeDocument/2006/relationships" xmlns:p="http://schemas.openxmlformats.org/presentationml/2006/main">
+  <p:cSld>
+    <p:spTree>
+      <p:nvGrpSpPr>
+        <p:cNvPr id="1" name=""/>
+        <p:cNvGrpSpPr/>
+        <p:nvPr/>
+      </p:nvGrpSpPr>
+      <p:grpSpPr>
+        <a:xfrm>
+          <a:off x="0" y="0"/>
+          <a:ext cx="0" cy="0"/>
+          <a:chOff x="0" y="0"/>
+          <a:chExt cx="0" cy="0"/>
+        </a:xfrm>
+      </p:grpSpPr>
+      <p:grpSp>
+        <p:nvGrpSpPr>
+          <p:cNvPr id="4" name="Group 3">
+            <a:extLst>
+              <a:ext uri="{FF2B5EF4-FFF2-40B4-BE49-F238E27FC236}">
+                <a16:creationId xmlns:a16="http://schemas.microsoft.com/office/drawing/2014/main" id="{4B6759C6-1E1E-7BBA-AB89-2E1242A36649}"/>
+              </a:ext>
+            </a:extLst>
+          </p:cNvPr>
+          <p:cNvGrpSpPr/>
+          <p:nvPr/>
+        </p:nvGrpSpPr>
+        <p:grpSpPr>
+          <a:xfrm>
+            <a:off x="4409590" y="1946036"/>
+            <a:ext cx="3372820" cy="2965929"/>
+            <a:chOff x="315585" y="1581059"/>
+            <a:chExt cx="3473411" cy="3090930"/>
+          </a:xfrm>
+        </p:grpSpPr>
+        <p:sp>
+          <p:nvSpPr>
+            <p:cNvPr id="5" name="Oval 4">
+              <a:extLst>
+                <a:ext uri="{FF2B5EF4-FFF2-40B4-BE49-F238E27FC236}">
+                  <a16:creationId xmlns:a16="http://schemas.microsoft.com/office/drawing/2014/main" id="{5D09B28F-3D5F-55C1-1B11-ECBBAB103B0A}"/>
+                </a:ext>
+              </a:extLst>
+            </p:cNvPr>
+            <p:cNvSpPr/>
+            <p:nvPr/>
+          </p:nvSpPr>
+          <p:spPr>
+            <a:xfrm>
+              <a:off x="698066" y="1581059"/>
+              <a:ext cx="3090930" cy="3090930"/>
+            </a:xfrm>
+            <a:prstGeom prst="ellipse">
+              <a:avLst/>
+            </a:prstGeom>
+            <a:gradFill flip="none" rotWithShape="1">
+              <a:gsLst>
+                <a:gs pos="0">
+                  <a:srgbClr val="7030A0">
+                    <a:shade val="30000"/>
+                    <a:satMod val="115000"/>
+                  </a:srgbClr>
+                </a:gs>
+                <a:gs pos="50000">
+                  <a:srgbClr val="7030A0">
+                    <a:shade val="67500"/>
+                    <a:satMod val="115000"/>
+                  </a:srgbClr>
+                </a:gs>
+                <a:gs pos="100000">
+                  <a:srgbClr val="7030A0">
+                    <a:shade val="100000"/>
+                    <a:satMod val="115000"/>
+                  </a:srgbClr>
+                </a:gs>
+              </a:gsLst>
+              <a:path path="circle">
+                <a:fillToRect l="50000" t="50000" r="50000" b="50000"/>
+              </a:path>
+              <a:tileRect/>
+            </a:gradFill>
+            <a:ln>
+              <a:noFill/>
+            </a:ln>
+          </p:spPr>
+          <p:style>
+            <a:lnRef idx="2">
+              <a:schemeClr val="accent1">
+                <a:shade val="15000"/>
+              </a:schemeClr>
+            </a:lnRef>
+            <a:fillRef idx="1">
+              <a:schemeClr val="accent1"/>
+            </a:fillRef>
+            <a:effectRef idx="0">
+              <a:schemeClr val="accent1"/>
+            </a:effectRef>
+            <a:fontRef idx="minor">
+              <a:schemeClr val="lt1"/>
+            </a:fontRef>
+          </p:style>
+          <p:txBody>
+            <a:bodyPr rtlCol="0" anchor="ctr"/>
+            <a:lstStyle/>
+            <a:p>
+              <a:pPr algn="ctr"/>
+              <a:endParaRPr lang="en-US"/>
+            </a:p>
+          </p:txBody>
+        </p:sp>
+        <p:grpSp>
+          <p:nvGrpSpPr>
+            <p:cNvPr id="6" name="Graphic 3">
+              <a:extLst>
+                <a:ext uri="{FF2B5EF4-FFF2-40B4-BE49-F238E27FC236}">
+                  <a16:creationId xmlns:a16="http://schemas.microsoft.com/office/drawing/2014/main" id="{08A9FA3E-8600-2009-7CAC-E4A542C33D7B}"/>
+                </a:ext>
+              </a:extLst>
+            </p:cNvPr>
+            <p:cNvGrpSpPr/>
+            <p:nvPr/>
+          </p:nvGrpSpPr>
+          <p:grpSpPr>
+            <a:xfrm flipH="1">
+              <a:off x="315585" y="1901978"/>
+              <a:ext cx="3130178" cy="2449092"/>
+              <a:chOff x="3388232" y="998707"/>
+              <a:chExt cx="4849536" cy="3794340"/>
+            </a:xfrm>
+            <a:solidFill>
+              <a:schemeClr val="bg1"/>
+            </a:solidFill>
+            <a:scene3d>
+              <a:camera prst="orthographicFront">
+                <a:rot lat="0" lon="0" rev="0"/>
+              </a:camera>
+              <a:lightRig rig="glow" dir="t">
+                <a:rot lat="0" lon="0" rev="4800000"/>
+              </a:lightRig>
+            </a:scene3d>
+          </p:grpSpPr>
+          <p:sp>
+            <p:nvSpPr>
+              <p:cNvPr id="7" name="Freeform: Shape 6">
+                <a:extLst>
+                  <a:ext uri="{FF2B5EF4-FFF2-40B4-BE49-F238E27FC236}">
+                    <a16:creationId xmlns:a16="http://schemas.microsoft.com/office/drawing/2014/main" id="{553F7FE4-839C-4189-7311-F90372F46E2D}"/>
+                  </a:ext>
+                </a:extLst>
+              </p:cNvPr>
+              <p:cNvSpPr/>
+              <p:nvPr/>
+            </p:nvSpPr>
+            <p:spPr>
+              <a:xfrm>
+                <a:off x="3388232" y="998707"/>
+                <a:ext cx="4849536" cy="3794340"/>
+              </a:xfrm>
+              <a:custGeom>
+                <a:avLst/>
+                <a:gdLst>
+                  <a:gd name="connsiteX0" fmla="*/ 4735387 w 4849536"/>
+                  <a:gd name="connsiteY0" fmla="*/ 3154702 h 3794340"/>
+                  <a:gd name="connsiteX1" fmla="*/ 3452693 w 4849536"/>
+                  <a:gd name="connsiteY1" fmla="*/ 1979180 h 3794340"/>
+                  <a:gd name="connsiteX2" fmla="*/ 3370202 w 4849536"/>
+                  <a:gd name="connsiteY2" fmla="*/ 1873133 h 3794340"/>
+                  <a:gd name="connsiteX3" fmla="*/ 2697697 w 4849536"/>
+                  <a:gd name="connsiteY3" fmla="*/ 1155395 h 3794340"/>
+                  <a:gd name="connsiteX4" fmla="*/ 3543912 w 4849536"/>
+                  <a:gd name="connsiteY4" fmla="*/ 400775 h 3794340"/>
+                  <a:gd name="connsiteX5" fmla="*/ 3202122 w 4849536"/>
+                  <a:gd name="connsiteY5" fmla="*/ 59080 h 3794340"/>
+                  <a:gd name="connsiteX6" fmla="*/ 2263751 w 4849536"/>
+                  <a:gd name="connsiteY6" fmla="*/ 903229 h 3794340"/>
+                  <a:gd name="connsiteX7" fmla="*/ 2051939 w 4849536"/>
+                  <a:gd name="connsiteY7" fmla="*/ 1006085 h 3794340"/>
+                  <a:gd name="connsiteX8" fmla="*/ 2014682 w 4849536"/>
+                  <a:gd name="connsiteY8" fmla="*/ 1050850 h 3794340"/>
+                  <a:gd name="connsiteX9" fmla="*/ 1906853 w 4849536"/>
+                  <a:gd name="connsiteY9" fmla="*/ 1252995 h 3794340"/>
+                  <a:gd name="connsiteX10" fmla="*/ 1788324 w 4849536"/>
+                  <a:gd name="connsiteY10" fmla="*/ 1773093 h 3794340"/>
+                  <a:gd name="connsiteX11" fmla="*/ 1278362 w 4849536"/>
+                  <a:gd name="connsiteY11" fmla="*/ 1793176 h 3794340"/>
+                  <a:gd name="connsiteX12" fmla="*/ 1040743 w 4849536"/>
+                  <a:gd name="connsiteY12" fmla="*/ 1862341 h 3794340"/>
+                  <a:gd name="connsiteX13" fmla="*/ 936385 w 4849536"/>
+                  <a:gd name="connsiteY13" fmla="*/ 1839255 h 3794340"/>
+                  <a:gd name="connsiteX14" fmla="*/ 605764 w 4849536"/>
+                  <a:gd name="connsiteY14" fmla="*/ 1428676 h 3794340"/>
+                  <a:gd name="connsiteX15" fmla="*/ 6648 w 4849536"/>
+                  <a:gd name="connsiteY15" fmla="*/ 1749725 h 3794340"/>
+                  <a:gd name="connsiteX16" fmla="*/ 424453 w 4849536"/>
+                  <a:gd name="connsiteY16" fmla="*/ 2251898 h 3794340"/>
+                  <a:gd name="connsiteX17" fmla="*/ 897064 w 4849536"/>
+                  <a:gd name="connsiteY17" fmla="*/ 2018220 h 3794340"/>
+                  <a:gd name="connsiteX18" fmla="*/ 979649 w 4849536"/>
+                  <a:gd name="connsiteY18" fmla="*/ 2036332 h 3794340"/>
+                  <a:gd name="connsiteX19" fmla="*/ 1150074 w 4849536"/>
+                  <a:gd name="connsiteY19" fmla="*/ 2259124 h 3794340"/>
+                  <a:gd name="connsiteX20" fmla="*/ 2080656 w 4849536"/>
+                  <a:gd name="connsiteY20" fmla="*/ 2156738 h 3794340"/>
+                  <a:gd name="connsiteX21" fmla="*/ 2316493 w 4849536"/>
+                  <a:gd name="connsiteY21" fmla="*/ 1818515 h 3794340"/>
+                  <a:gd name="connsiteX22" fmla="*/ 2782816 w 4849536"/>
+                  <a:gd name="connsiteY22" fmla="*/ 2315808 h 3794340"/>
+                  <a:gd name="connsiteX23" fmla="*/ 2173471 w 4849536"/>
+                  <a:gd name="connsiteY23" fmla="*/ 3492174 h 3794340"/>
+                  <a:gd name="connsiteX24" fmla="*/ 2639606 w 4849536"/>
+                  <a:gd name="connsiteY24" fmla="*/ 3620650 h 3794340"/>
+                  <a:gd name="connsiteX25" fmla="*/ 3321401 w 4849536"/>
+                  <a:gd name="connsiteY25" fmla="*/ 2547421 h 3794340"/>
+                  <a:gd name="connsiteX26" fmla="*/ 4491668 w 4849536"/>
+                  <a:gd name="connsiteY26" fmla="*/ 3571662 h 3794340"/>
+                  <a:gd name="connsiteX27" fmla="*/ 4735387 w 4849536"/>
+                  <a:gd name="connsiteY27" fmla="*/ 3154702 h 3794340"/>
+                </a:gdLst>
+                <a:ahLst/>
+                <a:cxnLst>
+                  <a:cxn ang="0">
+                    <a:pos x="connsiteX0" y="connsiteY0"/>
+                  </a:cxn>
+                  <a:cxn ang="0">
+                    <a:pos x="connsiteX1" y="connsiteY1"/>
+                  </a:cxn>
+                  <a:cxn ang="0">
+                    <a:pos x="connsiteX2" y="connsiteY2"/>
+                  </a:cxn>
+                  <a:cxn ang="0">
+                    <a:pos x="connsiteX3" y="connsiteY3"/>
+                  </a:cxn>
+                  <a:cxn ang="0">
+                    <a:pos x="connsiteX4" y="connsiteY4"/>
+                  </a:cxn>
+                  <a:cxn ang="0">
+                    <a:pos x="connsiteX5" y="connsiteY5"/>
+                  </a:cxn>
+                  <a:cxn ang="0">
+                    <a:pos x="connsiteX6" y="connsiteY6"/>
+                  </a:cxn>
+                  <a:cxn ang="0">
+                    <a:pos x="connsiteX7" y="connsiteY7"/>
+                  </a:cxn>
+                  <a:cxn ang="0">
+                    <a:pos x="connsiteX8" y="connsiteY8"/>
+                  </a:cxn>
+                  <a:cxn ang="0">
+                    <a:pos x="connsiteX9" y="connsiteY9"/>
+                  </a:cxn>
+                  <a:cxn ang="0">
+                    <a:pos x="connsiteX10" y="connsiteY10"/>
+                  </a:cxn>
+                  <a:cxn ang="0">
+                    <a:pos x="connsiteX11" y="connsiteY11"/>
+                  </a:cxn>
+                  <a:cxn ang="0">
+                    <a:pos x="connsiteX12" y="connsiteY12"/>
+                  </a:cxn>
+                  <a:cxn ang="0">
+                    <a:pos x="connsiteX13" y="connsiteY13"/>
+                  </a:cxn>
+                  <a:cxn ang="0">
+                    <a:pos x="connsiteX14" y="connsiteY14"/>
+                  </a:cxn>
+                  <a:cxn ang="0">
+                    <a:pos x="connsiteX15" y="connsiteY15"/>
+                  </a:cxn>
+                  <a:cxn ang="0">
+                    <a:pos x="connsiteX16" y="connsiteY16"/>
+                  </a:cxn>
+                  <a:cxn ang="0">
+                    <a:pos x="connsiteX17" y="connsiteY17"/>
+                  </a:cxn>
+                  <a:cxn ang="0">
+                    <a:pos x="connsiteX18" y="connsiteY18"/>
+                  </a:cxn>
+                  <a:cxn ang="0">
+                    <a:pos x="connsiteX19" y="connsiteY19"/>
+                  </a:cxn>
+                  <a:cxn ang="0">
+                    <a:pos x="connsiteX20" y="connsiteY20"/>
+                  </a:cxn>
+                  <a:cxn ang="0">
+                    <a:pos x="connsiteX21" y="connsiteY21"/>
+                  </a:cxn>
+                  <a:cxn ang="0">
+                    <a:pos x="connsiteX22" y="connsiteY22"/>
+                  </a:cxn>
+                  <a:cxn ang="0">
+                    <a:pos x="connsiteX23" y="connsiteY23"/>
+                  </a:cxn>
+                  <a:cxn ang="0">
+                    <a:pos x="connsiteX24" y="connsiteY24"/>
+                  </a:cxn>
+                  <a:cxn ang="0">
+                    <a:pos x="connsiteX25" y="connsiteY25"/>
+                  </a:cxn>
+                  <a:cxn ang="0">
+                    <a:pos x="connsiteX26" y="connsiteY26"/>
+                  </a:cxn>
+                  <a:cxn ang="0">
+                    <a:pos x="connsiteX27" y="connsiteY27"/>
+                  </a:cxn>
+                </a:cxnLst>
+                <a:rect l="l" t="t" r="r" b="b"/>
+                <a:pathLst>
+                  <a:path w="4849536" h="3794340">
+                    <a:moveTo>
+                      <a:pt x="4735387" y="3154702"/>
+                    </a:moveTo>
+                    <a:cubicBezTo>
+                      <a:pt x="4245602" y="2850639"/>
+                      <a:pt x="3842531" y="2406182"/>
+                      <a:pt x="3452693" y="1979180"/>
+                    </a:cubicBezTo>
+                    <a:cubicBezTo>
+                      <a:pt x="3434017" y="1942392"/>
+                      <a:pt x="3407271" y="1906730"/>
+                      <a:pt x="3370202" y="1873133"/>
+                    </a:cubicBezTo>
+                    <a:cubicBezTo>
+                      <a:pt x="3126201" y="1652406"/>
+                      <a:pt x="2912887" y="1403056"/>
+                      <a:pt x="2697697" y="1155395"/>
+                    </a:cubicBezTo>
+                    <a:cubicBezTo>
+                      <a:pt x="2970228" y="893375"/>
+                      <a:pt x="3251767" y="641210"/>
+                      <a:pt x="3543912" y="400775"/>
+                    </a:cubicBezTo>
+                    <a:cubicBezTo>
+                      <a:pt x="3784628" y="202477"/>
+                      <a:pt x="3440586" y="-137341"/>
+                      <a:pt x="3202122" y="59080"/>
+                    </a:cubicBezTo>
+                    <a:cubicBezTo>
+                      <a:pt x="2876756" y="326636"/>
+                      <a:pt x="2564998" y="608833"/>
+                      <a:pt x="2263751" y="903229"/>
+                    </a:cubicBezTo>
+                    <a:cubicBezTo>
+                      <a:pt x="2183888" y="914585"/>
+                      <a:pt x="2107309" y="949777"/>
+                      <a:pt x="2051939" y="1006085"/>
+                    </a:cubicBezTo>
+                    <a:cubicBezTo>
+                      <a:pt x="2037862" y="1020350"/>
+                      <a:pt x="2025756" y="1035459"/>
+                      <a:pt x="2014682" y="1050850"/>
+                    </a:cubicBezTo>
+                    <a:cubicBezTo>
+                      <a:pt x="1949740" y="1086981"/>
+                      <a:pt x="1903474" y="1154269"/>
+                      <a:pt x="1906853" y="1252995"/>
+                    </a:cubicBezTo>
+                    <a:cubicBezTo>
+                      <a:pt x="1912765" y="1425861"/>
+                      <a:pt x="1916706" y="1639080"/>
+                      <a:pt x="1788324" y="1773093"/>
+                    </a:cubicBezTo>
+                    <a:cubicBezTo>
+                      <a:pt x="1665385" y="1901569"/>
+                      <a:pt x="1422886" y="1834375"/>
+                      <a:pt x="1278362" y="1793176"/>
+                    </a:cubicBezTo>
+                    <a:cubicBezTo>
+                      <a:pt x="1175319" y="1763896"/>
+                      <a:pt x="1092734" y="1799558"/>
+                      <a:pt x="1040743" y="1862341"/>
+                    </a:cubicBezTo>
+                    <a:lnTo>
+                      <a:pt x="936385" y="1839255"/>
+                    </a:lnTo>
+                    <a:cubicBezTo>
+                      <a:pt x="936010" y="1645931"/>
+                      <a:pt x="802185" y="1471939"/>
+                      <a:pt x="605764" y="1428676"/>
+                    </a:cubicBezTo>
+                    <a:cubicBezTo>
+                      <a:pt x="378374" y="1378656"/>
+                      <a:pt x="56668" y="1522429"/>
+                      <a:pt x="6648" y="1749725"/>
+                    </a:cubicBezTo>
+                    <a:cubicBezTo>
+                      <a:pt x="-43279" y="1977021"/>
+                      <a:pt x="197062" y="2202066"/>
+                      <a:pt x="424453" y="2251898"/>
+                    </a:cubicBezTo>
+                    <a:cubicBezTo>
+                      <a:pt x="621061" y="2295161"/>
+                      <a:pt x="815605" y="2193432"/>
+                      <a:pt x="897064" y="2018220"/>
+                    </a:cubicBezTo>
+                    <a:lnTo>
+                      <a:pt x="979649" y="2036332"/>
+                    </a:lnTo>
+                    <a:cubicBezTo>
+                      <a:pt x="980024" y="2131868"/>
+                      <a:pt x="1031452" y="2225527"/>
+                      <a:pt x="1150074" y="2259124"/>
+                    </a:cubicBezTo>
+                    <a:cubicBezTo>
+                      <a:pt x="1464741" y="2348466"/>
+                      <a:pt x="1810566" y="2369300"/>
+                      <a:pt x="2080656" y="2156738"/>
+                    </a:cubicBezTo>
+                    <a:cubicBezTo>
+                      <a:pt x="2194211" y="2067302"/>
+                      <a:pt x="2268631" y="1949055"/>
+                      <a:pt x="2316493" y="1818515"/>
+                    </a:cubicBezTo>
+                    <a:cubicBezTo>
+                      <a:pt x="2466084" y="1989785"/>
+                      <a:pt x="2618209" y="2158708"/>
+                      <a:pt x="2782816" y="2315808"/>
+                    </a:cubicBezTo>
+                    <a:cubicBezTo>
+                      <a:pt x="2451069" y="2602321"/>
+                      <a:pt x="2271634" y="3045089"/>
+                      <a:pt x="2173471" y="3492174"/>
+                    </a:cubicBezTo>
+                    <a:cubicBezTo>
+                      <a:pt x="2106746" y="3795767"/>
+                      <a:pt x="2572694" y="3924994"/>
+                      <a:pt x="2639606" y="3620650"/>
+                    </a:cubicBezTo>
+                    <a:cubicBezTo>
+                      <a:pt x="2734954" y="3186516"/>
+                      <a:pt x="2892898" y="2721037"/>
+                      <a:pt x="3321401" y="2547421"/>
+                    </a:cubicBezTo>
+                    <a:cubicBezTo>
+                      <a:pt x="3677174" y="2928062"/>
+                      <a:pt x="4052185" y="3298850"/>
+                      <a:pt x="4491668" y="3571662"/>
+                    </a:cubicBezTo>
+                    <a:cubicBezTo>
+                      <a:pt x="4757160" y="3737020"/>
+                      <a:pt x="4999753" y="3318746"/>
+                      <a:pt x="4735387" y="3154702"/>
+                    </a:cubicBezTo>
+                    <a:close/>
+                  </a:path>
+                </a:pathLst>
+              </a:custGeom>
+              <a:grpFill/>
+              <a:ln w="93785" cap="flat">
+                <a:noFill/>
+                <a:prstDash val="solid"/>
+                <a:miter/>
+              </a:ln>
+              <a:effectLst>
+                <a:outerShdw blurRad="190500" dist="228600" dir="2700000" algn="ctr">
+                  <a:srgbClr val="000000">
+                    <a:alpha val="14000"/>
+                  </a:srgbClr>
+                </a:outerShdw>
+              </a:effectLst>
+              <a:sp3d prstMaterial="matte">
+                <a:bevelT w="127000" h="63500"/>
+              </a:sp3d>
+            </p:spPr>
+            <p:txBody>
+              <a:bodyPr rtlCol="0" anchor="ctr"/>
+              <a:lstStyle/>
+              <a:p>
+                <a:endParaRPr lang="en-US" dirty="0"/>
+              </a:p>
+            </p:txBody>
+          </p:sp>
+          <p:sp>
+            <p:nvSpPr>
+              <p:cNvPr id="8" name="Freeform: Shape 7">
+                <a:extLst>
+                  <a:ext uri="{FF2B5EF4-FFF2-40B4-BE49-F238E27FC236}">
+                    <a16:creationId xmlns:a16="http://schemas.microsoft.com/office/drawing/2014/main" id="{F928EA10-DF5F-6770-AC04-7163F10C003E}"/>
+                  </a:ext>
+                </a:extLst>
+              </p:cNvPr>
+              <p:cNvSpPr/>
+              <p:nvPr/>
+            </p:nvSpPr>
+            <p:spPr>
+              <a:xfrm>
+                <a:off x="4635812" y="1260776"/>
+                <a:ext cx="869957" cy="869957"/>
+              </a:xfrm>
+              <a:custGeom>
+                <a:avLst/>
+                <a:gdLst>
+                  <a:gd name="connsiteX0" fmla="*/ 869957 w 869957"/>
+                  <a:gd name="connsiteY0" fmla="*/ 434979 h 869957"/>
+                  <a:gd name="connsiteX1" fmla="*/ 434979 w 869957"/>
+                  <a:gd name="connsiteY1" fmla="*/ 869957 h 869957"/>
+                  <a:gd name="connsiteX2" fmla="*/ 0 w 869957"/>
+                  <a:gd name="connsiteY2" fmla="*/ 434979 h 869957"/>
+                  <a:gd name="connsiteX3" fmla="*/ 434979 w 869957"/>
+                  <a:gd name="connsiteY3" fmla="*/ 0 h 869957"/>
+                  <a:gd name="connsiteX4" fmla="*/ 869957 w 869957"/>
+                  <a:gd name="connsiteY4" fmla="*/ 434979 h 869957"/>
+                </a:gdLst>
+                <a:ahLst/>
+                <a:cxnLst>
+                  <a:cxn ang="0">
+                    <a:pos x="connsiteX0" y="connsiteY0"/>
+                  </a:cxn>
+                  <a:cxn ang="0">
+                    <a:pos x="connsiteX1" y="connsiteY1"/>
+                  </a:cxn>
+                  <a:cxn ang="0">
+                    <a:pos x="connsiteX2" y="connsiteY2"/>
+                  </a:cxn>
+                  <a:cxn ang="0">
+                    <a:pos x="connsiteX3" y="connsiteY3"/>
+                  </a:cxn>
+                  <a:cxn ang="0">
+                    <a:pos x="connsiteX4" y="connsiteY4"/>
+                  </a:cxn>
+                </a:cxnLst>
+                <a:rect l="l" t="t" r="r" b="b"/>
+                <a:pathLst>
+                  <a:path w="869957" h="869957">
+                    <a:moveTo>
+                      <a:pt x="869957" y="434979"/>
+                    </a:moveTo>
+                    <a:cubicBezTo>
+                      <a:pt x="869957" y="675211"/>
+                      <a:pt x="675211" y="869957"/>
+                      <a:pt x="434979" y="869957"/>
+                    </a:cubicBezTo>
+                    <a:cubicBezTo>
+                      <a:pt x="194746" y="869957"/>
+                      <a:pt x="0" y="675211"/>
+                      <a:pt x="0" y="434979"/>
+                    </a:cubicBezTo>
+                    <a:cubicBezTo>
+                      <a:pt x="0" y="194747"/>
+                      <a:pt x="194746" y="0"/>
+                      <a:pt x="434979" y="0"/>
+                    </a:cubicBezTo>
+                    <a:cubicBezTo>
+                      <a:pt x="675211" y="0"/>
+                      <a:pt x="869957" y="194747"/>
+                      <a:pt x="869957" y="434979"/>
+                    </a:cubicBezTo>
+                    <a:close/>
+                  </a:path>
+                </a:pathLst>
+              </a:custGeom>
+              <a:grpFill/>
+              <a:ln w="93785" cap="flat">
+                <a:noFill/>
+                <a:prstDash val="solid"/>
+                <a:miter/>
+              </a:ln>
+              <a:effectLst>
+                <a:outerShdw blurRad="190500" dist="228600" dir="2700000" algn="ctr">
+                  <a:srgbClr val="000000">
+                    <a:alpha val="30000"/>
+                  </a:srgbClr>
+                </a:outerShdw>
+              </a:effectLst>
+              <a:sp3d prstMaterial="matte">
+                <a:bevelT w="127000" h="63500"/>
+              </a:sp3d>
+            </p:spPr>
+            <p:txBody>
+              <a:bodyPr rtlCol="0" anchor="ctr"/>
+              <a:lstStyle/>
+              <a:p>
+                <a:endParaRPr lang="en-US"/>
+              </a:p>
+            </p:txBody>
+          </p:sp>
+          <p:sp>
+            <p:nvSpPr>
+              <p:cNvPr id="9" name="Freeform: Shape 8">
+                <a:extLst>
+                  <a:ext uri="{FF2B5EF4-FFF2-40B4-BE49-F238E27FC236}">
+                    <a16:creationId xmlns:a16="http://schemas.microsoft.com/office/drawing/2014/main" id="{1721B98D-E949-1674-D065-DFC804CF3D22}"/>
+                  </a:ext>
+                </a:extLst>
+              </p:cNvPr>
+              <p:cNvSpPr/>
+              <p:nvPr/>
+            </p:nvSpPr>
+            <p:spPr>
+              <a:xfrm>
+                <a:off x="4113275" y="2147438"/>
+                <a:ext cx="306127" cy="306127"/>
+              </a:xfrm>
+              <a:custGeom>
+                <a:avLst/>
+                <a:gdLst>
+                  <a:gd name="connsiteX0" fmla="*/ 306127 w 306127"/>
+                  <a:gd name="connsiteY0" fmla="*/ 153064 h 306127"/>
+                  <a:gd name="connsiteX1" fmla="*/ 153064 w 306127"/>
+                  <a:gd name="connsiteY1" fmla="*/ 306127 h 306127"/>
+                  <a:gd name="connsiteX2" fmla="*/ 0 w 306127"/>
+                  <a:gd name="connsiteY2" fmla="*/ 153064 h 306127"/>
+                  <a:gd name="connsiteX3" fmla="*/ 153064 w 306127"/>
+                  <a:gd name="connsiteY3" fmla="*/ 0 h 306127"/>
+                  <a:gd name="connsiteX4" fmla="*/ 306127 w 306127"/>
+                  <a:gd name="connsiteY4" fmla="*/ 153064 h 306127"/>
+                </a:gdLst>
+                <a:ahLst/>
+                <a:cxnLst>
+                  <a:cxn ang="0">
+                    <a:pos x="connsiteX0" y="connsiteY0"/>
+                  </a:cxn>
+                  <a:cxn ang="0">
+                    <a:pos x="connsiteX1" y="connsiteY1"/>
+                  </a:cxn>
+                  <a:cxn ang="0">
+                    <a:pos x="connsiteX2" y="connsiteY2"/>
+                  </a:cxn>
+                  <a:cxn ang="0">
+                    <a:pos x="connsiteX3" y="connsiteY3"/>
+                  </a:cxn>
+                  <a:cxn ang="0">
+                    <a:pos x="connsiteX4" y="connsiteY4"/>
+                  </a:cxn>
+                </a:cxnLst>
+                <a:rect l="l" t="t" r="r" b="b"/>
+                <a:pathLst>
+                  <a:path w="306127" h="306127">
+                    <a:moveTo>
+                      <a:pt x="306127" y="153064"/>
+                    </a:moveTo>
+                    <a:cubicBezTo>
+                      <a:pt x="306127" y="237598"/>
+                      <a:pt x="237598" y="306127"/>
+                      <a:pt x="153064" y="306127"/>
+                    </a:cubicBezTo>
+                    <a:cubicBezTo>
+                      <a:pt x="68529" y="306127"/>
+                      <a:pt x="0" y="237599"/>
+                      <a:pt x="0" y="153064"/>
+                    </a:cubicBezTo>
+                    <a:cubicBezTo>
+                      <a:pt x="0" y="68529"/>
+                      <a:pt x="68529" y="0"/>
+                      <a:pt x="153064" y="0"/>
+                    </a:cubicBezTo>
+                    <a:cubicBezTo>
+                      <a:pt x="237599" y="0"/>
+                      <a:pt x="306127" y="68529"/>
+                      <a:pt x="306127" y="153064"/>
+                    </a:cubicBezTo>
+                    <a:close/>
+                  </a:path>
+                </a:pathLst>
+              </a:custGeom>
+              <a:grpFill/>
+              <a:ln w="93785" cap="flat">
+                <a:noFill/>
+                <a:prstDash val="solid"/>
+                <a:miter/>
+              </a:ln>
+              <a:effectLst>
+                <a:outerShdw blurRad="190500" dist="228600" dir="2700000" algn="ctr">
+                  <a:srgbClr val="000000">
+                    <a:alpha val="30000"/>
+                  </a:srgbClr>
+                </a:outerShdw>
+              </a:effectLst>
+              <a:sp3d prstMaterial="matte">
+                <a:bevelT w="127000" h="63500"/>
+              </a:sp3d>
+            </p:spPr>
+            <p:txBody>
+              <a:bodyPr rtlCol="0" anchor="ctr"/>
+              <a:lstStyle/>
+              <a:p>
+                <a:endParaRPr lang="en-US"/>
               </a:p>
             </p:txBody>
           </p:sp>
@@ -9301,7 +11137,7 @@
     </p:spTree>
     <p:extLst>
       <p:ext uri="{BB962C8B-B14F-4D97-AF65-F5344CB8AC3E}">
-        <p14:creationId xmlns:p14="http://schemas.microsoft.com/office/powerpoint/2010/main" val="35715218"/>
+        <p14:creationId xmlns:p14="http://schemas.microsoft.com/office/powerpoint/2010/main" val="38798944"/>
       </p:ext>
     </p:extLst>
   </p:cSld>

</xml_diff>